<commit_message>
updated the data structure! falta agregar una lista en el diccionario de voltages
</commit_message>
<xml_diff>
--- a/Documentation/CSD_datastructure.pptx
+++ b/Documentation/CSD_datastructure.pptx
@@ -4,6 +4,9 @@
   <p:sldMasterIdLst>
     <p:sldMasterId id="2147483648" r:id="rId1"/>
   </p:sldMasterIdLst>
+  <p:notesMasterIdLst>
+    <p:notesMasterId r:id="rId3"/>
+  </p:notesMasterIdLst>
   <p:sldIdLst>
     <p:sldId id="257" r:id="rId2"/>
   </p:sldIdLst>
@@ -1105,44 +1108,7 @@
         <a:p>
           <a:r>
             <a:rPr lang="es-AR" dirty="0" smtClean="0"/>
-            <a:t>SOURCE</a:t>
-          </a:r>
-          <a:endParaRPr lang="es-AR" dirty="0"/>
-        </a:p>
-      </dgm:t>
-    </dgm:pt>
-    <dgm:pt modelId="{B18B0066-9FAC-47D8-A96F-F9546974DB97}" type="parTrans" cxnId="{1A94B808-1035-4031-8462-D06F5EA50EAD}">
-      <dgm:prSet/>
-      <dgm:spPr/>
-      <dgm:t>
-        <a:bodyPr/>
-        <a:lstStyle/>
-        <a:p>
-          <a:endParaRPr lang="es-AR"/>
-        </a:p>
-      </dgm:t>
-    </dgm:pt>
-    <dgm:pt modelId="{869D3AD7-433E-4AE3-97E1-05524277F169}" type="sibTrans" cxnId="{1A94B808-1035-4031-8462-D06F5EA50EAD}">
-      <dgm:prSet/>
-      <dgm:spPr/>
-      <dgm:t>
-        <a:bodyPr/>
-        <a:lstStyle/>
-        <a:p>
-          <a:endParaRPr lang="es-AR"/>
-        </a:p>
-      </dgm:t>
-    </dgm:pt>
-    <dgm:pt modelId="{6C7C46CA-6D81-42A3-8942-427BC01E9410}">
-      <dgm:prSet phldrT="[Texto]"/>
-      <dgm:spPr/>
-      <dgm:t>
-        <a:bodyPr/>
-        <a:lstStyle/>
-        <a:p>
-          <a:r>
-            <a:rPr lang="es-AR" dirty="0" smtClean="0"/>
-            <a:t>_time[</a:t>
+            <a:t>SOURCE[</a:t>
           </a:r>
           <a:r>
             <a:rPr lang="es-AR" dirty="0" err="1" smtClean="0"/>
@@ -1156,7 +1122,7 @@
         </a:p>
       </dgm:t>
     </dgm:pt>
-    <dgm:pt modelId="{A9425E43-8565-4DC1-ADF9-A6F6CC5FAE09}" type="parTrans" cxnId="{BDBA4EE2-87B1-4058-84BE-1837AB36E929}">
+    <dgm:pt modelId="{B18B0066-9FAC-47D8-A96F-F9546974DB97}" type="parTrans" cxnId="{1A94B808-1035-4031-8462-D06F5EA50EAD}">
       <dgm:prSet/>
       <dgm:spPr/>
       <dgm:t>
@@ -1167,7 +1133,7 @@
         </a:p>
       </dgm:t>
     </dgm:pt>
-    <dgm:pt modelId="{FB55F8BD-11BB-40DA-9F27-7C2CB933911E}" type="sibTrans" cxnId="{BDBA4EE2-87B1-4058-84BE-1837AB36E929}">
+    <dgm:pt modelId="{869D3AD7-433E-4AE3-97E1-05524277F169}" type="sibTrans" cxnId="{1A94B808-1035-4031-8462-D06F5EA50EAD}">
       <dgm:prSet/>
       <dgm:spPr/>
       <dgm:t>
@@ -1191,7 +1157,7 @@
           </a:r>
           <a:r>
             <a:rPr lang="es-AR" dirty="0" err="1" smtClean="0"/>
-            <a:t>voltage</a:t>
+            <a:t>voltages</a:t>
           </a:r>
           <a:r>
             <a:rPr lang="es-AR" dirty="0" smtClean="0"/>
@@ -1199,7 +1165,7 @@
           </a:r>
           <a:r>
             <a:rPr lang="es-AR" dirty="0" err="1" smtClean="0"/>
-            <a:t>value</a:t>
+            <a:t>dict</a:t>
           </a:r>
           <a:r>
             <a:rPr lang="es-AR" dirty="0" smtClean="0"/>
@@ -1899,6 +1865,165 @@
         </a:p>
       </dgm:t>
     </dgm:pt>
+    <dgm:pt modelId="{B681251F-B137-43B5-A667-00AA8F1FB373}">
+      <dgm:prSet phldrT="[Texto]"/>
+      <dgm:spPr/>
+      <dgm:t>
+        <a:bodyPr/>
+        <a:lstStyle/>
+        <a:p>
+          <a:r>
+            <a:rPr lang="es-AR" dirty="0" smtClean="0"/>
+            <a:t>_</a:t>
+          </a:r>
+          <a:r>
+            <a:rPr lang="es-AR" dirty="0" err="1" smtClean="0"/>
+            <a:t>nnodes</a:t>
+          </a:r>
+          <a:r>
+            <a:rPr lang="es-AR" dirty="0" smtClean="0"/>
+            <a:t>[</a:t>
+          </a:r>
+          <a:r>
+            <a:rPr lang="es-AR" dirty="0" err="1" smtClean="0"/>
+            <a:t>list</a:t>
+          </a:r>
+          <a:r>
+            <a:rPr lang="es-AR" dirty="0" smtClean="0"/>
+            <a:t>]</a:t>
+          </a:r>
+          <a:endParaRPr lang="es-AR" dirty="0"/>
+        </a:p>
+      </dgm:t>
+    </dgm:pt>
+    <dgm:pt modelId="{46FA7E0D-038B-4CAB-9B4A-93D957032341}" type="parTrans" cxnId="{8ED13F80-B000-4AFC-9044-A1F1D691BE0B}">
+      <dgm:prSet/>
+      <dgm:spPr/>
+      <dgm:t>
+        <a:bodyPr/>
+        <a:lstStyle/>
+        <a:p>
+          <a:endParaRPr lang="es-AR"/>
+        </a:p>
+      </dgm:t>
+    </dgm:pt>
+    <dgm:pt modelId="{9F1D8A76-1A8B-4CE8-BFC1-EF3990CC3132}" type="sibTrans" cxnId="{8ED13F80-B000-4AFC-9044-A1F1D691BE0B}">
+      <dgm:prSet/>
+      <dgm:spPr/>
+      <dgm:t>
+        <a:bodyPr/>
+        <a:lstStyle/>
+        <a:p>
+          <a:endParaRPr lang="es-AR"/>
+        </a:p>
+      </dgm:t>
+    </dgm:pt>
+    <dgm:pt modelId="{0DA65A98-3B9E-4210-AB71-1310F25DC60B}">
+      <dgm:prSet phldrT="[Texto]"/>
+      <dgm:spPr/>
+      <dgm:t>
+        <a:bodyPr/>
+        <a:lstStyle/>
+        <a:p>
+          <a:r>
+            <a:rPr lang="es-AR" dirty="0" smtClean="0"/>
+            <a:t>_</a:t>
+          </a:r>
+          <a:r>
+            <a:rPr lang="es-AR" dirty="0" err="1" smtClean="0"/>
+            <a:t>ntime</a:t>
+          </a:r>
+          <a:r>
+            <a:rPr lang="es-AR" dirty="0" smtClean="0"/>
+            <a:t>[</a:t>
+          </a:r>
+          <a:r>
+            <a:rPr lang="es-AR" dirty="0" err="1" smtClean="0"/>
+            <a:t>list</a:t>
+          </a:r>
+          <a:r>
+            <a:rPr lang="es-AR" dirty="0" smtClean="0"/>
+            <a:t>]</a:t>
+          </a:r>
+          <a:endParaRPr lang="es-AR" dirty="0"/>
+        </a:p>
+      </dgm:t>
+    </dgm:pt>
+    <dgm:pt modelId="{49F7A883-E0C2-4FDE-A76C-3D8814586340}" type="parTrans" cxnId="{DB981D9D-9DEC-4779-A59F-4BA8B01E0415}">
+      <dgm:prSet/>
+      <dgm:spPr/>
+      <dgm:t>
+        <a:bodyPr/>
+        <a:lstStyle/>
+        <a:p>
+          <a:endParaRPr lang="es-AR"/>
+        </a:p>
+      </dgm:t>
+    </dgm:pt>
+    <dgm:pt modelId="{5C07BFC1-B766-4C05-B73A-A02C4A5D3989}" type="sibTrans" cxnId="{DB981D9D-9DEC-4779-A59F-4BA8B01E0415}">
+      <dgm:prSet/>
+      <dgm:spPr/>
+      <dgm:t>
+        <a:bodyPr/>
+        <a:lstStyle/>
+        <a:p>
+          <a:endParaRPr lang="es-AR"/>
+        </a:p>
+      </dgm:t>
+    </dgm:pt>
+    <dgm:pt modelId="{4FE86403-F480-4CF2-B5CA-BBE69841C37F}">
+      <dgm:prSet phldrT="[Texto]"/>
+      <dgm:spPr/>
+      <dgm:t>
+        <a:bodyPr/>
+        <a:lstStyle/>
+        <a:p>
+          <a:r>
+            <a:rPr lang="es-AR" dirty="0" smtClean="0"/>
+            <a:t>_</a:t>
+          </a:r>
+          <a:r>
+            <a:rPr lang="es-AR" dirty="0" err="1" smtClean="0"/>
+            <a:t>node</a:t>
+          </a:r>
+          <a:r>
+            <a:rPr lang="es-AR" dirty="0" smtClean="0"/>
+            <a:t>[</a:t>
+          </a:r>
+          <a:r>
+            <a:rPr lang="es-AR" dirty="0" err="1" smtClean="0"/>
+            <a:t>key</a:t>
+          </a:r>
+          <a:r>
+            <a:rPr lang="es-AR" dirty="0" smtClean="0"/>
+            <a:t>]</a:t>
+          </a:r>
+          <a:endParaRPr lang="es-AR" dirty="0"/>
+        </a:p>
+      </dgm:t>
+    </dgm:pt>
+    <dgm:pt modelId="{BF5281B7-3993-4038-BB99-9C6864923CDB}" type="parTrans" cxnId="{699AA048-5716-403F-9A1C-35F6EA7632C7}">
+      <dgm:prSet/>
+      <dgm:spPr/>
+      <dgm:t>
+        <a:bodyPr/>
+        <a:lstStyle/>
+        <a:p>
+          <a:endParaRPr lang="es-AR"/>
+        </a:p>
+      </dgm:t>
+    </dgm:pt>
+    <dgm:pt modelId="{C71C4558-77B6-4E8A-BB9F-AD36B4F95CAD}" type="sibTrans" cxnId="{699AA048-5716-403F-9A1C-35F6EA7632C7}">
+      <dgm:prSet/>
+      <dgm:spPr/>
+      <dgm:t>
+        <a:bodyPr/>
+        <a:lstStyle/>
+        <a:p>
+          <a:endParaRPr lang="es-AR"/>
+        </a:p>
+      </dgm:t>
+    </dgm:pt>
     <dgm:pt modelId="{6A951408-BFCE-48CE-BBB6-5296E99687F8}" type="pres">
       <dgm:prSet presAssocID="{A2D4EA81-EFBF-482D-BC64-D7C64ED9D918}" presName="diagram" presStyleCnt="0">
         <dgm:presLayoutVars>
@@ -1910,6 +2035,13 @@
         </dgm:presLayoutVars>
       </dgm:prSet>
       <dgm:spPr/>
+      <dgm:t>
+        <a:bodyPr/>
+        <a:lstStyle/>
+        <a:p>
+          <a:endParaRPr lang="es-AR"/>
+        </a:p>
+      </dgm:t>
     </dgm:pt>
     <dgm:pt modelId="{78455393-AF30-4BEB-98DB-DF0379F34AF7}" type="pres">
       <dgm:prSet presAssocID="{018D90FD-8799-4B29-9A27-2CAE092621D9}" presName="root1" presStyleCnt="0"/>
@@ -1922,6 +2054,13 @@
         </dgm:presLayoutVars>
       </dgm:prSet>
       <dgm:spPr/>
+      <dgm:t>
+        <a:bodyPr/>
+        <a:lstStyle/>
+        <a:p>
+          <a:endParaRPr lang="es-AR"/>
+        </a:p>
+      </dgm:t>
     </dgm:pt>
     <dgm:pt modelId="{4C84633E-2B2B-4BCB-8437-A7E480B67403}" type="pres">
       <dgm:prSet presAssocID="{018D90FD-8799-4B29-9A27-2CAE092621D9}" presName="level2hierChild" presStyleCnt="0"/>
@@ -1930,10 +2069,24 @@
     <dgm:pt modelId="{99E2DF40-6437-4F07-8F2E-79D80FBB7613}" type="pres">
       <dgm:prSet presAssocID="{CA6A0933-6C98-4683-B217-04900501B08F}" presName="conn2-1" presStyleLbl="parChTrans1D2" presStyleIdx="0" presStyleCnt="2"/>
       <dgm:spPr/>
+      <dgm:t>
+        <a:bodyPr/>
+        <a:lstStyle/>
+        <a:p>
+          <a:endParaRPr lang="es-AR"/>
+        </a:p>
+      </dgm:t>
     </dgm:pt>
     <dgm:pt modelId="{D2517C91-CD98-47B1-A003-057FA67CA5D1}" type="pres">
       <dgm:prSet presAssocID="{CA6A0933-6C98-4683-B217-04900501B08F}" presName="connTx" presStyleLbl="parChTrans1D2" presStyleIdx="0" presStyleCnt="2"/>
       <dgm:spPr/>
+      <dgm:t>
+        <a:bodyPr/>
+        <a:lstStyle/>
+        <a:p>
+          <a:endParaRPr lang="es-AR"/>
+        </a:p>
+      </dgm:t>
     </dgm:pt>
     <dgm:pt modelId="{AA0FE6DA-83FB-4B80-8596-D30372D561A9}" type="pres">
       <dgm:prSet presAssocID="{1621E007-26BC-431B-A947-D00592434C8A}" presName="root2" presStyleCnt="0"/>
@@ -1946,438 +2099,823 @@
         </dgm:presLayoutVars>
       </dgm:prSet>
       <dgm:spPr/>
+      <dgm:t>
+        <a:bodyPr/>
+        <a:lstStyle/>
+        <a:p>
+          <a:endParaRPr lang="es-AR"/>
+        </a:p>
+      </dgm:t>
     </dgm:pt>
     <dgm:pt modelId="{5157CECD-1109-4E8D-A643-5F823C526620}" type="pres">
       <dgm:prSet presAssocID="{1621E007-26BC-431B-A947-D00592434C8A}" presName="level3hierChild" presStyleCnt="0"/>
       <dgm:spPr/>
     </dgm:pt>
     <dgm:pt modelId="{71664F23-62A3-45D4-B742-6B3578F3BC43}" type="pres">
-      <dgm:prSet presAssocID="{B18B0066-9FAC-47D8-A96F-F9546974DB97}" presName="conn2-1" presStyleLbl="parChTrans1D3" presStyleIdx="0" presStyleCnt="20"/>
-      <dgm:spPr/>
+      <dgm:prSet presAssocID="{B18B0066-9FAC-47D8-A96F-F9546974DB97}" presName="conn2-1" presStyleLbl="parChTrans1D3" presStyleIdx="0" presStyleCnt="21"/>
+      <dgm:spPr/>
+      <dgm:t>
+        <a:bodyPr/>
+        <a:lstStyle/>
+        <a:p>
+          <a:endParaRPr lang="es-AR"/>
+        </a:p>
+      </dgm:t>
     </dgm:pt>
     <dgm:pt modelId="{91B3F187-9C1C-4565-B582-8DD7DEA72C45}" type="pres">
-      <dgm:prSet presAssocID="{B18B0066-9FAC-47D8-A96F-F9546974DB97}" presName="connTx" presStyleLbl="parChTrans1D3" presStyleIdx="0" presStyleCnt="20"/>
-      <dgm:spPr/>
+      <dgm:prSet presAssocID="{B18B0066-9FAC-47D8-A96F-F9546974DB97}" presName="connTx" presStyleLbl="parChTrans1D3" presStyleIdx="0" presStyleCnt="21"/>
+      <dgm:spPr/>
+      <dgm:t>
+        <a:bodyPr/>
+        <a:lstStyle/>
+        <a:p>
+          <a:endParaRPr lang="es-AR"/>
+        </a:p>
+      </dgm:t>
     </dgm:pt>
     <dgm:pt modelId="{F38DE976-BB3A-4B7F-826C-5FA5F57930FE}" type="pres">
       <dgm:prSet presAssocID="{12215929-6AE7-4473-8665-4AD98B1D8ADC}" presName="root2" presStyleCnt="0"/>
       <dgm:spPr/>
     </dgm:pt>
     <dgm:pt modelId="{1B16D038-BF3B-4573-8A3D-1890298B5046}" type="pres">
-      <dgm:prSet presAssocID="{12215929-6AE7-4473-8665-4AD98B1D8ADC}" presName="LevelTwoTextNode" presStyleLbl="node3" presStyleIdx="0" presStyleCnt="20" custLinFactX="200000" custLinFactY="325495" custLinFactNeighborX="237846" custLinFactNeighborY="400000">
+      <dgm:prSet presAssocID="{12215929-6AE7-4473-8665-4AD98B1D8ADC}" presName="LevelTwoTextNode" presStyleLbl="node3" presStyleIdx="0" presStyleCnt="21" custLinFactX="200000" custLinFactY="325495" custLinFactNeighborX="237846" custLinFactNeighborY="400000">
         <dgm:presLayoutVars>
           <dgm:chPref val="3"/>
         </dgm:presLayoutVars>
       </dgm:prSet>
       <dgm:spPr/>
+      <dgm:t>
+        <a:bodyPr/>
+        <a:lstStyle/>
+        <a:p>
+          <a:endParaRPr lang="es-AR"/>
+        </a:p>
+      </dgm:t>
     </dgm:pt>
     <dgm:pt modelId="{4FC14B1B-BC02-4B15-A0A4-2A7CDA65E686}" type="pres">
       <dgm:prSet presAssocID="{12215929-6AE7-4473-8665-4AD98B1D8ADC}" presName="level3hierChild" presStyleCnt="0"/>
       <dgm:spPr/>
     </dgm:pt>
     <dgm:pt modelId="{D1667392-08A5-400E-A47D-1B3AF25FE52A}" type="pres">
-      <dgm:prSet presAssocID="{4C1760A4-FF6B-41F2-9645-A6A075E2AFD1}" presName="conn2-1" presStyleLbl="parChTrans1D3" presStyleIdx="1" presStyleCnt="20"/>
-      <dgm:spPr/>
+      <dgm:prSet presAssocID="{4C1760A4-FF6B-41F2-9645-A6A075E2AFD1}" presName="conn2-1" presStyleLbl="parChTrans1D3" presStyleIdx="1" presStyleCnt="21"/>
+      <dgm:spPr/>
+      <dgm:t>
+        <a:bodyPr/>
+        <a:lstStyle/>
+        <a:p>
+          <a:endParaRPr lang="es-AR"/>
+        </a:p>
+      </dgm:t>
     </dgm:pt>
     <dgm:pt modelId="{B3A493D0-2FE9-4046-9D9A-466B67365C53}" type="pres">
-      <dgm:prSet presAssocID="{4C1760A4-FF6B-41F2-9645-A6A075E2AFD1}" presName="connTx" presStyleLbl="parChTrans1D3" presStyleIdx="1" presStyleCnt="20"/>
-      <dgm:spPr/>
+      <dgm:prSet presAssocID="{4C1760A4-FF6B-41F2-9645-A6A075E2AFD1}" presName="connTx" presStyleLbl="parChTrans1D3" presStyleIdx="1" presStyleCnt="21"/>
+      <dgm:spPr/>
+      <dgm:t>
+        <a:bodyPr/>
+        <a:lstStyle/>
+        <a:p>
+          <a:endParaRPr lang="es-AR"/>
+        </a:p>
+      </dgm:t>
     </dgm:pt>
     <dgm:pt modelId="{932FFBB5-748A-42E0-8A19-6608BA9B67D5}" type="pres">
       <dgm:prSet presAssocID="{AF5B58CD-DBD5-4A38-AB27-B9FF44924450}" presName="root2" presStyleCnt="0"/>
       <dgm:spPr/>
     </dgm:pt>
     <dgm:pt modelId="{F9EC1916-8065-4577-B861-94B5E85EB741}" type="pres">
-      <dgm:prSet presAssocID="{AF5B58CD-DBD5-4A38-AB27-B9FF44924450}" presName="LevelTwoTextNode" presStyleLbl="node3" presStyleIdx="1" presStyleCnt="20" custLinFactX="200000" custLinFactY="78621" custLinFactNeighborX="237846" custLinFactNeighborY="100000">
+      <dgm:prSet presAssocID="{AF5B58CD-DBD5-4A38-AB27-B9FF44924450}" presName="LevelTwoTextNode" presStyleLbl="node3" presStyleIdx="1" presStyleCnt="21" custLinFactX="200000" custLinFactY="78621" custLinFactNeighborX="237846" custLinFactNeighborY="100000">
         <dgm:presLayoutVars>
           <dgm:chPref val="3"/>
         </dgm:presLayoutVars>
       </dgm:prSet>
       <dgm:spPr/>
+      <dgm:t>
+        <a:bodyPr/>
+        <a:lstStyle/>
+        <a:p>
+          <a:endParaRPr lang="es-AR"/>
+        </a:p>
+      </dgm:t>
     </dgm:pt>
     <dgm:pt modelId="{FDF8B7EA-1FAE-48CA-A64D-DB0CD5234BDD}" type="pres">
       <dgm:prSet presAssocID="{AF5B58CD-DBD5-4A38-AB27-B9FF44924450}" presName="level3hierChild" presStyleCnt="0"/>
       <dgm:spPr/>
     </dgm:pt>
     <dgm:pt modelId="{4FC67143-A3C4-49CA-983A-D83A188633AF}" type="pres">
-      <dgm:prSet presAssocID="{6F2AB335-DE71-488D-B37F-3C1E265CC71B}" presName="conn2-1" presStyleLbl="parChTrans1D3" presStyleIdx="2" presStyleCnt="20"/>
-      <dgm:spPr/>
+      <dgm:prSet presAssocID="{6F2AB335-DE71-488D-B37F-3C1E265CC71B}" presName="conn2-1" presStyleLbl="parChTrans1D3" presStyleIdx="2" presStyleCnt="21"/>
+      <dgm:spPr/>
+      <dgm:t>
+        <a:bodyPr/>
+        <a:lstStyle/>
+        <a:p>
+          <a:endParaRPr lang="es-AR"/>
+        </a:p>
+      </dgm:t>
     </dgm:pt>
     <dgm:pt modelId="{D621044E-761C-497F-AA53-D2002AE09821}" type="pres">
-      <dgm:prSet presAssocID="{6F2AB335-DE71-488D-B37F-3C1E265CC71B}" presName="connTx" presStyleLbl="parChTrans1D3" presStyleIdx="2" presStyleCnt="20"/>
-      <dgm:spPr/>
+      <dgm:prSet presAssocID="{6F2AB335-DE71-488D-B37F-3C1E265CC71B}" presName="connTx" presStyleLbl="parChTrans1D3" presStyleIdx="2" presStyleCnt="21"/>
+      <dgm:spPr/>
+      <dgm:t>
+        <a:bodyPr/>
+        <a:lstStyle/>
+        <a:p>
+          <a:endParaRPr lang="es-AR"/>
+        </a:p>
+      </dgm:t>
     </dgm:pt>
     <dgm:pt modelId="{5D06C624-5C27-478A-9BAA-D455E9D307C7}" type="pres">
       <dgm:prSet presAssocID="{A17EEA51-2DB8-40FC-AF0D-5C978AD101F1}" presName="root2" presStyleCnt="0"/>
       <dgm:spPr/>
     </dgm:pt>
     <dgm:pt modelId="{6BBEBF5B-FED1-46D5-B4BD-B746E33E479D}" type="pres">
-      <dgm:prSet presAssocID="{A17EEA51-2DB8-40FC-AF0D-5C978AD101F1}" presName="LevelTwoTextNode" presStyleLbl="node3" presStyleIdx="2" presStyleCnt="20" custLinFactX="200000" custLinFactY="100000" custLinFactNeighborX="237846" custLinFactNeighborY="107579">
+      <dgm:prSet presAssocID="{A17EEA51-2DB8-40FC-AF0D-5C978AD101F1}" presName="LevelTwoTextNode" presStyleLbl="node3" presStyleIdx="2" presStyleCnt="21" custLinFactX="200000" custLinFactY="100000" custLinFactNeighborX="237846" custLinFactNeighborY="107579">
         <dgm:presLayoutVars>
           <dgm:chPref val="3"/>
         </dgm:presLayoutVars>
       </dgm:prSet>
       <dgm:spPr/>
+      <dgm:t>
+        <a:bodyPr/>
+        <a:lstStyle/>
+        <a:p>
+          <a:endParaRPr lang="es-AR"/>
+        </a:p>
+      </dgm:t>
     </dgm:pt>
     <dgm:pt modelId="{482911C0-2BE1-4BC0-A966-9C1A5B929C05}" type="pres">
       <dgm:prSet presAssocID="{A17EEA51-2DB8-40FC-AF0D-5C978AD101F1}" presName="level3hierChild" presStyleCnt="0"/>
       <dgm:spPr/>
     </dgm:pt>
     <dgm:pt modelId="{34DA80DF-C9F3-4B91-8344-8D94A6373D31}" type="pres">
-      <dgm:prSet presAssocID="{E86C9E3E-FA9C-4589-AAE9-49E75D1C4E3E}" presName="conn2-1" presStyleLbl="parChTrans1D3" presStyleIdx="3" presStyleCnt="20"/>
-      <dgm:spPr/>
+      <dgm:prSet presAssocID="{E86C9E3E-FA9C-4589-AAE9-49E75D1C4E3E}" presName="conn2-1" presStyleLbl="parChTrans1D3" presStyleIdx="3" presStyleCnt="21"/>
+      <dgm:spPr/>
+      <dgm:t>
+        <a:bodyPr/>
+        <a:lstStyle/>
+        <a:p>
+          <a:endParaRPr lang="es-AR"/>
+        </a:p>
+      </dgm:t>
     </dgm:pt>
     <dgm:pt modelId="{C158577F-04B7-4841-A954-51BD6529841D}" type="pres">
-      <dgm:prSet presAssocID="{E86C9E3E-FA9C-4589-AAE9-49E75D1C4E3E}" presName="connTx" presStyleLbl="parChTrans1D3" presStyleIdx="3" presStyleCnt="20"/>
-      <dgm:spPr/>
+      <dgm:prSet presAssocID="{E86C9E3E-FA9C-4589-AAE9-49E75D1C4E3E}" presName="connTx" presStyleLbl="parChTrans1D3" presStyleIdx="3" presStyleCnt="21"/>
+      <dgm:spPr/>
+      <dgm:t>
+        <a:bodyPr/>
+        <a:lstStyle/>
+        <a:p>
+          <a:endParaRPr lang="es-AR"/>
+        </a:p>
+      </dgm:t>
     </dgm:pt>
     <dgm:pt modelId="{0B6ED063-302D-4DF6-B0FC-D515177377DA}" type="pres">
       <dgm:prSet presAssocID="{1DE2FE6F-F9E1-40AA-9B09-69C06C93EB2D}" presName="root2" presStyleCnt="0"/>
       <dgm:spPr/>
     </dgm:pt>
     <dgm:pt modelId="{BEE62EB9-4BC9-4278-B431-6B95B0C29736}" type="pres">
-      <dgm:prSet presAssocID="{1DE2FE6F-F9E1-40AA-9B09-69C06C93EB2D}" presName="LevelTwoTextNode" presStyleLbl="node3" presStyleIdx="3" presStyleCnt="20" custLinFactX="200000" custLinFactY="100000" custLinFactNeighborX="237846" custLinFactNeighborY="145662">
+      <dgm:prSet presAssocID="{1DE2FE6F-F9E1-40AA-9B09-69C06C93EB2D}" presName="LevelTwoTextNode" presStyleLbl="node3" presStyleIdx="3" presStyleCnt="21" custLinFactX="200000" custLinFactY="100000" custLinFactNeighborX="237846" custLinFactNeighborY="145662">
         <dgm:presLayoutVars>
           <dgm:chPref val="3"/>
         </dgm:presLayoutVars>
       </dgm:prSet>
       <dgm:spPr/>
+      <dgm:t>
+        <a:bodyPr/>
+        <a:lstStyle/>
+        <a:p>
+          <a:endParaRPr lang="es-AR"/>
+        </a:p>
+      </dgm:t>
     </dgm:pt>
     <dgm:pt modelId="{0FA1556F-D551-412D-A2E0-79985EE7AA86}" type="pres">
       <dgm:prSet presAssocID="{1DE2FE6F-F9E1-40AA-9B09-69C06C93EB2D}" presName="level3hierChild" presStyleCnt="0"/>
       <dgm:spPr/>
     </dgm:pt>
     <dgm:pt modelId="{DABE1BB0-6FBC-4DB5-BA69-ACBDD395C425}" type="pres">
-      <dgm:prSet presAssocID="{C97438D4-6CDE-44C1-8028-FAF23EC23A32}" presName="conn2-1" presStyleLbl="parChTrans1D3" presStyleIdx="4" presStyleCnt="20"/>
-      <dgm:spPr/>
+      <dgm:prSet presAssocID="{C97438D4-6CDE-44C1-8028-FAF23EC23A32}" presName="conn2-1" presStyleLbl="parChTrans1D3" presStyleIdx="4" presStyleCnt="21"/>
+      <dgm:spPr/>
+      <dgm:t>
+        <a:bodyPr/>
+        <a:lstStyle/>
+        <a:p>
+          <a:endParaRPr lang="es-AR"/>
+        </a:p>
+      </dgm:t>
     </dgm:pt>
     <dgm:pt modelId="{73658599-AFA6-4FA5-B3AD-84ECA55BD92C}" type="pres">
-      <dgm:prSet presAssocID="{C97438D4-6CDE-44C1-8028-FAF23EC23A32}" presName="connTx" presStyleLbl="parChTrans1D3" presStyleIdx="4" presStyleCnt="20"/>
-      <dgm:spPr/>
+      <dgm:prSet presAssocID="{C97438D4-6CDE-44C1-8028-FAF23EC23A32}" presName="connTx" presStyleLbl="parChTrans1D3" presStyleIdx="4" presStyleCnt="21"/>
+      <dgm:spPr/>
+      <dgm:t>
+        <a:bodyPr/>
+        <a:lstStyle/>
+        <a:p>
+          <a:endParaRPr lang="es-AR"/>
+        </a:p>
+      </dgm:t>
     </dgm:pt>
     <dgm:pt modelId="{0326BC33-BCFA-4028-ACB5-3B7F71C1D449}" type="pres">
       <dgm:prSet presAssocID="{82F99002-2364-48E8-9474-D1E3E8E80742}" presName="root2" presStyleCnt="0"/>
       <dgm:spPr/>
     </dgm:pt>
     <dgm:pt modelId="{C4FAF5E1-9087-4502-A0C1-6CB0C16C40B6}" type="pres">
-      <dgm:prSet presAssocID="{82F99002-2364-48E8-9474-D1E3E8E80742}" presName="LevelTwoTextNode" presStyleLbl="node3" presStyleIdx="4" presStyleCnt="20" custLinFactX="200000" custLinFactY="262535" custLinFactNeighborX="213851" custLinFactNeighborY="300000">
+      <dgm:prSet presAssocID="{82F99002-2364-48E8-9474-D1E3E8E80742}" presName="LevelTwoTextNode" presStyleLbl="node3" presStyleIdx="4" presStyleCnt="21" custLinFactX="200000" custLinFactY="262535" custLinFactNeighborX="213851" custLinFactNeighborY="300000">
         <dgm:presLayoutVars>
           <dgm:chPref val="3"/>
         </dgm:presLayoutVars>
       </dgm:prSet>
       <dgm:spPr/>
+      <dgm:t>
+        <a:bodyPr/>
+        <a:lstStyle/>
+        <a:p>
+          <a:endParaRPr lang="es-AR"/>
+        </a:p>
+      </dgm:t>
     </dgm:pt>
     <dgm:pt modelId="{80E7C15B-8CF7-4E9C-A104-B2DC73A66A5F}" type="pres">
       <dgm:prSet presAssocID="{82F99002-2364-48E8-9474-D1E3E8E80742}" presName="level3hierChild" presStyleCnt="0"/>
       <dgm:spPr/>
     </dgm:pt>
     <dgm:pt modelId="{6AAEF27A-CFF0-46AB-89E7-E67E4225C49B}" type="pres">
-      <dgm:prSet presAssocID="{15BFEC00-8BF0-424B-812C-6211CB48BAB5}" presName="conn2-1" presStyleLbl="parChTrans1D3" presStyleIdx="5" presStyleCnt="20"/>
-      <dgm:spPr/>
+      <dgm:prSet presAssocID="{15BFEC00-8BF0-424B-812C-6211CB48BAB5}" presName="conn2-1" presStyleLbl="parChTrans1D3" presStyleIdx="5" presStyleCnt="21"/>
+      <dgm:spPr/>
+      <dgm:t>
+        <a:bodyPr/>
+        <a:lstStyle/>
+        <a:p>
+          <a:endParaRPr lang="es-AR"/>
+        </a:p>
+      </dgm:t>
     </dgm:pt>
     <dgm:pt modelId="{7CAD9913-F4D5-418B-B9FF-F9F360CCA625}" type="pres">
-      <dgm:prSet presAssocID="{15BFEC00-8BF0-424B-812C-6211CB48BAB5}" presName="connTx" presStyleLbl="parChTrans1D3" presStyleIdx="5" presStyleCnt="20"/>
-      <dgm:spPr/>
+      <dgm:prSet presAssocID="{15BFEC00-8BF0-424B-812C-6211CB48BAB5}" presName="connTx" presStyleLbl="parChTrans1D3" presStyleIdx="5" presStyleCnt="21"/>
+      <dgm:spPr/>
+      <dgm:t>
+        <a:bodyPr/>
+        <a:lstStyle/>
+        <a:p>
+          <a:endParaRPr lang="es-AR"/>
+        </a:p>
+      </dgm:t>
     </dgm:pt>
     <dgm:pt modelId="{F0245597-1AE3-45CC-9F4B-181A75FEE065}" type="pres">
       <dgm:prSet presAssocID="{15E4B482-AFEA-4015-890A-0C7DDF034B86}" presName="root2" presStyleCnt="0"/>
       <dgm:spPr/>
     </dgm:pt>
     <dgm:pt modelId="{C56CD8FA-6820-4927-857B-24AC03A0848E}" type="pres">
-      <dgm:prSet presAssocID="{15E4B482-AFEA-4015-890A-0C7DDF034B86}" presName="LevelTwoTextNode" presStyleLbl="node3" presStyleIdx="5" presStyleCnt="20" custLinFactX="200000" custLinFactY="700000" custLinFactNeighborX="213852" custLinFactNeighborY="731247">
+      <dgm:prSet presAssocID="{15E4B482-AFEA-4015-890A-0C7DDF034B86}" presName="LevelTwoTextNode" presStyleLbl="node3" presStyleIdx="5" presStyleCnt="21" custLinFactX="200000" custLinFactY="700000" custLinFactNeighborX="213852" custLinFactNeighborY="731247">
         <dgm:presLayoutVars>
           <dgm:chPref val="3"/>
         </dgm:presLayoutVars>
       </dgm:prSet>
       <dgm:spPr/>
+      <dgm:t>
+        <a:bodyPr/>
+        <a:lstStyle/>
+        <a:p>
+          <a:endParaRPr lang="es-AR"/>
+        </a:p>
+      </dgm:t>
     </dgm:pt>
     <dgm:pt modelId="{FC3E4ECE-52E6-409D-88B1-D5CB816B08A4}" type="pres">
       <dgm:prSet presAssocID="{15E4B482-AFEA-4015-890A-0C7DDF034B86}" presName="level3hierChild" presStyleCnt="0"/>
       <dgm:spPr/>
     </dgm:pt>
     <dgm:pt modelId="{BE94FC41-7E45-4EC8-929B-E375718E9CFD}" type="pres">
-      <dgm:prSet presAssocID="{B861AA13-B6E7-4491-8330-933D1EB7B477}" presName="conn2-1" presStyleLbl="parChTrans1D3" presStyleIdx="6" presStyleCnt="20"/>
-      <dgm:spPr/>
+      <dgm:prSet presAssocID="{B861AA13-B6E7-4491-8330-933D1EB7B477}" presName="conn2-1" presStyleLbl="parChTrans1D3" presStyleIdx="6" presStyleCnt="21"/>
+      <dgm:spPr/>
+      <dgm:t>
+        <a:bodyPr/>
+        <a:lstStyle/>
+        <a:p>
+          <a:endParaRPr lang="es-AR"/>
+        </a:p>
+      </dgm:t>
     </dgm:pt>
     <dgm:pt modelId="{F807C5DA-62F5-4DA2-8E25-CF1093B0137B}" type="pres">
-      <dgm:prSet presAssocID="{B861AA13-B6E7-4491-8330-933D1EB7B477}" presName="connTx" presStyleLbl="parChTrans1D3" presStyleIdx="6" presStyleCnt="20"/>
-      <dgm:spPr/>
+      <dgm:prSet presAssocID="{B861AA13-B6E7-4491-8330-933D1EB7B477}" presName="connTx" presStyleLbl="parChTrans1D3" presStyleIdx="6" presStyleCnt="21"/>
+      <dgm:spPr/>
+      <dgm:t>
+        <a:bodyPr/>
+        <a:lstStyle/>
+        <a:p>
+          <a:endParaRPr lang="es-AR"/>
+        </a:p>
+      </dgm:t>
     </dgm:pt>
     <dgm:pt modelId="{4B55DFD1-1535-4CFF-8DC5-569969D00208}" type="pres">
       <dgm:prSet presAssocID="{35BDD7DC-ADB5-42C5-861B-4D4B1A430768}" presName="root2" presStyleCnt="0"/>
       <dgm:spPr/>
     </dgm:pt>
     <dgm:pt modelId="{A498F82E-BAFD-4F2E-9519-0B8C1ED23FD3}" type="pres">
-      <dgm:prSet presAssocID="{35BDD7DC-ADB5-42C5-861B-4D4B1A430768}" presName="LevelTwoTextNode" presStyleLbl="node3" presStyleIdx="6" presStyleCnt="20" custLinFactX="200000" custLinFactY="272465" custLinFactNeighborX="213851" custLinFactNeighborY="300000">
+      <dgm:prSet presAssocID="{35BDD7DC-ADB5-42C5-861B-4D4B1A430768}" presName="LevelTwoTextNode" presStyleLbl="node3" presStyleIdx="6" presStyleCnt="21" custLinFactX="200000" custLinFactY="272465" custLinFactNeighborX="213851" custLinFactNeighborY="300000">
         <dgm:presLayoutVars>
           <dgm:chPref val="3"/>
         </dgm:presLayoutVars>
       </dgm:prSet>
       <dgm:spPr/>
+      <dgm:t>
+        <a:bodyPr/>
+        <a:lstStyle/>
+        <a:p>
+          <a:endParaRPr lang="es-AR"/>
+        </a:p>
+      </dgm:t>
     </dgm:pt>
     <dgm:pt modelId="{F098D1B3-0B2B-4FE1-B405-AC3CBB75FB8E}" type="pres">
       <dgm:prSet presAssocID="{35BDD7DC-ADB5-42C5-861B-4D4B1A430768}" presName="level3hierChild" presStyleCnt="0"/>
       <dgm:spPr/>
     </dgm:pt>
     <dgm:pt modelId="{9F497E88-9EE3-4B0E-BF38-F02082D514F8}" type="pres">
-      <dgm:prSet presAssocID="{98CC74F6-072D-4F1D-89B4-2638558C1ABA}" presName="conn2-1" presStyleLbl="parChTrans1D3" presStyleIdx="7" presStyleCnt="20"/>
-      <dgm:spPr/>
+      <dgm:prSet presAssocID="{98CC74F6-072D-4F1D-89B4-2638558C1ABA}" presName="conn2-1" presStyleLbl="parChTrans1D3" presStyleIdx="7" presStyleCnt="21"/>
+      <dgm:spPr/>
+      <dgm:t>
+        <a:bodyPr/>
+        <a:lstStyle/>
+        <a:p>
+          <a:endParaRPr lang="es-AR"/>
+        </a:p>
+      </dgm:t>
     </dgm:pt>
     <dgm:pt modelId="{2CBAF20D-C1DF-4B36-9E86-5B7B316B9B76}" type="pres">
-      <dgm:prSet presAssocID="{98CC74F6-072D-4F1D-89B4-2638558C1ABA}" presName="connTx" presStyleLbl="parChTrans1D3" presStyleIdx="7" presStyleCnt="20"/>
-      <dgm:spPr/>
+      <dgm:prSet presAssocID="{98CC74F6-072D-4F1D-89B4-2638558C1ABA}" presName="connTx" presStyleLbl="parChTrans1D3" presStyleIdx="7" presStyleCnt="21"/>
+      <dgm:spPr/>
+      <dgm:t>
+        <a:bodyPr/>
+        <a:lstStyle/>
+        <a:p>
+          <a:endParaRPr lang="es-AR"/>
+        </a:p>
+      </dgm:t>
     </dgm:pt>
     <dgm:pt modelId="{D5EE31AF-813C-463D-90A8-4240F3B61443}" type="pres">
       <dgm:prSet presAssocID="{E3812FED-48B3-4921-B88E-8AEE57F062DF}" presName="root2" presStyleCnt="0"/>
       <dgm:spPr/>
     </dgm:pt>
     <dgm:pt modelId="{971DCA25-CA70-406F-A12F-81E9A4B41B13}" type="pres">
-      <dgm:prSet presAssocID="{E3812FED-48B3-4921-B88E-8AEE57F062DF}" presName="LevelTwoTextNode" presStyleLbl="node3" presStyleIdx="7" presStyleCnt="20" custLinFactX="200000" custLinFactY="277430" custLinFactNeighborX="213852" custLinFactNeighborY="300000">
+      <dgm:prSet presAssocID="{E3812FED-48B3-4921-B88E-8AEE57F062DF}" presName="LevelTwoTextNode" presStyleLbl="node3" presStyleIdx="7" presStyleCnt="21" custLinFactX="200000" custLinFactY="277430" custLinFactNeighborX="213852" custLinFactNeighborY="300000">
         <dgm:presLayoutVars>
           <dgm:chPref val="3"/>
         </dgm:presLayoutVars>
       </dgm:prSet>
       <dgm:spPr/>
+      <dgm:t>
+        <a:bodyPr/>
+        <a:lstStyle/>
+        <a:p>
+          <a:endParaRPr lang="es-AR"/>
+        </a:p>
+      </dgm:t>
     </dgm:pt>
     <dgm:pt modelId="{00B78FD1-5652-46F5-B9FA-D35C8039AC88}" type="pres">
       <dgm:prSet presAssocID="{E3812FED-48B3-4921-B88E-8AEE57F062DF}" presName="level3hierChild" presStyleCnt="0"/>
       <dgm:spPr/>
     </dgm:pt>
     <dgm:pt modelId="{1642E9A8-05F5-4DD9-8853-EB0B8B3CBAB0}" type="pres">
-      <dgm:prSet presAssocID="{5581ADD0-476D-419B-BA44-5096A40EEBE5}" presName="conn2-1" presStyleLbl="parChTrans1D3" presStyleIdx="8" presStyleCnt="20"/>
-      <dgm:spPr/>
+      <dgm:prSet presAssocID="{5581ADD0-476D-419B-BA44-5096A40EEBE5}" presName="conn2-1" presStyleLbl="parChTrans1D3" presStyleIdx="8" presStyleCnt="21"/>
+      <dgm:spPr/>
+      <dgm:t>
+        <a:bodyPr/>
+        <a:lstStyle/>
+        <a:p>
+          <a:endParaRPr lang="es-AR"/>
+        </a:p>
+      </dgm:t>
     </dgm:pt>
     <dgm:pt modelId="{B80FA7EE-0B0F-4C6A-8A52-16B4B0AA9806}" type="pres">
-      <dgm:prSet presAssocID="{5581ADD0-476D-419B-BA44-5096A40EEBE5}" presName="connTx" presStyleLbl="parChTrans1D3" presStyleIdx="8" presStyleCnt="20"/>
-      <dgm:spPr/>
+      <dgm:prSet presAssocID="{5581ADD0-476D-419B-BA44-5096A40EEBE5}" presName="connTx" presStyleLbl="parChTrans1D3" presStyleIdx="8" presStyleCnt="21"/>
+      <dgm:spPr/>
+      <dgm:t>
+        <a:bodyPr/>
+        <a:lstStyle/>
+        <a:p>
+          <a:endParaRPr lang="es-AR"/>
+        </a:p>
+      </dgm:t>
     </dgm:pt>
     <dgm:pt modelId="{13691608-4442-4A64-AB82-88A15FDA2CD6}" type="pres">
       <dgm:prSet presAssocID="{E9634F12-2274-463C-A61F-87BCD69B6947}" presName="root2" presStyleCnt="0"/>
       <dgm:spPr/>
     </dgm:pt>
     <dgm:pt modelId="{72214F6E-4077-473E-BF8C-AEA5D0F63B4E}" type="pres">
-      <dgm:prSet presAssocID="{E9634F12-2274-463C-A61F-87BCD69B6947}" presName="LevelTwoTextNode" presStyleLbl="node3" presStyleIdx="8" presStyleCnt="20" custLinFactX="200000" custLinFactY="326353" custLinFactNeighborX="213852" custLinFactNeighborY="400000">
+      <dgm:prSet presAssocID="{E9634F12-2274-463C-A61F-87BCD69B6947}" presName="LevelTwoTextNode" presStyleLbl="node3" presStyleIdx="8" presStyleCnt="21" custLinFactX="200000" custLinFactY="326353" custLinFactNeighborX="213852" custLinFactNeighborY="400000">
         <dgm:presLayoutVars>
           <dgm:chPref val="3"/>
         </dgm:presLayoutVars>
       </dgm:prSet>
       <dgm:spPr/>
+      <dgm:t>
+        <a:bodyPr/>
+        <a:lstStyle/>
+        <a:p>
+          <a:endParaRPr lang="es-AR"/>
+        </a:p>
+      </dgm:t>
     </dgm:pt>
     <dgm:pt modelId="{EE7C7243-B432-4CC3-A23D-914D1637EA11}" type="pres">
       <dgm:prSet presAssocID="{E9634F12-2274-463C-A61F-87BCD69B6947}" presName="level3hierChild" presStyleCnt="0"/>
       <dgm:spPr/>
     </dgm:pt>
     <dgm:pt modelId="{F8AACCF6-CFE7-402F-B8ED-29BC5733A870}" type="pres">
-      <dgm:prSet presAssocID="{FF9F1C55-2091-412D-978D-952A963BFBC2}" presName="conn2-1" presStyleLbl="parChTrans1D3" presStyleIdx="9" presStyleCnt="20"/>
-      <dgm:spPr/>
+      <dgm:prSet presAssocID="{FF9F1C55-2091-412D-978D-952A963BFBC2}" presName="conn2-1" presStyleLbl="parChTrans1D3" presStyleIdx="9" presStyleCnt="21"/>
+      <dgm:spPr/>
+      <dgm:t>
+        <a:bodyPr/>
+        <a:lstStyle/>
+        <a:p>
+          <a:endParaRPr lang="es-AR"/>
+        </a:p>
+      </dgm:t>
     </dgm:pt>
     <dgm:pt modelId="{49209AC6-2E93-4812-BC92-F8809F087070}" type="pres">
-      <dgm:prSet presAssocID="{FF9F1C55-2091-412D-978D-952A963BFBC2}" presName="connTx" presStyleLbl="parChTrans1D3" presStyleIdx="9" presStyleCnt="20"/>
-      <dgm:spPr/>
+      <dgm:prSet presAssocID="{FF9F1C55-2091-412D-978D-952A963BFBC2}" presName="connTx" presStyleLbl="parChTrans1D3" presStyleIdx="9" presStyleCnt="21"/>
+      <dgm:spPr/>
+      <dgm:t>
+        <a:bodyPr/>
+        <a:lstStyle/>
+        <a:p>
+          <a:endParaRPr lang="es-AR"/>
+        </a:p>
+      </dgm:t>
     </dgm:pt>
     <dgm:pt modelId="{14F85FE0-99B6-4554-8C8C-B80783EC9C64}" type="pres">
       <dgm:prSet presAssocID="{C248B9FB-8E11-402F-ADA5-542892675409}" presName="root2" presStyleCnt="0"/>
       <dgm:spPr/>
     </dgm:pt>
     <dgm:pt modelId="{232E3FC3-F2E5-40D9-9802-02FEC26B0864}" type="pres">
-      <dgm:prSet presAssocID="{C248B9FB-8E11-402F-ADA5-542892675409}" presName="LevelTwoTextNode" presStyleLbl="node3" presStyleIdx="9" presStyleCnt="20" custLinFactX="200000" custLinFactY="331318" custLinFactNeighborX="213852" custLinFactNeighborY="400000">
+      <dgm:prSet presAssocID="{C248B9FB-8E11-402F-ADA5-542892675409}" presName="LevelTwoTextNode" presStyleLbl="node3" presStyleIdx="9" presStyleCnt="21" custLinFactX="200000" custLinFactY="331318" custLinFactNeighborX="213852" custLinFactNeighborY="400000">
         <dgm:presLayoutVars>
           <dgm:chPref val="3"/>
         </dgm:presLayoutVars>
       </dgm:prSet>
       <dgm:spPr/>
+      <dgm:t>
+        <a:bodyPr/>
+        <a:lstStyle/>
+        <a:p>
+          <a:endParaRPr lang="es-AR"/>
+        </a:p>
+      </dgm:t>
     </dgm:pt>
     <dgm:pt modelId="{91DE007A-6D8E-4311-9D70-D87BDD3AD315}" type="pres">
       <dgm:prSet presAssocID="{C248B9FB-8E11-402F-ADA5-542892675409}" presName="level3hierChild" presStyleCnt="0"/>
       <dgm:spPr/>
     </dgm:pt>
     <dgm:pt modelId="{A22484D8-88D9-4A8E-AD4D-366762E28902}" type="pres">
-      <dgm:prSet presAssocID="{33521470-74F2-4318-82F2-1221CE8185A0}" presName="conn2-1" presStyleLbl="parChTrans1D3" presStyleIdx="10" presStyleCnt="20"/>
-      <dgm:spPr/>
+      <dgm:prSet presAssocID="{33521470-74F2-4318-82F2-1221CE8185A0}" presName="conn2-1" presStyleLbl="parChTrans1D3" presStyleIdx="10" presStyleCnt="21"/>
+      <dgm:spPr/>
+      <dgm:t>
+        <a:bodyPr/>
+        <a:lstStyle/>
+        <a:p>
+          <a:endParaRPr lang="es-AR"/>
+        </a:p>
+      </dgm:t>
     </dgm:pt>
     <dgm:pt modelId="{74CCCE04-5B34-4268-9B28-31D835ABC869}" type="pres">
-      <dgm:prSet presAssocID="{33521470-74F2-4318-82F2-1221CE8185A0}" presName="connTx" presStyleLbl="parChTrans1D3" presStyleIdx="10" presStyleCnt="20"/>
-      <dgm:spPr/>
+      <dgm:prSet presAssocID="{33521470-74F2-4318-82F2-1221CE8185A0}" presName="connTx" presStyleLbl="parChTrans1D3" presStyleIdx="10" presStyleCnt="21"/>
+      <dgm:spPr/>
+      <dgm:t>
+        <a:bodyPr/>
+        <a:lstStyle/>
+        <a:p>
+          <a:endParaRPr lang="es-AR"/>
+        </a:p>
+      </dgm:t>
     </dgm:pt>
     <dgm:pt modelId="{DA6DD4B1-0B6F-4799-B570-6A8A5C1216AA}" type="pres">
       <dgm:prSet presAssocID="{22035727-4FFA-4769-9563-F7965264B9CE}" presName="root2" presStyleCnt="0"/>
       <dgm:spPr/>
     </dgm:pt>
     <dgm:pt modelId="{1F479AC0-84F6-4267-86ED-B588DB647B4D}" type="pres">
-      <dgm:prSet presAssocID="{22035727-4FFA-4769-9563-F7965264B9CE}" presName="LevelTwoTextNode" presStyleLbl="node3" presStyleIdx="10" presStyleCnt="20" custLinFactX="200000" custLinFactY="336282" custLinFactNeighborX="213852" custLinFactNeighborY="400000">
+      <dgm:prSet presAssocID="{22035727-4FFA-4769-9563-F7965264B9CE}" presName="LevelTwoTextNode" presStyleLbl="node3" presStyleIdx="10" presStyleCnt="21" custLinFactX="200000" custLinFactY="336282" custLinFactNeighborX="213852" custLinFactNeighborY="400000">
         <dgm:presLayoutVars>
           <dgm:chPref val="3"/>
         </dgm:presLayoutVars>
       </dgm:prSet>
       <dgm:spPr/>
+      <dgm:t>
+        <a:bodyPr/>
+        <a:lstStyle/>
+        <a:p>
+          <a:endParaRPr lang="es-AR"/>
+        </a:p>
+      </dgm:t>
     </dgm:pt>
     <dgm:pt modelId="{55545A84-BB6E-43BF-A839-D53A82F1F80F}" type="pres">
       <dgm:prSet presAssocID="{22035727-4FFA-4769-9563-F7965264B9CE}" presName="level3hierChild" presStyleCnt="0"/>
       <dgm:spPr/>
     </dgm:pt>
     <dgm:pt modelId="{38CBF0CF-DF9C-4635-8162-00C9EDAB6B38}" type="pres">
-      <dgm:prSet presAssocID="{7D533F1C-05DF-49C1-86C2-C5854F2819F0}" presName="conn2-1" presStyleLbl="parChTrans1D3" presStyleIdx="11" presStyleCnt="20"/>
-      <dgm:spPr/>
+      <dgm:prSet presAssocID="{7D533F1C-05DF-49C1-86C2-C5854F2819F0}" presName="conn2-1" presStyleLbl="parChTrans1D3" presStyleIdx="11" presStyleCnt="21"/>
+      <dgm:spPr/>
+      <dgm:t>
+        <a:bodyPr/>
+        <a:lstStyle/>
+        <a:p>
+          <a:endParaRPr lang="es-AR"/>
+        </a:p>
+      </dgm:t>
     </dgm:pt>
     <dgm:pt modelId="{0C747E17-E4F9-4CCB-A1B1-5520DBCC9CEF}" type="pres">
-      <dgm:prSet presAssocID="{7D533F1C-05DF-49C1-86C2-C5854F2819F0}" presName="connTx" presStyleLbl="parChTrans1D3" presStyleIdx="11" presStyleCnt="20"/>
-      <dgm:spPr/>
+      <dgm:prSet presAssocID="{7D533F1C-05DF-49C1-86C2-C5854F2819F0}" presName="connTx" presStyleLbl="parChTrans1D3" presStyleIdx="11" presStyleCnt="21"/>
+      <dgm:spPr/>
+      <dgm:t>
+        <a:bodyPr/>
+        <a:lstStyle/>
+        <a:p>
+          <a:endParaRPr lang="es-AR"/>
+        </a:p>
+      </dgm:t>
     </dgm:pt>
     <dgm:pt modelId="{9EB9600D-F3DC-4D91-890B-9E391D143DF7}" type="pres">
       <dgm:prSet presAssocID="{CDEA22CC-0557-4ECE-B3CB-113C00DE88B8}" presName="root2" presStyleCnt="0"/>
       <dgm:spPr/>
     </dgm:pt>
     <dgm:pt modelId="{0A8BD01C-70BE-4D22-8EBB-A96F19A9DB2C}" type="pres">
-      <dgm:prSet presAssocID="{CDEA22CC-0557-4ECE-B3CB-113C00DE88B8}" presName="LevelTwoTextNode" presStyleLbl="node3" presStyleIdx="11" presStyleCnt="20" custLinFactX="200000" custLinFactY="-22500" custLinFactNeighborX="213851" custLinFactNeighborY="-100000">
+      <dgm:prSet presAssocID="{CDEA22CC-0557-4ECE-B3CB-113C00DE88B8}" presName="LevelTwoTextNode" presStyleLbl="node3" presStyleIdx="11" presStyleCnt="21" custLinFactX="200000" custLinFactY="-22500" custLinFactNeighborX="213851" custLinFactNeighborY="-100000">
         <dgm:presLayoutVars>
           <dgm:chPref val="3"/>
         </dgm:presLayoutVars>
       </dgm:prSet>
       <dgm:spPr/>
+      <dgm:t>
+        <a:bodyPr/>
+        <a:lstStyle/>
+        <a:p>
+          <a:endParaRPr lang="es-AR"/>
+        </a:p>
+      </dgm:t>
     </dgm:pt>
     <dgm:pt modelId="{95FC34B3-EB01-42F8-A921-9616FF7A69CF}" type="pres">
       <dgm:prSet presAssocID="{CDEA22CC-0557-4ECE-B3CB-113C00DE88B8}" presName="level3hierChild" presStyleCnt="0"/>
       <dgm:spPr/>
     </dgm:pt>
     <dgm:pt modelId="{AB85DCB8-E6AC-46D8-AA7D-EF2B5135B688}" type="pres">
-      <dgm:prSet presAssocID="{87660166-6C27-48D1-9BE6-02BDDECD0139}" presName="conn2-1" presStyleLbl="parChTrans1D3" presStyleIdx="12" presStyleCnt="20"/>
-      <dgm:spPr/>
+      <dgm:prSet presAssocID="{87660166-6C27-48D1-9BE6-02BDDECD0139}" presName="conn2-1" presStyleLbl="parChTrans1D3" presStyleIdx="12" presStyleCnt="21"/>
+      <dgm:spPr/>
+      <dgm:t>
+        <a:bodyPr/>
+        <a:lstStyle/>
+        <a:p>
+          <a:endParaRPr lang="es-AR"/>
+        </a:p>
+      </dgm:t>
     </dgm:pt>
     <dgm:pt modelId="{76D37528-8758-462F-9A24-15F4E7D03C7C}" type="pres">
-      <dgm:prSet presAssocID="{87660166-6C27-48D1-9BE6-02BDDECD0139}" presName="connTx" presStyleLbl="parChTrans1D3" presStyleIdx="12" presStyleCnt="20"/>
-      <dgm:spPr/>
+      <dgm:prSet presAssocID="{87660166-6C27-48D1-9BE6-02BDDECD0139}" presName="connTx" presStyleLbl="parChTrans1D3" presStyleIdx="12" presStyleCnt="21"/>
+      <dgm:spPr/>
+      <dgm:t>
+        <a:bodyPr/>
+        <a:lstStyle/>
+        <a:p>
+          <a:endParaRPr lang="es-AR"/>
+        </a:p>
+      </dgm:t>
     </dgm:pt>
     <dgm:pt modelId="{7D2DCFDA-0378-426C-A275-969B67938103}" type="pres">
       <dgm:prSet presAssocID="{E935FE52-05D6-4140-AF32-6115C89279B0}" presName="root2" presStyleCnt="0"/>
       <dgm:spPr/>
     </dgm:pt>
     <dgm:pt modelId="{66457418-62B0-4CF7-8E2D-C279A9219CDE}" type="pres">
-      <dgm:prSet presAssocID="{E935FE52-05D6-4140-AF32-6115C89279B0}" presName="LevelTwoTextNode" presStyleLbl="node3" presStyleIdx="12" presStyleCnt="20" custLinFactX="-105937" custLinFactNeighborX="-200000" custLinFactNeighborY="-69549">
+      <dgm:prSet presAssocID="{E935FE52-05D6-4140-AF32-6115C89279B0}" presName="LevelTwoTextNode" presStyleLbl="node3" presStyleIdx="12" presStyleCnt="21" custLinFactX="-105937" custLinFactNeighborX="-200000" custLinFactNeighborY="-69549">
         <dgm:presLayoutVars>
           <dgm:chPref val="3"/>
         </dgm:presLayoutVars>
       </dgm:prSet>
       <dgm:spPr/>
+      <dgm:t>
+        <a:bodyPr/>
+        <a:lstStyle/>
+        <a:p>
+          <a:endParaRPr lang="es-AR"/>
+        </a:p>
+      </dgm:t>
     </dgm:pt>
     <dgm:pt modelId="{E0763076-ABFD-4672-84C4-6E4902E788CD}" type="pres">
       <dgm:prSet presAssocID="{E935FE52-05D6-4140-AF32-6115C89279B0}" presName="level3hierChild" presStyleCnt="0"/>
       <dgm:spPr/>
     </dgm:pt>
     <dgm:pt modelId="{4EAF1BA9-1E2E-42D0-8B45-203DE822089C}" type="pres">
-      <dgm:prSet presAssocID="{8A89CF52-8451-401A-AB86-A242D7054C01}" presName="conn2-1" presStyleLbl="parChTrans1D3" presStyleIdx="13" presStyleCnt="20"/>
-      <dgm:spPr/>
+      <dgm:prSet presAssocID="{8A89CF52-8451-401A-AB86-A242D7054C01}" presName="conn2-1" presStyleLbl="parChTrans1D3" presStyleIdx="13" presStyleCnt="21"/>
+      <dgm:spPr/>
+      <dgm:t>
+        <a:bodyPr/>
+        <a:lstStyle/>
+        <a:p>
+          <a:endParaRPr lang="es-AR"/>
+        </a:p>
+      </dgm:t>
     </dgm:pt>
     <dgm:pt modelId="{42996DB6-E9C4-4D9D-95DC-39E2177AF04C}" type="pres">
-      <dgm:prSet presAssocID="{8A89CF52-8451-401A-AB86-A242D7054C01}" presName="connTx" presStyleLbl="parChTrans1D3" presStyleIdx="13" presStyleCnt="20"/>
-      <dgm:spPr/>
+      <dgm:prSet presAssocID="{8A89CF52-8451-401A-AB86-A242D7054C01}" presName="connTx" presStyleLbl="parChTrans1D3" presStyleIdx="13" presStyleCnt="21"/>
+      <dgm:spPr/>
+      <dgm:t>
+        <a:bodyPr/>
+        <a:lstStyle/>
+        <a:p>
+          <a:endParaRPr lang="es-AR"/>
+        </a:p>
+      </dgm:t>
     </dgm:pt>
     <dgm:pt modelId="{60EFDE43-8261-458C-8919-FDA90254DF6E}" type="pres">
       <dgm:prSet presAssocID="{A04F90A2-598C-44D1-B0E3-E7776018B23D}" presName="root2" presStyleCnt="0"/>
       <dgm:spPr/>
     </dgm:pt>
     <dgm:pt modelId="{42963CEA-510C-416E-ACE7-36D08610952E}" type="pres">
-      <dgm:prSet presAssocID="{A04F90A2-598C-44D1-B0E3-E7776018B23D}" presName="LevelTwoTextNode" presStyleLbl="node3" presStyleIdx="13" presStyleCnt="20" custLinFactX="-105937" custLinFactNeighborX="-200000" custLinFactNeighborY="-64584">
+      <dgm:prSet presAssocID="{A04F90A2-598C-44D1-B0E3-E7776018B23D}" presName="LevelTwoTextNode" presStyleLbl="node3" presStyleIdx="13" presStyleCnt="21" custLinFactX="-105937" custLinFactNeighborX="-200000" custLinFactNeighborY="-64584">
         <dgm:presLayoutVars>
           <dgm:chPref val="3"/>
         </dgm:presLayoutVars>
       </dgm:prSet>
       <dgm:spPr/>
+      <dgm:t>
+        <a:bodyPr/>
+        <a:lstStyle/>
+        <a:p>
+          <a:endParaRPr lang="es-AR"/>
+        </a:p>
+      </dgm:t>
     </dgm:pt>
     <dgm:pt modelId="{99177CBA-A2D8-4715-BB16-0C99346CB734}" type="pres">
       <dgm:prSet presAssocID="{A04F90A2-598C-44D1-B0E3-E7776018B23D}" presName="level3hierChild" presStyleCnt="0"/>
       <dgm:spPr/>
     </dgm:pt>
     <dgm:pt modelId="{C847FA65-0B37-4E52-A63B-4CDD4ED59FCA}" type="pres">
-      <dgm:prSet presAssocID="{95C69F40-CCE5-4DB6-A0E1-6455B56639C0}" presName="conn2-1" presStyleLbl="parChTrans1D3" presStyleIdx="14" presStyleCnt="20"/>
-      <dgm:spPr/>
+      <dgm:prSet presAssocID="{95C69F40-CCE5-4DB6-A0E1-6455B56639C0}" presName="conn2-1" presStyleLbl="parChTrans1D3" presStyleIdx="14" presStyleCnt="21"/>
+      <dgm:spPr/>
+      <dgm:t>
+        <a:bodyPr/>
+        <a:lstStyle/>
+        <a:p>
+          <a:endParaRPr lang="es-AR"/>
+        </a:p>
+      </dgm:t>
     </dgm:pt>
     <dgm:pt modelId="{6B9E54D5-136F-4A04-B8E1-6DF53875F682}" type="pres">
-      <dgm:prSet presAssocID="{95C69F40-CCE5-4DB6-A0E1-6455B56639C0}" presName="connTx" presStyleLbl="parChTrans1D3" presStyleIdx="14" presStyleCnt="20"/>
-      <dgm:spPr/>
+      <dgm:prSet presAssocID="{95C69F40-CCE5-4DB6-A0E1-6455B56639C0}" presName="connTx" presStyleLbl="parChTrans1D3" presStyleIdx="14" presStyleCnt="21"/>
+      <dgm:spPr/>
+      <dgm:t>
+        <a:bodyPr/>
+        <a:lstStyle/>
+        <a:p>
+          <a:endParaRPr lang="es-AR"/>
+        </a:p>
+      </dgm:t>
     </dgm:pt>
     <dgm:pt modelId="{7612F635-A426-43BF-8A1E-559D13074D33}" type="pres">
       <dgm:prSet presAssocID="{B2C3B80E-ED8F-43C0-A8F5-626D22BB61A3}" presName="root2" presStyleCnt="0"/>
       <dgm:spPr/>
     </dgm:pt>
     <dgm:pt modelId="{B7091056-F701-4AF7-B6E3-D1841F080D69}" type="pres">
-      <dgm:prSet presAssocID="{B2C3B80E-ED8F-43C0-A8F5-626D22BB61A3}" presName="LevelTwoTextNode" presStyleLbl="node3" presStyleIdx="14" presStyleCnt="20" custLinFactX="-165919" custLinFactY="100000" custLinFactNeighborX="-200000" custLinFactNeighborY="104303">
+      <dgm:prSet presAssocID="{B2C3B80E-ED8F-43C0-A8F5-626D22BB61A3}" presName="LevelTwoTextNode" presStyleLbl="node3" presStyleIdx="14" presStyleCnt="21" custLinFactX="-165919" custLinFactY="100000" custLinFactNeighborX="-200000" custLinFactNeighborY="104303">
         <dgm:presLayoutVars>
           <dgm:chPref val="3"/>
         </dgm:presLayoutVars>
       </dgm:prSet>
       <dgm:spPr/>
+      <dgm:t>
+        <a:bodyPr/>
+        <a:lstStyle/>
+        <a:p>
+          <a:endParaRPr lang="es-AR"/>
+        </a:p>
+      </dgm:t>
     </dgm:pt>
     <dgm:pt modelId="{52132C01-0DA7-4A30-9E17-341DCB9FB311}" type="pres">
       <dgm:prSet presAssocID="{B2C3B80E-ED8F-43C0-A8F5-626D22BB61A3}" presName="level3hierChild" presStyleCnt="0"/>
       <dgm:spPr/>
     </dgm:pt>
     <dgm:pt modelId="{D9FA3899-4C64-444A-8515-340B7EF42440}" type="pres">
-      <dgm:prSet presAssocID="{050844DA-3DD7-4728-95B2-337567902959}" presName="conn2-1" presStyleLbl="parChTrans1D3" presStyleIdx="15" presStyleCnt="20"/>
-      <dgm:spPr/>
+      <dgm:prSet presAssocID="{050844DA-3DD7-4728-95B2-337567902959}" presName="conn2-1" presStyleLbl="parChTrans1D3" presStyleIdx="15" presStyleCnt="21"/>
+      <dgm:spPr/>
+      <dgm:t>
+        <a:bodyPr/>
+        <a:lstStyle/>
+        <a:p>
+          <a:endParaRPr lang="es-AR"/>
+        </a:p>
+      </dgm:t>
     </dgm:pt>
     <dgm:pt modelId="{58C6AA60-6F3B-40DB-9946-76A58571817F}" type="pres">
-      <dgm:prSet presAssocID="{050844DA-3DD7-4728-95B2-337567902959}" presName="connTx" presStyleLbl="parChTrans1D3" presStyleIdx="15" presStyleCnt="20"/>
-      <dgm:spPr/>
+      <dgm:prSet presAssocID="{050844DA-3DD7-4728-95B2-337567902959}" presName="connTx" presStyleLbl="parChTrans1D3" presStyleIdx="15" presStyleCnt="21"/>
+      <dgm:spPr/>
+      <dgm:t>
+        <a:bodyPr/>
+        <a:lstStyle/>
+        <a:p>
+          <a:endParaRPr lang="es-AR"/>
+        </a:p>
+      </dgm:t>
     </dgm:pt>
     <dgm:pt modelId="{A40542FA-83EF-4C80-952A-092D45A110BB}" type="pres">
       <dgm:prSet presAssocID="{297FDFBD-810F-41DF-8509-3C7305003CFE}" presName="root2" presStyleCnt="0"/>
       <dgm:spPr/>
     </dgm:pt>
     <dgm:pt modelId="{9F07CD4A-318D-4205-B8A7-B8254F09A4FF}" type="pres">
-      <dgm:prSet presAssocID="{297FDFBD-810F-41DF-8509-3C7305003CFE}" presName="LevelTwoTextNode" presStyleLbl="node3" presStyleIdx="15" presStyleCnt="20" custLinFactX="-165919" custLinFactY="100000" custLinFactNeighborX="-200000" custLinFactNeighborY="109268">
+      <dgm:prSet presAssocID="{297FDFBD-810F-41DF-8509-3C7305003CFE}" presName="LevelTwoTextNode" presStyleLbl="node3" presStyleIdx="15" presStyleCnt="21" custLinFactX="-165919" custLinFactY="100000" custLinFactNeighborX="-200000" custLinFactNeighborY="109268">
         <dgm:presLayoutVars>
           <dgm:chPref val="3"/>
         </dgm:presLayoutVars>
       </dgm:prSet>
       <dgm:spPr/>
+      <dgm:t>
+        <a:bodyPr/>
+        <a:lstStyle/>
+        <a:p>
+          <a:endParaRPr lang="es-AR"/>
+        </a:p>
+      </dgm:t>
     </dgm:pt>
     <dgm:pt modelId="{884B0204-59EC-4C86-B82A-34AB4BF04212}" type="pres">
       <dgm:prSet presAssocID="{297FDFBD-810F-41DF-8509-3C7305003CFE}" presName="level3hierChild" presStyleCnt="0"/>
       <dgm:spPr/>
     </dgm:pt>
     <dgm:pt modelId="{2B11C088-24B1-4E33-894C-0C75E2725FF1}" type="pres">
-      <dgm:prSet presAssocID="{483EA5FF-3DBC-44B4-9E11-A222E6E70FFE}" presName="conn2-1" presStyleLbl="parChTrans1D3" presStyleIdx="16" presStyleCnt="20"/>
-      <dgm:spPr/>
+      <dgm:prSet presAssocID="{483EA5FF-3DBC-44B4-9E11-A222E6E70FFE}" presName="conn2-1" presStyleLbl="parChTrans1D3" presStyleIdx="16" presStyleCnt="21"/>
+      <dgm:spPr/>
+      <dgm:t>
+        <a:bodyPr/>
+        <a:lstStyle/>
+        <a:p>
+          <a:endParaRPr lang="es-AR"/>
+        </a:p>
+      </dgm:t>
     </dgm:pt>
     <dgm:pt modelId="{C991F14E-1E6A-4E8F-A6E3-D4D7572941DD}" type="pres">
-      <dgm:prSet presAssocID="{483EA5FF-3DBC-44B4-9E11-A222E6E70FFE}" presName="connTx" presStyleLbl="parChTrans1D3" presStyleIdx="16" presStyleCnt="20"/>
-      <dgm:spPr/>
+      <dgm:prSet presAssocID="{483EA5FF-3DBC-44B4-9E11-A222E6E70FFE}" presName="connTx" presStyleLbl="parChTrans1D3" presStyleIdx="16" presStyleCnt="21"/>
+      <dgm:spPr/>
+      <dgm:t>
+        <a:bodyPr/>
+        <a:lstStyle/>
+        <a:p>
+          <a:endParaRPr lang="es-AR"/>
+        </a:p>
+      </dgm:t>
     </dgm:pt>
     <dgm:pt modelId="{6ECA1B46-3B1F-46BB-BEB2-1C30406F133D}" type="pres">
       <dgm:prSet presAssocID="{997D802B-EDA6-426A-A593-87509BA2B754}" presName="root2" presStyleCnt="0"/>
       <dgm:spPr/>
     </dgm:pt>
     <dgm:pt modelId="{89A9170F-394A-46D3-BEE1-B36921F6E1C6}" type="pres">
-      <dgm:prSet presAssocID="{997D802B-EDA6-426A-A593-87509BA2B754}" presName="LevelTwoTextNode" presStyleLbl="node3" presStyleIdx="16" presStyleCnt="20" custLinFactY="-100000" custLinFactNeighborX="-6024" custLinFactNeighborY="-117641">
+      <dgm:prSet presAssocID="{997D802B-EDA6-426A-A593-87509BA2B754}" presName="LevelTwoTextNode" presStyleLbl="node3" presStyleIdx="16" presStyleCnt="21" custLinFactY="-100000" custLinFactNeighborX="-6024" custLinFactNeighborY="-117641">
         <dgm:presLayoutVars>
           <dgm:chPref val="3"/>
         </dgm:presLayoutVars>
       </dgm:prSet>
       <dgm:spPr/>
+      <dgm:t>
+        <a:bodyPr/>
+        <a:lstStyle/>
+        <a:p>
+          <a:endParaRPr lang="es-AR"/>
+        </a:p>
+      </dgm:t>
     </dgm:pt>
     <dgm:pt modelId="{A30014BD-86F7-44A6-A63F-6D274212635F}" type="pres">
       <dgm:prSet presAssocID="{997D802B-EDA6-426A-A593-87509BA2B754}" presName="level3hierChild" presStyleCnt="0"/>
       <dgm:spPr/>
     </dgm:pt>
     <dgm:pt modelId="{FDBCCBDA-7886-4198-A550-D751C46FBF9D}" type="pres">
-      <dgm:prSet presAssocID="{E8D2DC6D-1D84-4535-AE7F-FD3683FD5774}" presName="conn2-1" presStyleLbl="parChTrans1D3" presStyleIdx="17" presStyleCnt="20"/>
-      <dgm:spPr/>
+      <dgm:prSet presAssocID="{E8D2DC6D-1D84-4535-AE7F-FD3683FD5774}" presName="conn2-1" presStyleLbl="parChTrans1D3" presStyleIdx="17" presStyleCnt="21"/>
+      <dgm:spPr/>
+      <dgm:t>
+        <a:bodyPr/>
+        <a:lstStyle/>
+        <a:p>
+          <a:endParaRPr lang="es-AR"/>
+        </a:p>
+      </dgm:t>
     </dgm:pt>
     <dgm:pt modelId="{6BC97E7D-2A52-423C-8E1D-64FAC781C55A}" type="pres">
-      <dgm:prSet presAssocID="{E8D2DC6D-1D84-4535-AE7F-FD3683FD5774}" presName="connTx" presStyleLbl="parChTrans1D3" presStyleIdx="17" presStyleCnt="20"/>
-      <dgm:spPr/>
+      <dgm:prSet presAssocID="{E8D2DC6D-1D84-4535-AE7F-FD3683FD5774}" presName="connTx" presStyleLbl="parChTrans1D3" presStyleIdx="17" presStyleCnt="21"/>
+      <dgm:spPr/>
+      <dgm:t>
+        <a:bodyPr/>
+        <a:lstStyle/>
+        <a:p>
+          <a:endParaRPr lang="es-AR"/>
+        </a:p>
+      </dgm:t>
     </dgm:pt>
     <dgm:pt modelId="{4979C86C-5959-49AE-BAD3-73C4F5C0427F}" type="pres">
       <dgm:prSet presAssocID="{CD0CBE9E-BC2C-431D-BDB8-A31C42AE0489}" presName="root2" presStyleCnt="0"/>
       <dgm:spPr/>
     </dgm:pt>
     <dgm:pt modelId="{5DDE389C-DAA1-4E94-8130-EE2EA40B9C82}" type="pres">
-      <dgm:prSet presAssocID="{CD0CBE9E-BC2C-431D-BDB8-A31C42AE0489}" presName="LevelTwoTextNode" presStyleLbl="node3" presStyleIdx="17" presStyleCnt="20" custLinFactY="-100000" custLinFactNeighborX="-6024" custLinFactNeighborY="-112676">
+      <dgm:prSet presAssocID="{CD0CBE9E-BC2C-431D-BDB8-A31C42AE0489}" presName="LevelTwoTextNode" presStyleLbl="node3" presStyleIdx="17" presStyleCnt="21" custLinFactY="-100000" custLinFactNeighborX="-6024" custLinFactNeighborY="-112676">
         <dgm:presLayoutVars>
           <dgm:chPref val="3"/>
         </dgm:presLayoutVars>
       </dgm:prSet>
       <dgm:spPr/>
+      <dgm:t>
+        <a:bodyPr/>
+        <a:lstStyle/>
+        <a:p>
+          <a:endParaRPr lang="es-AR"/>
+        </a:p>
+      </dgm:t>
     </dgm:pt>
     <dgm:pt modelId="{F248A321-8DF9-4DE5-AE85-1A46FE2473C4}" type="pres">
       <dgm:prSet presAssocID="{CD0CBE9E-BC2C-431D-BDB8-A31C42AE0489}" presName="level3hierChild" presStyleCnt="0"/>
@@ -2386,10 +2924,24 @@
     <dgm:pt modelId="{31CC053B-4DB5-43B5-8E3D-F683C9733F04}" type="pres">
       <dgm:prSet presAssocID="{BD596FC2-8073-487C-A373-8B4252B3D9C4}" presName="conn2-1" presStyleLbl="parChTrans1D2" presStyleIdx="1" presStyleCnt="2"/>
       <dgm:spPr/>
+      <dgm:t>
+        <a:bodyPr/>
+        <a:lstStyle/>
+        <a:p>
+          <a:endParaRPr lang="es-AR"/>
+        </a:p>
+      </dgm:t>
     </dgm:pt>
     <dgm:pt modelId="{2EA2EF79-8EF4-4A77-9318-2B0FD30C1AAB}" type="pres">
       <dgm:prSet presAssocID="{BD596FC2-8073-487C-A373-8B4252B3D9C4}" presName="connTx" presStyleLbl="parChTrans1D2" presStyleIdx="1" presStyleCnt="2"/>
       <dgm:spPr/>
+      <dgm:t>
+        <a:bodyPr/>
+        <a:lstStyle/>
+        <a:p>
+          <a:endParaRPr lang="es-AR"/>
+        </a:p>
+      </dgm:t>
     </dgm:pt>
     <dgm:pt modelId="{A4C478D0-6B73-4839-A358-1C4667665F35}" type="pres">
       <dgm:prSet presAssocID="{194C1557-6784-4DAD-854A-7221EFB03390}" presName="root2" presStyleCnt="0"/>
@@ -2402,152 +2954,257 @@
         </dgm:presLayoutVars>
       </dgm:prSet>
       <dgm:spPr/>
+      <dgm:t>
+        <a:bodyPr/>
+        <a:lstStyle/>
+        <a:p>
+          <a:endParaRPr lang="es-AR"/>
+        </a:p>
+      </dgm:t>
     </dgm:pt>
     <dgm:pt modelId="{CB54DBE0-3FAC-4B06-89D8-EE85B26A73C9}" type="pres">
       <dgm:prSet presAssocID="{194C1557-6784-4DAD-854A-7221EFB03390}" presName="level3hierChild" presStyleCnt="0"/>
       <dgm:spPr/>
     </dgm:pt>
-    <dgm:pt modelId="{C12856FC-6BF0-4829-B1C1-892941F7788F}" type="pres">
-      <dgm:prSet presAssocID="{A9425E43-8565-4DC1-ADF9-A6F6CC5FAE09}" presName="conn2-1" presStyleLbl="parChTrans1D3" presStyleIdx="18" presStyleCnt="20"/>
-      <dgm:spPr/>
-    </dgm:pt>
-    <dgm:pt modelId="{814E44F4-CF24-4219-8005-96C32DF3E2B5}" type="pres">
-      <dgm:prSet presAssocID="{A9425E43-8565-4DC1-ADF9-A6F6CC5FAE09}" presName="connTx" presStyleLbl="parChTrans1D3" presStyleIdx="18" presStyleCnt="20"/>
-      <dgm:spPr/>
-    </dgm:pt>
-    <dgm:pt modelId="{8931E7B8-4680-4E02-83D2-0613815CC72E}" type="pres">
-      <dgm:prSet presAssocID="{6C7C46CA-6D81-42A3-8942-427BC01E9410}" presName="root2" presStyleCnt="0"/>
-      <dgm:spPr/>
-    </dgm:pt>
-    <dgm:pt modelId="{B7265FB0-AFB2-4500-9131-FCDF39A72713}" type="pres">
-      <dgm:prSet presAssocID="{6C7C46CA-6D81-42A3-8942-427BC01E9410}" presName="LevelTwoTextNode" presStyleLbl="node3" presStyleIdx="18" presStyleCnt="20" custLinFactX="-257863" custLinFactY="-100000" custLinFactNeighborX="-300000" custLinFactNeighborY="-131704">
+    <dgm:pt modelId="{60CF692B-2C90-486F-8E39-2CE7219D0895}" type="pres">
+      <dgm:prSet presAssocID="{49F7A883-E0C2-4FDE-A76C-3D8814586340}" presName="conn2-1" presStyleLbl="parChTrans1D3" presStyleIdx="18" presStyleCnt="21"/>
+      <dgm:spPr/>
+    </dgm:pt>
+    <dgm:pt modelId="{8FEE4A9A-8969-4DEB-9713-07A7DBD115B7}" type="pres">
+      <dgm:prSet presAssocID="{49F7A883-E0C2-4FDE-A76C-3D8814586340}" presName="connTx" presStyleLbl="parChTrans1D3" presStyleIdx="18" presStyleCnt="21"/>
+      <dgm:spPr/>
+    </dgm:pt>
+    <dgm:pt modelId="{D13AD490-B77D-4D86-8102-BEF7937998BE}" type="pres">
+      <dgm:prSet presAssocID="{0DA65A98-3B9E-4210-AB71-1310F25DC60B}" presName="root2" presStyleCnt="0"/>
+      <dgm:spPr/>
+    </dgm:pt>
+    <dgm:pt modelId="{5EA884E9-6CF9-4789-8B3C-CDC614F4DD67}" type="pres">
+      <dgm:prSet presAssocID="{0DA65A98-3B9E-4210-AB71-1310F25DC60B}" presName="LevelTwoTextNode" presStyleLbl="node3" presStyleIdx="18" presStyleCnt="21" custLinFactX="-208870" custLinFactY="-100000" custLinFactNeighborX="-300000" custLinFactNeighborY="-157565">
         <dgm:presLayoutVars>
           <dgm:chPref val="3"/>
         </dgm:presLayoutVars>
       </dgm:prSet>
       <dgm:spPr/>
-    </dgm:pt>
-    <dgm:pt modelId="{CE6A6E74-D0CC-4A33-8A35-E39019D876AC}" type="pres">
-      <dgm:prSet presAssocID="{6C7C46CA-6D81-42A3-8942-427BC01E9410}" presName="level3hierChild" presStyleCnt="0"/>
-      <dgm:spPr/>
-    </dgm:pt>
-    <dgm:pt modelId="{F2BBC305-1F87-4F4E-82A1-C05C2963265B}" type="pres">
-      <dgm:prSet presAssocID="{277A48CB-99E3-48D6-84D3-364683E617B8}" presName="conn2-1" presStyleLbl="parChTrans1D3" presStyleIdx="19" presStyleCnt="20"/>
-      <dgm:spPr/>
-    </dgm:pt>
-    <dgm:pt modelId="{BE508878-67FD-4AA5-8674-45DE5876D25E}" type="pres">
-      <dgm:prSet presAssocID="{277A48CB-99E3-48D6-84D3-364683E617B8}" presName="connTx" presStyleLbl="parChTrans1D3" presStyleIdx="19" presStyleCnt="20"/>
-      <dgm:spPr/>
-    </dgm:pt>
-    <dgm:pt modelId="{B0CE3E55-896F-4ACF-8207-F706A390225C}" type="pres">
-      <dgm:prSet presAssocID="{F0A24312-BBA6-4924-A7C3-28FB7B93680F}" presName="root2" presStyleCnt="0"/>
-      <dgm:spPr/>
-    </dgm:pt>
-    <dgm:pt modelId="{812D9E0E-28E0-47F2-9168-168FE96C4119}" type="pres">
-      <dgm:prSet presAssocID="{F0A24312-BBA6-4924-A7C3-28FB7B93680F}" presName="LevelTwoTextNode" presStyleLbl="node3" presStyleIdx="19" presStyleCnt="20" custLinFactX="-257863" custLinFactY="-78753" custLinFactNeighborX="-300000" custLinFactNeighborY="-100000">
+      <dgm:t>
+        <a:bodyPr/>
+        <a:lstStyle/>
+        <a:p>
+          <a:endParaRPr lang="es-AR"/>
+        </a:p>
+      </dgm:t>
+    </dgm:pt>
+    <dgm:pt modelId="{CAB0091C-6349-4F9B-8FEE-5BD77022D61B}" type="pres">
+      <dgm:prSet presAssocID="{0DA65A98-3B9E-4210-AB71-1310F25DC60B}" presName="level3hierChild" presStyleCnt="0"/>
+      <dgm:spPr/>
+    </dgm:pt>
+    <dgm:pt modelId="{8CD6D8AF-8F64-4643-93A2-B802E9D13D18}" type="pres">
+      <dgm:prSet presAssocID="{46FA7E0D-038B-4CAB-9B4A-93D957032341}" presName="conn2-1" presStyleLbl="parChTrans1D3" presStyleIdx="19" presStyleCnt="21"/>
+      <dgm:spPr/>
+    </dgm:pt>
+    <dgm:pt modelId="{B6CD9049-C3B5-471D-86D3-57BE215BD645}" type="pres">
+      <dgm:prSet presAssocID="{46FA7E0D-038B-4CAB-9B4A-93D957032341}" presName="connTx" presStyleLbl="parChTrans1D3" presStyleIdx="19" presStyleCnt="21"/>
+      <dgm:spPr/>
+    </dgm:pt>
+    <dgm:pt modelId="{ACED0CC2-5142-4391-A974-C8A1DA828F97}" type="pres">
+      <dgm:prSet presAssocID="{B681251F-B137-43B5-A667-00AA8F1FB373}" presName="root2" presStyleCnt="0"/>
+      <dgm:spPr/>
+    </dgm:pt>
+    <dgm:pt modelId="{C7034579-8E80-4D1A-BF61-A57342567F4C}" type="pres">
+      <dgm:prSet presAssocID="{B681251F-B137-43B5-A667-00AA8F1FB373}" presName="LevelTwoTextNode" presStyleLbl="node3" presStyleIdx="19" presStyleCnt="21" custLinFactX="-231425" custLinFactY="-100000" custLinFactNeighborX="-300000" custLinFactNeighborY="-164617">
         <dgm:presLayoutVars>
           <dgm:chPref val="3"/>
         </dgm:presLayoutVars>
       </dgm:prSet>
       <dgm:spPr/>
+      <dgm:t>
+        <a:bodyPr/>
+        <a:lstStyle/>
+        <a:p>
+          <a:endParaRPr lang="es-AR"/>
+        </a:p>
+      </dgm:t>
+    </dgm:pt>
+    <dgm:pt modelId="{EC24ED2B-C39A-45D2-9A5B-0FC8DFBD2AF2}" type="pres">
+      <dgm:prSet presAssocID="{B681251F-B137-43B5-A667-00AA8F1FB373}" presName="level3hierChild" presStyleCnt="0"/>
+      <dgm:spPr/>
+    </dgm:pt>
+    <dgm:pt modelId="{F2BBC305-1F87-4F4E-82A1-C05C2963265B}" type="pres">
+      <dgm:prSet presAssocID="{277A48CB-99E3-48D6-84D3-364683E617B8}" presName="conn2-1" presStyleLbl="parChTrans1D3" presStyleIdx="20" presStyleCnt="21"/>
+      <dgm:spPr/>
+      <dgm:t>
+        <a:bodyPr/>
+        <a:lstStyle/>
+        <a:p>
+          <a:endParaRPr lang="es-AR"/>
+        </a:p>
+      </dgm:t>
+    </dgm:pt>
+    <dgm:pt modelId="{BE508878-67FD-4AA5-8674-45DE5876D25E}" type="pres">
+      <dgm:prSet presAssocID="{277A48CB-99E3-48D6-84D3-364683E617B8}" presName="connTx" presStyleLbl="parChTrans1D3" presStyleIdx="20" presStyleCnt="21"/>
+      <dgm:spPr/>
+      <dgm:t>
+        <a:bodyPr/>
+        <a:lstStyle/>
+        <a:p>
+          <a:endParaRPr lang="es-AR"/>
+        </a:p>
+      </dgm:t>
+    </dgm:pt>
+    <dgm:pt modelId="{B0CE3E55-896F-4ACF-8207-F706A390225C}" type="pres">
+      <dgm:prSet presAssocID="{F0A24312-BBA6-4924-A7C3-28FB7B93680F}" presName="root2" presStyleCnt="0"/>
+      <dgm:spPr/>
+    </dgm:pt>
+    <dgm:pt modelId="{812D9E0E-28E0-47F2-9168-168FE96C4119}" type="pres">
+      <dgm:prSet presAssocID="{F0A24312-BBA6-4924-A7C3-28FB7B93680F}" presName="LevelTwoTextNode" presStyleLbl="node3" presStyleIdx="20" presStyleCnt="21" custLinFactX="-257863" custLinFactY="-78753" custLinFactNeighborX="-300000" custLinFactNeighborY="-100000">
+        <dgm:presLayoutVars>
+          <dgm:chPref val="3"/>
+        </dgm:presLayoutVars>
+      </dgm:prSet>
+      <dgm:spPr/>
+      <dgm:t>
+        <a:bodyPr/>
+        <a:lstStyle/>
+        <a:p>
+          <a:endParaRPr lang="es-AR"/>
+        </a:p>
+      </dgm:t>
     </dgm:pt>
     <dgm:pt modelId="{6943FCDA-5AB1-4BA5-8BF8-211A7C71A0EC}" type="pres">
       <dgm:prSet presAssocID="{F0A24312-BBA6-4924-A7C3-28FB7B93680F}" presName="level3hierChild" presStyleCnt="0"/>
       <dgm:spPr/>
     </dgm:pt>
+    <dgm:pt modelId="{3AE51C82-790C-4B64-BD8C-E0C6D5D6D7D3}" type="pres">
+      <dgm:prSet presAssocID="{BF5281B7-3993-4038-BB99-9C6864923CDB}" presName="conn2-1" presStyleLbl="parChTrans1D4" presStyleIdx="0" presStyleCnt="1"/>
+      <dgm:spPr/>
+    </dgm:pt>
+    <dgm:pt modelId="{FE25965E-845F-40E9-B329-0B5C5BCFC4D0}" type="pres">
+      <dgm:prSet presAssocID="{BF5281B7-3993-4038-BB99-9C6864923CDB}" presName="connTx" presStyleLbl="parChTrans1D4" presStyleIdx="0" presStyleCnt="1"/>
+      <dgm:spPr/>
+    </dgm:pt>
+    <dgm:pt modelId="{E73FF2D6-CE3F-45CF-BF38-871045C7A583}" type="pres">
+      <dgm:prSet presAssocID="{4FE86403-F480-4CF2-B5CA-BBE69841C37F}" presName="root2" presStyleCnt="0"/>
+      <dgm:spPr/>
+    </dgm:pt>
+    <dgm:pt modelId="{A07D77F0-DAFA-4A72-8540-07774004A2FC}" type="pres">
+      <dgm:prSet presAssocID="{4FE86403-F480-4CF2-B5CA-BBE69841C37F}" presName="LevelTwoTextNode" presStyleLbl="node4" presStyleIdx="0" presStyleCnt="1" custLinFactX="-200000" custLinFactNeighborX="-275304" custLinFactNeighborY="-65804">
+        <dgm:presLayoutVars>
+          <dgm:chPref val="3"/>
+        </dgm:presLayoutVars>
+      </dgm:prSet>
+      <dgm:spPr/>
+      <dgm:t>
+        <a:bodyPr/>
+        <a:lstStyle/>
+        <a:p>
+          <a:endParaRPr lang="es-AR"/>
+        </a:p>
+      </dgm:t>
+    </dgm:pt>
+    <dgm:pt modelId="{DBA1B4CA-8859-43F8-AEC3-B0C1A2379E93}" type="pres">
+      <dgm:prSet presAssocID="{4FE86403-F480-4CF2-B5CA-BBE69841C37F}" presName="level3hierChild" presStyleCnt="0"/>
+      <dgm:spPr/>
+    </dgm:pt>
   </dgm:ptLst>
   <dgm:cxnLst>
+    <dgm:cxn modelId="{ED6AA186-21AB-4627-A8FE-D7CB07CF7BEC}" type="presOf" srcId="{E935FE52-05D6-4140-AF32-6115C89279B0}" destId="{66457418-62B0-4CF7-8E2D-C279A9219CDE}" srcOrd="0" destOrd="0" presId="urn:microsoft.com/office/officeart/2005/8/layout/hierarchy2"/>
+    <dgm:cxn modelId="{C12BF986-AFA5-4F93-8A65-CB3FA95B12BE}" type="presOf" srcId="{483EA5FF-3DBC-44B4-9E11-A222E6E70FFE}" destId="{C991F14E-1E6A-4E8F-A6E3-D4D7572941DD}" srcOrd="1" destOrd="0" presId="urn:microsoft.com/office/officeart/2005/8/layout/hierarchy2"/>
+    <dgm:cxn modelId="{8C49347F-935A-429D-A52D-D5E04210D3A2}" srcId="{1621E007-26BC-431B-A947-D00592434C8A}" destId="{22035727-4FFA-4769-9563-F7965264B9CE}" srcOrd="10" destOrd="0" parTransId="{33521470-74F2-4318-82F2-1221CE8185A0}" sibTransId="{1D85182D-7400-408C-BF5D-1CD4D4F8F4CD}"/>
+    <dgm:cxn modelId="{93C733F8-79A5-49BC-86DB-24FC56A5E686}" type="presOf" srcId="{277A48CB-99E3-48D6-84D3-364683E617B8}" destId="{F2BBC305-1F87-4F4E-82A1-C05C2963265B}" srcOrd="0" destOrd="0" presId="urn:microsoft.com/office/officeart/2005/8/layout/hierarchy2"/>
+    <dgm:cxn modelId="{B052E95C-FFCC-4FEC-928E-8634ADA1A1FD}" type="presOf" srcId="{4FE86403-F480-4CF2-B5CA-BBE69841C37F}" destId="{A07D77F0-DAFA-4A72-8540-07774004A2FC}" srcOrd="0" destOrd="0" presId="urn:microsoft.com/office/officeart/2005/8/layout/hierarchy2"/>
+    <dgm:cxn modelId="{03F07E1C-2F78-44F1-92EF-2B832D8F5295}" type="presOf" srcId="{98CC74F6-072D-4F1D-89B4-2638558C1ABA}" destId="{2CBAF20D-C1DF-4B36-9E86-5B7B316B9B76}" srcOrd="1" destOrd="0" presId="urn:microsoft.com/office/officeart/2005/8/layout/hierarchy2"/>
+    <dgm:cxn modelId="{2E113F35-2091-4335-A294-CCCAA30BF06C}" type="presOf" srcId="{FF9F1C55-2091-412D-978D-952A963BFBC2}" destId="{F8AACCF6-CFE7-402F-B8ED-29BC5733A870}" srcOrd="0" destOrd="0" presId="urn:microsoft.com/office/officeart/2005/8/layout/hierarchy2"/>
+    <dgm:cxn modelId="{49CEF8DE-26A6-4B59-AA98-AA187745ED07}" type="presOf" srcId="{E86C9E3E-FA9C-4589-AAE9-49E75D1C4E3E}" destId="{C158577F-04B7-4841-A954-51BD6529841D}" srcOrd="1" destOrd="0" presId="urn:microsoft.com/office/officeart/2005/8/layout/hierarchy2"/>
+    <dgm:cxn modelId="{2935B89D-F608-4F20-8099-3000F9BD40F0}" type="presOf" srcId="{B861AA13-B6E7-4491-8330-933D1EB7B477}" destId="{F807C5DA-62F5-4DA2-8E25-CF1093B0137B}" srcOrd="1" destOrd="0" presId="urn:microsoft.com/office/officeart/2005/8/layout/hierarchy2"/>
+    <dgm:cxn modelId="{181156BF-7678-41E9-BDDF-F35F2A20A829}" srcId="{1621E007-26BC-431B-A947-D00592434C8A}" destId="{A04F90A2-598C-44D1-B0E3-E7776018B23D}" srcOrd="13" destOrd="0" parTransId="{8A89CF52-8451-401A-AB86-A242D7054C01}" sibTransId="{BEF15ACC-E6D2-427F-8E47-C27DF793787A}"/>
+    <dgm:cxn modelId="{CDB7CBBB-CBBA-4124-81D8-D14069AC4904}" type="presOf" srcId="{CD0CBE9E-BC2C-431D-BDB8-A31C42AE0489}" destId="{5DDE389C-DAA1-4E94-8130-EE2EA40B9C82}" srcOrd="0" destOrd="0" presId="urn:microsoft.com/office/officeart/2005/8/layout/hierarchy2"/>
+    <dgm:cxn modelId="{E7F19C12-F5AC-4348-8A6A-5F36A585BCC4}" type="presOf" srcId="{C248B9FB-8E11-402F-ADA5-542892675409}" destId="{232E3FC3-F2E5-40D9-9802-02FEC26B0864}" srcOrd="0" destOrd="0" presId="urn:microsoft.com/office/officeart/2005/8/layout/hierarchy2"/>
+    <dgm:cxn modelId="{8F03F7A6-0607-45D8-A7E1-C7DCF0E6ABF8}" type="presOf" srcId="{BF5281B7-3993-4038-BB99-9C6864923CDB}" destId="{3AE51C82-790C-4B64-BD8C-E0C6D5D6D7D3}" srcOrd="0" destOrd="0" presId="urn:microsoft.com/office/officeart/2005/8/layout/hierarchy2"/>
+    <dgm:cxn modelId="{B9976C38-9A52-4242-9155-54FF6C2E6A71}" srcId="{1621E007-26BC-431B-A947-D00592434C8A}" destId="{C248B9FB-8E11-402F-ADA5-542892675409}" srcOrd="9" destOrd="0" parTransId="{FF9F1C55-2091-412D-978D-952A963BFBC2}" sibTransId="{3D7F846F-E864-4F5C-B91B-C8ABFAF0CDC2}"/>
+    <dgm:cxn modelId="{2A6E9EA6-AD8F-494E-A778-FA302343D12A}" type="presOf" srcId="{95C69F40-CCE5-4DB6-A0E1-6455B56639C0}" destId="{6B9E54D5-136F-4A04-B8E1-6DF53875F682}" srcOrd="1" destOrd="0" presId="urn:microsoft.com/office/officeart/2005/8/layout/hierarchy2"/>
+    <dgm:cxn modelId="{E7E0084E-3583-41E1-8E8C-F8748C6D9359}" srcId="{1621E007-26BC-431B-A947-D00592434C8A}" destId="{A17EEA51-2DB8-40FC-AF0D-5C978AD101F1}" srcOrd="2" destOrd="0" parTransId="{6F2AB335-DE71-488D-B37F-3C1E265CC71B}" sibTransId="{BF0F1D24-0658-4D25-840A-1E8BE5C31822}"/>
+    <dgm:cxn modelId="{458D70E2-79C8-4C88-A85B-DF269DAA4709}" srcId="{1621E007-26BC-431B-A947-D00592434C8A}" destId="{CD0CBE9E-BC2C-431D-BDB8-A31C42AE0489}" srcOrd="17" destOrd="0" parTransId="{E8D2DC6D-1D84-4535-AE7F-FD3683FD5774}" sibTransId="{76BC0B88-5FD7-4CE1-8C6C-757F24EADC4E}"/>
+    <dgm:cxn modelId="{64358890-4CF8-4FDA-B419-A59464A3C4E2}" srcId="{1621E007-26BC-431B-A947-D00592434C8A}" destId="{AF5B58CD-DBD5-4A38-AB27-B9FF44924450}" srcOrd="1" destOrd="0" parTransId="{4C1760A4-FF6B-41F2-9645-A6A075E2AFD1}" sibTransId="{E8420978-E1EC-491A-8B5D-6BB5CE860AAD}"/>
+    <dgm:cxn modelId="{A875E0B0-9B10-4BE8-AECE-36600FA2EE9C}" type="presOf" srcId="{5581ADD0-476D-419B-BA44-5096A40EEBE5}" destId="{B80FA7EE-0B0F-4C6A-8A52-16B4B0AA9806}" srcOrd="1" destOrd="0" presId="urn:microsoft.com/office/officeart/2005/8/layout/hierarchy2"/>
+    <dgm:cxn modelId="{404DF455-BE4B-4A65-AE97-93F1AFC9E85A}" srcId="{1621E007-26BC-431B-A947-D00592434C8A}" destId="{15E4B482-AFEA-4015-890A-0C7DDF034B86}" srcOrd="5" destOrd="0" parTransId="{15BFEC00-8BF0-424B-812C-6211CB48BAB5}" sibTransId="{7E6DA692-36C0-4DE2-8316-D117D603A525}"/>
+    <dgm:cxn modelId="{39EE5FFB-B033-4C53-8710-404FD390E8E7}" type="presOf" srcId="{018D90FD-8799-4B29-9A27-2CAE092621D9}" destId="{D844DE08-D3C8-46A6-B42F-878F26C95F1E}" srcOrd="0" destOrd="0" presId="urn:microsoft.com/office/officeart/2005/8/layout/hierarchy2"/>
+    <dgm:cxn modelId="{FEC60686-29D3-4379-8DED-A5E71F13C419}" type="presOf" srcId="{E8D2DC6D-1D84-4535-AE7F-FD3683FD5774}" destId="{6BC97E7D-2A52-423C-8E1D-64FAC781C55A}" srcOrd="1" destOrd="0" presId="urn:microsoft.com/office/officeart/2005/8/layout/hierarchy2"/>
+    <dgm:cxn modelId="{AB6C6DD5-A3D4-4975-A56F-AB2F08D9571C}" srcId="{1621E007-26BC-431B-A947-D00592434C8A}" destId="{82F99002-2364-48E8-9474-D1E3E8E80742}" srcOrd="4" destOrd="0" parTransId="{C97438D4-6CDE-44C1-8028-FAF23EC23A32}" sibTransId="{BF01C926-9370-4E53-AFB9-279CA17B615B}"/>
+    <dgm:cxn modelId="{A24DFA52-FA7A-42B4-B438-9775B8EBE944}" type="presOf" srcId="{194C1557-6784-4DAD-854A-7221EFB03390}" destId="{436B8739-C5A6-4C15-B0ED-4D1CE39CB43C}" srcOrd="0" destOrd="0" presId="urn:microsoft.com/office/officeart/2005/8/layout/hierarchy2"/>
+    <dgm:cxn modelId="{8A4DB9F5-84CD-4FD3-A8B7-2CA85608912C}" type="presOf" srcId="{050844DA-3DD7-4728-95B2-337567902959}" destId="{58C6AA60-6F3B-40DB-9946-76A58571817F}" srcOrd="1" destOrd="0" presId="urn:microsoft.com/office/officeart/2005/8/layout/hierarchy2"/>
+    <dgm:cxn modelId="{8ED13F80-B000-4AFC-9044-A1F1D691BE0B}" srcId="{194C1557-6784-4DAD-854A-7221EFB03390}" destId="{B681251F-B137-43B5-A667-00AA8F1FB373}" srcOrd="1" destOrd="0" parTransId="{46FA7E0D-038B-4CAB-9B4A-93D957032341}" sibTransId="{9F1D8A76-1A8B-4CE8-BFC1-EF3990CC3132}"/>
+    <dgm:cxn modelId="{68625FAB-4FB2-4436-8F41-06E7AB273172}" srcId="{1621E007-26BC-431B-A947-D00592434C8A}" destId="{CDEA22CC-0557-4ECE-B3CB-113C00DE88B8}" srcOrd="11" destOrd="0" parTransId="{7D533F1C-05DF-49C1-86C2-C5854F2819F0}" sibTransId="{357C2651-FCAF-4D5D-9DE8-4B489A0C49A8}"/>
+    <dgm:cxn modelId="{82C6A42E-618B-4B19-A077-B5168866EE4B}" type="presOf" srcId="{1DE2FE6F-F9E1-40AA-9B09-69C06C93EB2D}" destId="{BEE62EB9-4BC9-4278-B431-6B95B0C29736}" srcOrd="0" destOrd="0" presId="urn:microsoft.com/office/officeart/2005/8/layout/hierarchy2"/>
+    <dgm:cxn modelId="{2CA2D060-C8B5-4D14-9575-D56640EC4F89}" type="presOf" srcId="{277A48CB-99E3-48D6-84D3-364683E617B8}" destId="{BE508878-67FD-4AA5-8674-45DE5876D25E}" srcOrd="1" destOrd="0" presId="urn:microsoft.com/office/officeart/2005/8/layout/hierarchy2"/>
+    <dgm:cxn modelId="{8152B6EB-DE49-46A2-B8A9-11F2A6C9844A}" type="presOf" srcId="{15E4B482-AFEA-4015-890A-0C7DDF034B86}" destId="{C56CD8FA-6820-4927-857B-24AC03A0848E}" srcOrd="0" destOrd="0" presId="urn:microsoft.com/office/officeart/2005/8/layout/hierarchy2"/>
+    <dgm:cxn modelId="{66A7CAE1-6289-4DC1-B7D7-337655D53B5B}" type="presOf" srcId="{483EA5FF-3DBC-44B4-9E11-A222E6E70FFE}" destId="{2B11C088-24B1-4E33-894C-0C75E2725FF1}" srcOrd="0" destOrd="0" presId="urn:microsoft.com/office/officeart/2005/8/layout/hierarchy2"/>
+    <dgm:cxn modelId="{DFA3C99B-21BE-4C47-A0DA-3DF1E961713C}" type="presOf" srcId="{CA6A0933-6C98-4683-B217-04900501B08F}" destId="{D2517C91-CD98-47B1-A003-057FA67CA5D1}" srcOrd="1" destOrd="0" presId="urn:microsoft.com/office/officeart/2005/8/layout/hierarchy2"/>
+    <dgm:cxn modelId="{1DE66A5C-E112-4B3A-868C-CE2D93040F25}" srcId="{018D90FD-8799-4B29-9A27-2CAE092621D9}" destId="{194C1557-6784-4DAD-854A-7221EFB03390}" srcOrd="1" destOrd="0" parTransId="{BD596FC2-8073-487C-A373-8B4252B3D9C4}" sibTransId="{35E58A38-85CD-4E09-904B-CF6B2BFF8AE1}"/>
+    <dgm:cxn modelId="{BC28E136-6E3D-40FB-B511-2F5240AFFB45}" srcId="{194C1557-6784-4DAD-854A-7221EFB03390}" destId="{F0A24312-BBA6-4924-A7C3-28FB7B93680F}" srcOrd="2" destOrd="0" parTransId="{277A48CB-99E3-48D6-84D3-364683E617B8}" sibTransId="{BB160A2A-A649-451D-829F-D1BCE5907171}"/>
+    <dgm:cxn modelId="{4D976125-5303-474E-8459-8931D3E43347}" type="presOf" srcId="{35BDD7DC-ADB5-42C5-861B-4D4B1A430768}" destId="{A498F82E-BAFD-4F2E-9519-0B8C1ED23FD3}" srcOrd="0" destOrd="0" presId="urn:microsoft.com/office/officeart/2005/8/layout/hierarchy2"/>
+    <dgm:cxn modelId="{C75A8645-0EB3-41D9-8180-28D272D5BFD8}" type="presOf" srcId="{CDEA22CC-0557-4ECE-B3CB-113C00DE88B8}" destId="{0A8BD01C-70BE-4D22-8EBB-A96F19A9DB2C}" srcOrd="0" destOrd="0" presId="urn:microsoft.com/office/officeart/2005/8/layout/hierarchy2"/>
+    <dgm:cxn modelId="{F47F5459-DEA0-4ADE-949B-4EB41A9C56C5}" type="presOf" srcId="{B18B0066-9FAC-47D8-A96F-F9546974DB97}" destId="{71664F23-62A3-45D4-B742-6B3578F3BC43}" srcOrd="0" destOrd="0" presId="urn:microsoft.com/office/officeart/2005/8/layout/hierarchy2"/>
+    <dgm:cxn modelId="{03B3E5B2-02BB-4BED-9B1F-D0745412873C}" type="presOf" srcId="{6F2AB335-DE71-488D-B37F-3C1E265CC71B}" destId="{4FC67143-A3C4-49CA-983A-D83A188633AF}" srcOrd="0" destOrd="0" presId="urn:microsoft.com/office/officeart/2005/8/layout/hierarchy2"/>
+    <dgm:cxn modelId="{976CE673-41BA-4452-BEFD-421D859E898A}" type="presOf" srcId="{33521470-74F2-4318-82F2-1221CE8185A0}" destId="{74CCCE04-5B34-4268-9B28-31D835ABC869}" srcOrd="1" destOrd="0" presId="urn:microsoft.com/office/officeart/2005/8/layout/hierarchy2"/>
+    <dgm:cxn modelId="{6196D01F-6D24-4030-A5DE-56EDFC3976F9}" srcId="{1621E007-26BC-431B-A947-D00592434C8A}" destId="{1DE2FE6F-F9E1-40AA-9B09-69C06C93EB2D}" srcOrd="3" destOrd="0" parTransId="{E86C9E3E-FA9C-4589-AAE9-49E75D1C4E3E}" sibTransId="{056A7605-A744-4C3E-AE99-EAEF1A3003F2}"/>
+    <dgm:cxn modelId="{5EE0C4E2-F11E-45A0-936B-07AFD506B368}" type="presOf" srcId="{33521470-74F2-4318-82F2-1221CE8185A0}" destId="{A22484D8-88D9-4A8E-AD4D-366762E28902}" srcOrd="0" destOrd="0" presId="urn:microsoft.com/office/officeart/2005/8/layout/hierarchy2"/>
+    <dgm:cxn modelId="{3A8984A3-8714-439E-9DD3-4E7FAC029C1F}" type="presOf" srcId="{F0A24312-BBA6-4924-A7C3-28FB7B93680F}" destId="{812D9E0E-28E0-47F2-9168-168FE96C4119}" srcOrd="0" destOrd="0" presId="urn:microsoft.com/office/officeart/2005/8/layout/hierarchy2"/>
+    <dgm:cxn modelId="{A81D14CE-9576-4D4F-9FF0-06F63271F301}" srcId="{1621E007-26BC-431B-A947-D00592434C8A}" destId="{35BDD7DC-ADB5-42C5-861B-4D4B1A430768}" srcOrd="6" destOrd="0" parTransId="{B861AA13-B6E7-4491-8330-933D1EB7B477}" sibTransId="{31F719BD-7F0A-4CD6-9224-33C107EBC930}"/>
+    <dgm:cxn modelId="{EB16A3EE-8BD7-4018-B775-42330764A85F}" type="presOf" srcId="{8A89CF52-8451-401A-AB86-A242D7054C01}" destId="{4EAF1BA9-1E2E-42D0-8B45-203DE822089C}" srcOrd="0" destOrd="0" presId="urn:microsoft.com/office/officeart/2005/8/layout/hierarchy2"/>
+    <dgm:cxn modelId="{B336A2AB-11D6-45AC-B249-2CE3CD4C4724}" type="presOf" srcId="{46FA7E0D-038B-4CAB-9B4A-93D957032341}" destId="{B6CD9049-C3B5-471D-86D3-57BE215BD645}" srcOrd="1" destOrd="0" presId="urn:microsoft.com/office/officeart/2005/8/layout/hierarchy2"/>
+    <dgm:cxn modelId="{084D5840-064F-4168-85D2-7F7590C5921C}" type="presOf" srcId="{BD596FC2-8073-487C-A373-8B4252B3D9C4}" destId="{31CC053B-4DB5-43B5-8E3D-F683C9733F04}" srcOrd="0" destOrd="0" presId="urn:microsoft.com/office/officeart/2005/8/layout/hierarchy2"/>
+    <dgm:cxn modelId="{6E5177BD-F439-4710-9AD1-40D3A46AEA4B}" type="presOf" srcId="{1621E007-26BC-431B-A947-D00592434C8A}" destId="{7553DE84-83A2-40EF-A695-B16F3A691097}" srcOrd="0" destOrd="0" presId="urn:microsoft.com/office/officeart/2005/8/layout/hierarchy2"/>
+    <dgm:cxn modelId="{A50BD651-0EF5-44E4-AB4D-09BC78028AE9}" srcId="{1621E007-26BC-431B-A947-D00592434C8A}" destId="{E935FE52-05D6-4140-AF32-6115C89279B0}" srcOrd="12" destOrd="0" parTransId="{87660166-6C27-48D1-9BE6-02BDDECD0139}" sibTransId="{C3FDAB9F-9192-40AC-BD34-38E74C704B14}"/>
+    <dgm:cxn modelId="{B5452DC5-4CC7-43DB-B385-E428A38BD84F}" type="presOf" srcId="{997D802B-EDA6-426A-A593-87509BA2B754}" destId="{89A9170F-394A-46D3-BEE1-B36921F6E1C6}" srcOrd="0" destOrd="0" presId="urn:microsoft.com/office/officeart/2005/8/layout/hierarchy2"/>
+    <dgm:cxn modelId="{DC4E0A4D-702D-4D93-AAD8-7390BAFFA087}" type="presOf" srcId="{297FDFBD-810F-41DF-8509-3C7305003CFE}" destId="{9F07CD4A-318D-4205-B8A7-B8254F09A4FF}" srcOrd="0" destOrd="0" presId="urn:microsoft.com/office/officeart/2005/8/layout/hierarchy2"/>
+    <dgm:cxn modelId="{7BB31B87-DBD8-435B-8604-6D5957C33A09}" srcId="{1621E007-26BC-431B-A947-D00592434C8A}" destId="{B2C3B80E-ED8F-43C0-A8F5-626D22BB61A3}" srcOrd="14" destOrd="0" parTransId="{95C69F40-CCE5-4DB6-A0E1-6455B56639C0}" sibTransId="{D705935D-6B52-4227-9214-CF38DFBA015F}"/>
+    <dgm:cxn modelId="{DB981D9D-9DEC-4779-A59F-4BA8B01E0415}" srcId="{194C1557-6784-4DAD-854A-7221EFB03390}" destId="{0DA65A98-3B9E-4210-AB71-1310F25DC60B}" srcOrd="0" destOrd="0" parTransId="{49F7A883-E0C2-4FDE-A76C-3D8814586340}" sibTransId="{5C07BFC1-B766-4C05-B73A-A02C4A5D3989}"/>
+    <dgm:cxn modelId="{E74301BB-0840-4881-B997-AA0C3CE3470A}" srcId="{A2D4EA81-EFBF-482D-BC64-D7C64ED9D918}" destId="{018D90FD-8799-4B29-9A27-2CAE092621D9}" srcOrd="0" destOrd="0" parTransId="{2E876ED2-287D-4263-871C-C8395B476B36}" sibTransId="{9404BEC3-82D2-43BF-89F3-28ABC0D1B3AD}"/>
+    <dgm:cxn modelId="{85B1DF8B-8C67-4FDF-92B2-277F0EB2B3C5}" type="presOf" srcId="{8A89CF52-8451-401A-AB86-A242D7054C01}" destId="{42996DB6-E9C4-4D9D-95DC-39E2177AF04C}" srcOrd="1" destOrd="0" presId="urn:microsoft.com/office/officeart/2005/8/layout/hierarchy2"/>
+    <dgm:cxn modelId="{D9DC4DEB-8F01-4DEE-8800-90AC782D35EC}" type="presOf" srcId="{B681251F-B137-43B5-A667-00AA8F1FB373}" destId="{C7034579-8E80-4D1A-BF61-A57342567F4C}" srcOrd="0" destOrd="0" presId="urn:microsoft.com/office/officeart/2005/8/layout/hierarchy2"/>
+    <dgm:cxn modelId="{18EE68AE-2729-495D-A57C-8FCD05B31F47}" type="presOf" srcId="{AF5B58CD-DBD5-4A38-AB27-B9FF44924450}" destId="{F9EC1916-8065-4577-B861-94B5E85EB741}" srcOrd="0" destOrd="0" presId="urn:microsoft.com/office/officeart/2005/8/layout/hierarchy2"/>
+    <dgm:cxn modelId="{CB78EE40-0063-421C-8617-8A44EDBAB942}" type="presOf" srcId="{15BFEC00-8BF0-424B-812C-6211CB48BAB5}" destId="{7CAD9913-F4D5-418B-B9FF-F9F360CCA625}" srcOrd="1" destOrd="0" presId="urn:microsoft.com/office/officeart/2005/8/layout/hierarchy2"/>
+    <dgm:cxn modelId="{12E15661-3473-4D5B-A429-BAD6613E4E55}" type="presOf" srcId="{B861AA13-B6E7-4491-8330-933D1EB7B477}" destId="{BE94FC41-7E45-4EC8-929B-E375718E9CFD}" srcOrd="0" destOrd="0" presId="urn:microsoft.com/office/officeart/2005/8/layout/hierarchy2"/>
+    <dgm:cxn modelId="{FFD0ABB0-21F4-4A89-B2F6-0DA3752D8978}" type="presOf" srcId="{87660166-6C27-48D1-9BE6-02BDDECD0139}" destId="{AB85DCB8-E6AC-46D8-AA7D-EF2B5135B688}" srcOrd="0" destOrd="0" presId="urn:microsoft.com/office/officeart/2005/8/layout/hierarchy2"/>
+    <dgm:cxn modelId="{F97F3BF1-6F9B-4FC3-BCB0-93EB14A19E04}" srcId="{1621E007-26BC-431B-A947-D00592434C8A}" destId="{297FDFBD-810F-41DF-8509-3C7305003CFE}" srcOrd="15" destOrd="0" parTransId="{050844DA-3DD7-4728-95B2-337567902959}" sibTransId="{74FA41EC-9605-4EFF-AB67-349FF63C5D78}"/>
+    <dgm:cxn modelId="{201140BA-5548-401B-A36B-E0C9A283CA02}" type="presOf" srcId="{49F7A883-E0C2-4FDE-A76C-3D8814586340}" destId="{60CF692B-2C90-486F-8E39-2CE7219D0895}" srcOrd="0" destOrd="0" presId="urn:microsoft.com/office/officeart/2005/8/layout/hierarchy2"/>
+    <dgm:cxn modelId="{699AA048-5716-403F-9A1C-35F6EA7632C7}" srcId="{F0A24312-BBA6-4924-A7C3-28FB7B93680F}" destId="{4FE86403-F480-4CF2-B5CA-BBE69841C37F}" srcOrd="0" destOrd="0" parTransId="{BF5281B7-3993-4038-BB99-9C6864923CDB}" sibTransId="{C71C4558-77B6-4E8A-BB9F-AD36B4F95CAD}"/>
+    <dgm:cxn modelId="{1AB90BD9-1D45-4874-AF0A-BF8B080947F4}" type="presOf" srcId="{22035727-4FFA-4769-9563-F7965264B9CE}" destId="{1F479AC0-84F6-4267-86ED-B588DB647B4D}" srcOrd="0" destOrd="0" presId="urn:microsoft.com/office/officeart/2005/8/layout/hierarchy2"/>
+    <dgm:cxn modelId="{E3D07E5F-79C2-48B3-9C15-E76058D0B6BA}" srcId="{1621E007-26BC-431B-A947-D00592434C8A}" destId="{997D802B-EDA6-426A-A593-87509BA2B754}" srcOrd="16" destOrd="0" parTransId="{483EA5FF-3DBC-44B4-9E11-A222E6E70FFE}" sibTransId="{8C4E3172-2E41-4E63-87B2-E52694E4AB85}"/>
+    <dgm:cxn modelId="{04343849-3724-4A24-B606-351D89E20619}" srcId="{1621E007-26BC-431B-A947-D00592434C8A}" destId="{E9634F12-2274-463C-A61F-87BCD69B6947}" srcOrd="8" destOrd="0" parTransId="{5581ADD0-476D-419B-BA44-5096A40EEBE5}" sibTransId="{C7FA2E9E-E1A8-4361-8EDB-88A94B7865EE}"/>
+    <dgm:cxn modelId="{3C3DA053-75E4-4A43-8FCD-3DDB1CC052E5}" type="presOf" srcId="{49F7A883-E0C2-4FDE-A76C-3D8814586340}" destId="{8FEE4A9A-8969-4DEB-9713-07A7DBD115B7}" srcOrd="1" destOrd="0" presId="urn:microsoft.com/office/officeart/2005/8/layout/hierarchy2"/>
+    <dgm:cxn modelId="{8C360423-4146-407F-AF15-9D0B3C04856B}" type="presOf" srcId="{BF5281B7-3993-4038-BB99-9C6864923CDB}" destId="{FE25965E-845F-40E9-B329-0B5C5BCFC4D0}" srcOrd="1" destOrd="0" presId="urn:microsoft.com/office/officeart/2005/8/layout/hierarchy2"/>
+    <dgm:cxn modelId="{EDF016CA-7122-4266-9EF9-8920D13ABAF3}" type="presOf" srcId="{E8D2DC6D-1D84-4535-AE7F-FD3683FD5774}" destId="{FDBCCBDA-7886-4198-A550-D751C46FBF9D}" srcOrd="0" destOrd="0" presId="urn:microsoft.com/office/officeart/2005/8/layout/hierarchy2"/>
+    <dgm:cxn modelId="{6033879F-5A6E-4A6A-811D-056B5FDFE4CE}" type="presOf" srcId="{82F99002-2364-48E8-9474-D1E3E8E80742}" destId="{C4FAF5E1-9087-4502-A0C1-6CB0C16C40B6}" srcOrd="0" destOrd="0" presId="urn:microsoft.com/office/officeart/2005/8/layout/hierarchy2"/>
+    <dgm:cxn modelId="{59464A17-B58A-439B-8E31-33885D63334D}" type="presOf" srcId="{95C69F40-CCE5-4DB6-A0E1-6455B56639C0}" destId="{C847FA65-0B37-4E52-A63B-4CDD4ED59FCA}" srcOrd="0" destOrd="0" presId="urn:microsoft.com/office/officeart/2005/8/layout/hierarchy2"/>
+    <dgm:cxn modelId="{1A5ED2E4-50B0-4859-965A-0E737C899C40}" type="presOf" srcId="{4C1760A4-FF6B-41F2-9645-A6A075E2AFD1}" destId="{B3A493D0-2FE9-4046-9D9A-466B67365C53}" srcOrd="1" destOrd="0" presId="urn:microsoft.com/office/officeart/2005/8/layout/hierarchy2"/>
+    <dgm:cxn modelId="{1F7BEE44-A2B0-444E-BB6F-ADEE03BBDC81}" type="presOf" srcId="{C97438D4-6CDE-44C1-8028-FAF23EC23A32}" destId="{73658599-AFA6-4FA5-B3AD-84ECA55BD92C}" srcOrd="1" destOrd="0" presId="urn:microsoft.com/office/officeart/2005/8/layout/hierarchy2"/>
+    <dgm:cxn modelId="{98F97CE8-B306-42EC-8E65-193C46413BE8}" type="presOf" srcId="{CA6A0933-6C98-4683-B217-04900501B08F}" destId="{99E2DF40-6437-4F07-8F2E-79D80FBB7613}" srcOrd="0" destOrd="0" presId="urn:microsoft.com/office/officeart/2005/8/layout/hierarchy2"/>
+    <dgm:cxn modelId="{12E1E56B-66AF-4B47-851B-CABB7E8D28A9}" type="presOf" srcId="{E9634F12-2274-463C-A61F-87BCD69B6947}" destId="{72214F6E-4077-473E-BF8C-AEA5D0F63B4E}" srcOrd="0" destOrd="0" presId="urn:microsoft.com/office/officeart/2005/8/layout/hierarchy2"/>
+    <dgm:cxn modelId="{FBF54969-C2D6-489C-A7E1-E9CC5ACC79AF}" type="presOf" srcId="{B18B0066-9FAC-47D8-A96F-F9546974DB97}" destId="{91B3F187-9C1C-4565-B582-8DD7DEA72C45}" srcOrd="1" destOrd="0" presId="urn:microsoft.com/office/officeart/2005/8/layout/hierarchy2"/>
+    <dgm:cxn modelId="{7980070E-57A8-4D76-BE26-ECFE0F980C3D}" type="presOf" srcId="{87660166-6C27-48D1-9BE6-02BDDECD0139}" destId="{76D37528-8758-462F-9A24-15F4E7D03C7C}" srcOrd="1" destOrd="0" presId="urn:microsoft.com/office/officeart/2005/8/layout/hierarchy2"/>
+    <dgm:cxn modelId="{05DD2BAF-B2C1-4696-B79E-AC9EF8C2F1FB}" type="presOf" srcId="{050844DA-3DD7-4728-95B2-337567902959}" destId="{D9FA3899-4C64-444A-8515-340B7EF42440}" srcOrd="0" destOrd="0" presId="urn:microsoft.com/office/officeart/2005/8/layout/hierarchy2"/>
+    <dgm:cxn modelId="{712EF1D3-C104-4FC1-9903-EDC726582F97}" type="presOf" srcId="{46FA7E0D-038B-4CAB-9B4A-93D957032341}" destId="{8CD6D8AF-8F64-4643-93A2-B802E9D13D18}" srcOrd="0" destOrd="0" presId="urn:microsoft.com/office/officeart/2005/8/layout/hierarchy2"/>
+    <dgm:cxn modelId="{695E92F7-99E7-4215-B3BC-01246B339DF0}" type="presOf" srcId="{B2C3B80E-ED8F-43C0-A8F5-626D22BB61A3}" destId="{B7091056-F701-4AF7-B6E3-D1841F080D69}" srcOrd="0" destOrd="0" presId="urn:microsoft.com/office/officeart/2005/8/layout/hierarchy2"/>
+    <dgm:cxn modelId="{CC7A93A8-DB52-417E-85BC-00AAEBD300FC}" type="presOf" srcId="{E3812FED-48B3-4921-B88E-8AEE57F062DF}" destId="{971DCA25-CA70-406F-A12F-81E9A4B41B13}" srcOrd="0" destOrd="0" presId="urn:microsoft.com/office/officeart/2005/8/layout/hierarchy2"/>
     <dgm:cxn modelId="{BED7B544-3862-4FE9-8F62-5CD69630BB22}" srcId="{1621E007-26BC-431B-A947-D00592434C8A}" destId="{E3812FED-48B3-4921-B88E-8AEE57F062DF}" srcOrd="7" destOrd="0" parTransId="{98CC74F6-072D-4F1D-89B4-2638558C1ABA}" sibTransId="{0D7BAB2F-4692-4D5F-86F8-0CFF656AA9DE}"/>
-    <dgm:cxn modelId="{695E92F7-99E7-4215-B3BC-01246B339DF0}" type="presOf" srcId="{B2C3B80E-ED8F-43C0-A8F5-626D22BB61A3}" destId="{B7091056-F701-4AF7-B6E3-D1841F080D69}" srcOrd="0" destOrd="0" presId="urn:microsoft.com/office/officeart/2005/8/layout/hierarchy2"/>
-    <dgm:cxn modelId="{ED11543C-9B89-45E3-94F7-A41F5CCD34B3}" type="presOf" srcId="{6C7C46CA-6D81-42A3-8942-427BC01E9410}" destId="{B7265FB0-AFB2-4500-9131-FCDF39A72713}" srcOrd="0" destOrd="0" presId="urn:microsoft.com/office/officeart/2005/8/layout/hierarchy2"/>
-    <dgm:cxn modelId="{084D5840-064F-4168-85D2-7F7590C5921C}" type="presOf" srcId="{BD596FC2-8073-487C-A373-8B4252B3D9C4}" destId="{31CC053B-4DB5-43B5-8E3D-F683C9733F04}" srcOrd="0" destOrd="0" presId="urn:microsoft.com/office/officeart/2005/8/layout/hierarchy2"/>
-    <dgm:cxn modelId="{C9450B2B-D3F1-4989-886F-31AFDF351078}" type="presOf" srcId="{6F2AB335-DE71-488D-B37F-3C1E265CC71B}" destId="{D621044E-761C-497F-AA53-D2002AE09821}" srcOrd="1" destOrd="0" presId="urn:microsoft.com/office/officeart/2005/8/layout/hierarchy2"/>
-    <dgm:cxn modelId="{18EE68AE-2729-495D-A57C-8FCD05B31F47}" type="presOf" srcId="{AF5B58CD-DBD5-4A38-AB27-B9FF44924450}" destId="{F9EC1916-8065-4577-B861-94B5E85EB741}" srcOrd="0" destOrd="0" presId="urn:microsoft.com/office/officeart/2005/8/layout/hierarchy2"/>
-    <dgm:cxn modelId="{A81D14CE-9576-4D4F-9FF0-06F63271F301}" srcId="{1621E007-26BC-431B-A947-D00592434C8A}" destId="{35BDD7DC-ADB5-42C5-861B-4D4B1A430768}" srcOrd="6" destOrd="0" parTransId="{B861AA13-B6E7-4491-8330-933D1EB7B477}" sibTransId="{31F719BD-7F0A-4CD6-9224-33C107EBC930}"/>
-    <dgm:cxn modelId="{BC28E136-6E3D-40FB-B511-2F5240AFFB45}" srcId="{194C1557-6784-4DAD-854A-7221EFB03390}" destId="{F0A24312-BBA6-4924-A7C3-28FB7B93680F}" srcOrd="1" destOrd="0" parTransId="{277A48CB-99E3-48D6-84D3-364683E617B8}" sibTransId="{BB160A2A-A649-451D-829F-D1BCE5907171}"/>
+    <dgm:cxn modelId="{194E0EDA-1E5E-4874-960A-5E03E346264E}" type="presOf" srcId="{7D533F1C-05DF-49C1-86C2-C5854F2819F0}" destId="{38CBF0CF-DF9C-4635-8162-00C9EDAB6B38}" srcOrd="0" destOrd="0" presId="urn:microsoft.com/office/officeart/2005/8/layout/hierarchy2"/>
+    <dgm:cxn modelId="{66CD20E5-6B3D-4435-95AD-4C142AA59F90}" type="presOf" srcId="{C97438D4-6CDE-44C1-8028-FAF23EC23A32}" destId="{DABE1BB0-6FBC-4DB5-BA69-ACBDD395C425}" srcOrd="0" destOrd="0" presId="urn:microsoft.com/office/officeart/2005/8/layout/hierarchy2"/>
+    <dgm:cxn modelId="{1A94B808-1035-4031-8462-D06F5EA50EAD}" srcId="{1621E007-26BC-431B-A947-D00592434C8A}" destId="{12215929-6AE7-4473-8665-4AD98B1D8ADC}" srcOrd="0" destOrd="0" parTransId="{B18B0066-9FAC-47D8-A96F-F9546974DB97}" sibTransId="{869D3AD7-433E-4AE3-97E1-05524277F169}"/>
     <dgm:cxn modelId="{EA6968F0-1095-4360-ADB7-2433B75D24D1}" type="presOf" srcId="{5581ADD0-476D-419B-BA44-5096A40EEBE5}" destId="{1642E9A8-05F5-4DD9-8853-EB0B8B3CBAB0}" srcOrd="0" destOrd="0" presId="urn:microsoft.com/office/officeart/2005/8/layout/hierarchy2"/>
     <dgm:cxn modelId="{41121037-36D4-432E-B771-1216F3EB8718}" type="presOf" srcId="{BD596FC2-8073-487C-A373-8B4252B3D9C4}" destId="{2EA2EF79-8EF4-4A77-9318-2B0FD30C1AAB}" srcOrd="1" destOrd="0" presId="urn:microsoft.com/office/officeart/2005/8/layout/hierarchy2"/>
+    <dgm:cxn modelId="{3AC22F1E-B09E-44A5-84E9-6C4803C52CC7}" type="presOf" srcId="{A2D4EA81-EFBF-482D-BC64-D7C64ED9D918}" destId="{6A951408-BFCE-48CE-BBB6-5296E99687F8}" srcOrd="0" destOrd="0" presId="urn:microsoft.com/office/officeart/2005/8/layout/hierarchy2"/>
+    <dgm:cxn modelId="{B9FE11F9-CDDA-4E07-9D79-09655EA06051}" type="presOf" srcId="{7D533F1C-05DF-49C1-86C2-C5854F2819F0}" destId="{0C747E17-E4F9-4CCB-A1B1-5520DBCC9CEF}" srcOrd="1" destOrd="0" presId="urn:microsoft.com/office/officeart/2005/8/layout/hierarchy2"/>
+    <dgm:cxn modelId="{C9450B2B-D3F1-4989-886F-31AFDF351078}" type="presOf" srcId="{6F2AB335-DE71-488D-B37F-3C1E265CC71B}" destId="{D621044E-761C-497F-AA53-D2002AE09821}" srcOrd="1" destOrd="0" presId="urn:microsoft.com/office/officeart/2005/8/layout/hierarchy2"/>
+    <dgm:cxn modelId="{8AAD090D-ED1C-4F09-9003-4765F2811B65}" type="presOf" srcId="{FF9F1C55-2091-412D-978D-952A963BFBC2}" destId="{49209AC6-2E93-4812-BC92-F8809F087070}" srcOrd="1" destOrd="0" presId="urn:microsoft.com/office/officeart/2005/8/layout/hierarchy2"/>
+    <dgm:cxn modelId="{B5272265-3051-4410-ADD4-942ACBFD930C}" type="presOf" srcId="{E86C9E3E-FA9C-4589-AAE9-49E75D1C4E3E}" destId="{34DA80DF-C9F3-4B91-8344-8D94A6373D31}" srcOrd="0" destOrd="0" presId="urn:microsoft.com/office/officeart/2005/8/layout/hierarchy2"/>
+    <dgm:cxn modelId="{FBDF63DD-1E37-4AA7-91C0-DF0104681C47}" type="presOf" srcId="{A04F90A2-598C-44D1-B0E3-E7776018B23D}" destId="{42963CEA-510C-416E-ACE7-36D08610952E}" srcOrd="0" destOrd="0" presId="urn:microsoft.com/office/officeart/2005/8/layout/hierarchy2"/>
+    <dgm:cxn modelId="{9A672B26-A929-41FF-81E8-E2F9549747B9}" type="presOf" srcId="{A17EEA51-2DB8-40FC-AF0D-5C978AD101F1}" destId="{6BBEBF5B-FED1-46D5-B4BD-B746E33E479D}" srcOrd="0" destOrd="0" presId="urn:microsoft.com/office/officeart/2005/8/layout/hierarchy2"/>
+    <dgm:cxn modelId="{C33D31DF-9621-497D-A8EE-EF34B9795CEF}" srcId="{018D90FD-8799-4B29-9A27-2CAE092621D9}" destId="{1621E007-26BC-431B-A947-D00592434C8A}" srcOrd="0" destOrd="0" parTransId="{CA6A0933-6C98-4683-B217-04900501B08F}" sibTransId="{EF712F9A-CBC5-4F62-B397-6C866469F4DA}"/>
+    <dgm:cxn modelId="{6DEC531A-2253-4543-B876-B2C9D476C135}" type="presOf" srcId="{4C1760A4-FF6B-41F2-9645-A6A075E2AFD1}" destId="{D1667392-08A5-400E-A47D-1B3AF25FE52A}" srcOrd="0" destOrd="0" presId="urn:microsoft.com/office/officeart/2005/8/layout/hierarchy2"/>
     <dgm:cxn modelId="{8862DCE8-E9A4-437C-BD25-23E482C31F70}" type="presOf" srcId="{98CC74F6-072D-4F1D-89B4-2638558C1ABA}" destId="{9F497E88-9EE3-4B0E-BF38-F02082D514F8}" srcOrd="0" destOrd="0" presId="urn:microsoft.com/office/officeart/2005/8/layout/hierarchy2"/>
-    <dgm:cxn modelId="{9A672B26-A929-41FF-81E8-E2F9549747B9}" type="presOf" srcId="{A17EEA51-2DB8-40FC-AF0D-5C978AD101F1}" destId="{6BBEBF5B-FED1-46D5-B4BD-B746E33E479D}" srcOrd="0" destOrd="0" presId="urn:microsoft.com/office/officeart/2005/8/layout/hierarchy2"/>
-    <dgm:cxn modelId="{4D976125-5303-474E-8459-8931D3E43347}" type="presOf" srcId="{35BDD7DC-ADB5-42C5-861B-4D4B1A430768}" destId="{A498F82E-BAFD-4F2E-9519-0B8C1ED23FD3}" srcOrd="0" destOrd="0" presId="urn:microsoft.com/office/officeart/2005/8/layout/hierarchy2"/>
-    <dgm:cxn modelId="{C75A8645-0EB3-41D9-8180-28D272D5BFD8}" type="presOf" srcId="{CDEA22CC-0557-4ECE-B3CB-113C00DE88B8}" destId="{0A8BD01C-70BE-4D22-8EBB-A96F19A9DB2C}" srcOrd="0" destOrd="0" presId="urn:microsoft.com/office/officeart/2005/8/layout/hierarchy2"/>
-    <dgm:cxn modelId="{03B3E5B2-02BB-4BED-9B1F-D0745412873C}" type="presOf" srcId="{6F2AB335-DE71-488D-B37F-3C1E265CC71B}" destId="{4FC67143-A3C4-49CA-983A-D83A188633AF}" srcOrd="0" destOrd="0" presId="urn:microsoft.com/office/officeart/2005/8/layout/hierarchy2"/>
-    <dgm:cxn modelId="{FBDF63DD-1E37-4AA7-91C0-DF0104681C47}" type="presOf" srcId="{A04F90A2-598C-44D1-B0E3-E7776018B23D}" destId="{42963CEA-510C-416E-ACE7-36D08610952E}" srcOrd="0" destOrd="0" presId="urn:microsoft.com/office/officeart/2005/8/layout/hierarchy2"/>
-    <dgm:cxn modelId="{CDB7CBBB-CBBA-4124-81D8-D14069AC4904}" type="presOf" srcId="{CD0CBE9E-BC2C-431D-BDB8-A31C42AE0489}" destId="{5DDE389C-DAA1-4E94-8130-EE2EA40B9C82}" srcOrd="0" destOrd="0" presId="urn:microsoft.com/office/officeart/2005/8/layout/hierarchy2"/>
-    <dgm:cxn modelId="{404DF455-BE4B-4A65-AE97-93F1AFC9E85A}" srcId="{1621E007-26BC-431B-A947-D00592434C8A}" destId="{15E4B482-AFEA-4015-890A-0C7DDF034B86}" srcOrd="5" destOrd="0" parTransId="{15BFEC00-8BF0-424B-812C-6211CB48BAB5}" sibTransId="{7E6DA692-36C0-4DE2-8316-D117D603A525}"/>
-    <dgm:cxn modelId="{FBF54969-C2D6-489C-A7E1-E9CC5ACC79AF}" type="presOf" srcId="{B18B0066-9FAC-47D8-A96F-F9546974DB97}" destId="{91B3F187-9C1C-4565-B582-8DD7DEA72C45}" srcOrd="1" destOrd="0" presId="urn:microsoft.com/office/officeart/2005/8/layout/hierarchy2"/>
-    <dgm:cxn modelId="{66CD20E5-6B3D-4435-95AD-4C142AA59F90}" type="presOf" srcId="{C97438D4-6CDE-44C1-8028-FAF23EC23A32}" destId="{DABE1BB0-6FBC-4DB5-BA69-ACBDD395C425}" srcOrd="0" destOrd="0" presId="urn:microsoft.com/office/officeart/2005/8/layout/hierarchy2"/>
-    <dgm:cxn modelId="{E7E0084E-3583-41E1-8E8C-F8748C6D9359}" srcId="{1621E007-26BC-431B-A947-D00592434C8A}" destId="{A17EEA51-2DB8-40FC-AF0D-5C978AD101F1}" srcOrd="2" destOrd="0" parTransId="{6F2AB335-DE71-488D-B37F-3C1E265CC71B}" sibTransId="{BF0F1D24-0658-4D25-840A-1E8BE5C31822}"/>
-    <dgm:cxn modelId="{39EE5FFB-B033-4C53-8710-404FD390E8E7}" type="presOf" srcId="{018D90FD-8799-4B29-9A27-2CAE092621D9}" destId="{D844DE08-D3C8-46A6-B42F-878F26C95F1E}" srcOrd="0" destOrd="0" presId="urn:microsoft.com/office/officeart/2005/8/layout/hierarchy2"/>
-    <dgm:cxn modelId="{68625FAB-4FB2-4436-8F41-06E7AB273172}" srcId="{1621E007-26BC-431B-A947-D00592434C8A}" destId="{CDEA22CC-0557-4ECE-B3CB-113C00DE88B8}" srcOrd="11" destOrd="0" parTransId="{7D533F1C-05DF-49C1-86C2-C5854F2819F0}" sibTransId="{357C2651-FCAF-4D5D-9DE8-4B489A0C49A8}"/>
     <dgm:cxn modelId="{58A19658-DFBA-41FF-AC5D-FF552F9DF29F}" type="presOf" srcId="{12215929-6AE7-4473-8665-4AD98B1D8ADC}" destId="{1B16D038-BF3B-4573-8A3D-1890298B5046}" srcOrd="0" destOrd="0" presId="urn:microsoft.com/office/officeart/2005/8/layout/hierarchy2"/>
-    <dgm:cxn modelId="{59464A17-B58A-439B-8E31-33885D63334D}" type="presOf" srcId="{95C69F40-CCE5-4DB6-A0E1-6455B56639C0}" destId="{C847FA65-0B37-4E52-A63B-4CDD4ED59FCA}" srcOrd="0" destOrd="0" presId="urn:microsoft.com/office/officeart/2005/8/layout/hierarchy2"/>
-    <dgm:cxn modelId="{181156BF-7678-41E9-BDDF-F35F2A20A829}" srcId="{1621E007-26BC-431B-A947-D00592434C8A}" destId="{A04F90A2-598C-44D1-B0E3-E7776018B23D}" srcOrd="13" destOrd="0" parTransId="{8A89CF52-8451-401A-AB86-A242D7054C01}" sibTransId="{BEF15ACC-E6D2-427F-8E47-C27DF793787A}"/>
-    <dgm:cxn modelId="{458D70E2-79C8-4C88-A85B-DF269DAA4709}" srcId="{1621E007-26BC-431B-A947-D00592434C8A}" destId="{CD0CBE9E-BC2C-431D-BDB8-A31C42AE0489}" srcOrd="17" destOrd="0" parTransId="{E8D2DC6D-1D84-4535-AE7F-FD3683FD5774}" sibTransId="{76BC0B88-5FD7-4CE1-8C6C-757F24EADC4E}"/>
-    <dgm:cxn modelId="{1A94B808-1035-4031-8462-D06F5EA50EAD}" srcId="{1621E007-26BC-431B-A947-D00592434C8A}" destId="{12215929-6AE7-4473-8665-4AD98B1D8ADC}" srcOrd="0" destOrd="0" parTransId="{B18B0066-9FAC-47D8-A96F-F9546974DB97}" sibTransId="{869D3AD7-433E-4AE3-97E1-05524277F169}"/>
-    <dgm:cxn modelId="{05DD2BAF-B2C1-4696-B79E-AC9EF8C2F1FB}" type="presOf" srcId="{050844DA-3DD7-4728-95B2-337567902959}" destId="{D9FA3899-4C64-444A-8515-340B7EF42440}" srcOrd="0" destOrd="0" presId="urn:microsoft.com/office/officeart/2005/8/layout/hierarchy2"/>
-    <dgm:cxn modelId="{5999168E-E663-4FA7-8F8E-4115F08EA916}" type="presOf" srcId="{A9425E43-8565-4DC1-ADF9-A6F6CC5FAE09}" destId="{C12856FC-6BF0-4829-B1C1-892941F7788F}" srcOrd="0" destOrd="0" presId="urn:microsoft.com/office/officeart/2005/8/layout/hierarchy2"/>
-    <dgm:cxn modelId="{8C49347F-935A-429D-A52D-D5E04210D3A2}" srcId="{1621E007-26BC-431B-A947-D00592434C8A}" destId="{22035727-4FFA-4769-9563-F7965264B9CE}" srcOrd="10" destOrd="0" parTransId="{33521470-74F2-4318-82F2-1221CE8185A0}" sibTransId="{1D85182D-7400-408C-BF5D-1CD4D4F8F4CD}"/>
-    <dgm:cxn modelId="{8152B6EB-DE49-46A2-B8A9-11F2A6C9844A}" type="presOf" srcId="{15E4B482-AFEA-4015-890A-0C7DDF034B86}" destId="{C56CD8FA-6820-4927-857B-24AC03A0848E}" srcOrd="0" destOrd="0" presId="urn:microsoft.com/office/officeart/2005/8/layout/hierarchy2"/>
-    <dgm:cxn modelId="{2935B89D-F608-4F20-8099-3000F9BD40F0}" type="presOf" srcId="{B861AA13-B6E7-4491-8330-933D1EB7B477}" destId="{F807C5DA-62F5-4DA2-8E25-CF1093B0137B}" srcOrd="1" destOrd="0" presId="urn:microsoft.com/office/officeart/2005/8/layout/hierarchy2"/>
-    <dgm:cxn modelId="{194E0EDA-1E5E-4874-960A-5E03E346264E}" type="presOf" srcId="{7D533F1C-05DF-49C1-86C2-C5854F2819F0}" destId="{38CBF0CF-DF9C-4635-8162-00C9EDAB6B38}" srcOrd="0" destOrd="0" presId="urn:microsoft.com/office/officeart/2005/8/layout/hierarchy2"/>
-    <dgm:cxn modelId="{DFA3C99B-21BE-4C47-A0DA-3DF1E961713C}" type="presOf" srcId="{CA6A0933-6C98-4683-B217-04900501B08F}" destId="{D2517C91-CD98-47B1-A003-057FA67CA5D1}" srcOrd="1" destOrd="0" presId="urn:microsoft.com/office/officeart/2005/8/layout/hierarchy2"/>
-    <dgm:cxn modelId="{12E1E56B-66AF-4B47-851B-CABB7E8D28A9}" type="presOf" srcId="{E9634F12-2274-463C-A61F-87BCD69B6947}" destId="{72214F6E-4077-473E-BF8C-AEA5D0F63B4E}" srcOrd="0" destOrd="0" presId="urn:microsoft.com/office/officeart/2005/8/layout/hierarchy2"/>
-    <dgm:cxn modelId="{A50BD651-0EF5-44E4-AB4D-09BC78028AE9}" srcId="{1621E007-26BC-431B-A947-D00592434C8A}" destId="{E935FE52-05D6-4140-AF32-6115C89279B0}" srcOrd="12" destOrd="0" parTransId="{87660166-6C27-48D1-9BE6-02BDDECD0139}" sibTransId="{C3FDAB9F-9192-40AC-BD34-38E74C704B14}"/>
-    <dgm:cxn modelId="{E3D07E5F-79C2-48B3-9C15-E76058D0B6BA}" srcId="{1621E007-26BC-431B-A947-D00592434C8A}" destId="{997D802B-EDA6-426A-A593-87509BA2B754}" srcOrd="16" destOrd="0" parTransId="{483EA5FF-3DBC-44B4-9E11-A222E6E70FFE}" sibTransId="{8C4E3172-2E41-4E63-87B2-E52694E4AB85}"/>
-    <dgm:cxn modelId="{7980070E-57A8-4D76-BE26-ECFE0F980C3D}" type="presOf" srcId="{87660166-6C27-48D1-9BE6-02BDDECD0139}" destId="{76D37528-8758-462F-9A24-15F4E7D03C7C}" srcOrd="1" destOrd="0" presId="urn:microsoft.com/office/officeart/2005/8/layout/hierarchy2"/>
-    <dgm:cxn modelId="{F7619BF1-77F7-486C-9E97-A012A5B02177}" type="presOf" srcId="{277A48CB-99E3-48D6-84D3-364683E617B8}" destId="{BE508878-67FD-4AA5-8674-45DE5876D25E}" srcOrd="1" destOrd="0" presId="urn:microsoft.com/office/officeart/2005/8/layout/hierarchy2"/>
-    <dgm:cxn modelId="{1AB90BD9-1D45-4874-AF0A-BF8B080947F4}" type="presOf" srcId="{22035727-4FFA-4769-9563-F7965264B9CE}" destId="{1F479AC0-84F6-4267-86ED-B588DB647B4D}" srcOrd="0" destOrd="0" presId="urn:microsoft.com/office/officeart/2005/8/layout/hierarchy2"/>
-    <dgm:cxn modelId="{64358890-4CF8-4FDA-B419-A59464A3C4E2}" srcId="{1621E007-26BC-431B-A947-D00592434C8A}" destId="{AF5B58CD-DBD5-4A38-AB27-B9FF44924450}" srcOrd="1" destOrd="0" parTransId="{4C1760A4-FF6B-41F2-9645-A6A075E2AFD1}" sibTransId="{E8420978-E1EC-491A-8B5D-6BB5CE860AAD}"/>
-    <dgm:cxn modelId="{54A65D46-0876-46B9-A614-668D1BE7649F}" type="presOf" srcId="{F0A24312-BBA6-4924-A7C3-28FB7B93680F}" destId="{812D9E0E-28E0-47F2-9168-168FE96C4119}" srcOrd="0" destOrd="0" presId="urn:microsoft.com/office/officeart/2005/8/layout/hierarchy2"/>
-    <dgm:cxn modelId="{7BB31B87-DBD8-435B-8604-6D5957C33A09}" srcId="{1621E007-26BC-431B-A947-D00592434C8A}" destId="{B2C3B80E-ED8F-43C0-A8F5-626D22BB61A3}" srcOrd="14" destOrd="0" parTransId="{95C69F40-CCE5-4DB6-A0E1-6455B56639C0}" sibTransId="{D705935D-6B52-4227-9214-CF38DFBA015F}"/>
-    <dgm:cxn modelId="{E74301BB-0840-4881-B997-AA0C3CE3470A}" srcId="{A2D4EA81-EFBF-482D-BC64-D7C64ED9D918}" destId="{018D90FD-8799-4B29-9A27-2CAE092621D9}" srcOrd="0" destOrd="0" parTransId="{2E876ED2-287D-4263-871C-C8395B476B36}" sibTransId="{9404BEC3-82D2-43BF-89F3-28ABC0D1B3AD}"/>
-    <dgm:cxn modelId="{1F7BEE44-A2B0-444E-BB6F-ADEE03BBDC81}" type="presOf" srcId="{C97438D4-6CDE-44C1-8028-FAF23EC23A32}" destId="{73658599-AFA6-4FA5-B3AD-84ECA55BD92C}" srcOrd="1" destOrd="0" presId="urn:microsoft.com/office/officeart/2005/8/layout/hierarchy2"/>
-    <dgm:cxn modelId="{6E5177BD-F439-4710-9AD1-40D3A46AEA4B}" type="presOf" srcId="{1621E007-26BC-431B-A947-D00592434C8A}" destId="{7553DE84-83A2-40EF-A695-B16F3A691097}" srcOrd="0" destOrd="0" presId="urn:microsoft.com/office/officeart/2005/8/layout/hierarchy2"/>
-    <dgm:cxn modelId="{B5452DC5-4CC7-43DB-B385-E428A38BD84F}" type="presOf" srcId="{997D802B-EDA6-426A-A593-87509BA2B754}" destId="{89A9170F-394A-46D3-BEE1-B36921F6E1C6}" srcOrd="0" destOrd="0" presId="urn:microsoft.com/office/officeart/2005/8/layout/hierarchy2"/>
-    <dgm:cxn modelId="{BDBA4EE2-87B1-4058-84BE-1837AB36E929}" srcId="{194C1557-6784-4DAD-854A-7221EFB03390}" destId="{6C7C46CA-6D81-42A3-8942-427BC01E9410}" srcOrd="0" destOrd="0" parTransId="{A9425E43-8565-4DC1-ADF9-A6F6CC5FAE09}" sibTransId="{FB55F8BD-11BB-40DA-9F27-7C2CB933911E}"/>
-    <dgm:cxn modelId="{3AC22F1E-B09E-44A5-84E9-6C4803C52CC7}" type="presOf" srcId="{A2D4EA81-EFBF-482D-BC64-D7C64ED9D918}" destId="{6A951408-BFCE-48CE-BBB6-5296E99687F8}" srcOrd="0" destOrd="0" presId="urn:microsoft.com/office/officeart/2005/8/layout/hierarchy2"/>
-    <dgm:cxn modelId="{5EE0C4E2-F11E-45A0-936B-07AFD506B368}" type="presOf" srcId="{33521470-74F2-4318-82F2-1221CE8185A0}" destId="{A22484D8-88D9-4A8E-AD4D-366762E28902}" srcOrd="0" destOrd="0" presId="urn:microsoft.com/office/officeart/2005/8/layout/hierarchy2"/>
-    <dgm:cxn modelId="{49CEF8DE-26A6-4B59-AA98-AA187745ED07}" type="presOf" srcId="{E86C9E3E-FA9C-4589-AAE9-49E75D1C4E3E}" destId="{C158577F-04B7-4841-A954-51BD6529841D}" srcOrd="1" destOrd="0" presId="urn:microsoft.com/office/officeart/2005/8/layout/hierarchy2"/>
-    <dgm:cxn modelId="{8AAD090D-ED1C-4F09-9003-4765F2811B65}" type="presOf" srcId="{FF9F1C55-2091-412D-978D-952A963BFBC2}" destId="{49209AC6-2E93-4812-BC92-F8809F087070}" srcOrd="1" destOrd="0" presId="urn:microsoft.com/office/officeart/2005/8/layout/hierarchy2"/>
-    <dgm:cxn modelId="{EDF016CA-7122-4266-9EF9-8920D13ABAF3}" type="presOf" srcId="{E8D2DC6D-1D84-4535-AE7F-FD3683FD5774}" destId="{FDBCCBDA-7886-4198-A550-D751C46FBF9D}" srcOrd="0" destOrd="0" presId="urn:microsoft.com/office/officeart/2005/8/layout/hierarchy2"/>
-    <dgm:cxn modelId="{FEC60686-29D3-4379-8DED-A5E71F13C419}" type="presOf" srcId="{E8D2DC6D-1D84-4535-AE7F-FD3683FD5774}" destId="{6BC97E7D-2A52-423C-8E1D-64FAC781C55A}" srcOrd="1" destOrd="0" presId="urn:microsoft.com/office/officeart/2005/8/layout/hierarchy2"/>
-    <dgm:cxn modelId="{5E1BF471-5814-477C-92E8-E2CB60FA3DA0}" type="presOf" srcId="{A9425E43-8565-4DC1-ADF9-A6F6CC5FAE09}" destId="{814E44F4-CF24-4219-8005-96C32DF3E2B5}" srcOrd="1" destOrd="0" presId="urn:microsoft.com/office/officeart/2005/8/layout/hierarchy2"/>
-    <dgm:cxn modelId="{6196D01F-6D24-4030-A5DE-56EDFC3976F9}" srcId="{1621E007-26BC-431B-A947-D00592434C8A}" destId="{1DE2FE6F-F9E1-40AA-9B09-69C06C93EB2D}" srcOrd="3" destOrd="0" parTransId="{E86C9E3E-FA9C-4589-AAE9-49E75D1C4E3E}" sibTransId="{056A7605-A744-4C3E-AE99-EAEF1A3003F2}"/>
-    <dgm:cxn modelId="{1A5ED2E4-50B0-4859-965A-0E737C899C40}" type="presOf" srcId="{4C1760A4-FF6B-41F2-9645-A6A075E2AFD1}" destId="{B3A493D0-2FE9-4046-9D9A-466B67365C53}" srcOrd="1" destOrd="0" presId="urn:microsoft.com/office/officeart/2005/8/layout/hierarchy2"/>
-    <dgm:cxn modelId="{1DE66A5C-E112-4B3A-868C-CE2D93040F25}" srcId="{018D90FD-8799-4B29-9A27-2CAE092621D9}" destId="{194C1557-6784-4DAD-854A-7221EFB03390}" srcOrd="1" destOrd="0" parTransId="{BD596FC2-8073-487C-A373-8B4252B3D9C4}" sibTransId="{35E58A38-85CD-4E09-904B-CF6B2BFF8AE1}"/>
-    <dgm:cxn modelId="{F97F3BF1-6F9B-4FC3-BCB0-93EB14A19E04}" srcId="{1621E007-26BC-431B-A947-D00592434C8A}" destId="{297FDFBD-810F-41DF-8509-3C7305003CFE}" srcOrd="15" destOrd="0" parTransId="{050844DA-3DD7-4728-95B2-337567902959}" sibTransId="{74FA41EC-9605-4EFF-AB67-349FF63C5D78}"/>
-    <dgm:cxn modelId="{E7F19C12-F5AC-4348-8A6A-5F36A585BCC4}" type="presOf" srcId="{C248B9FB-8E11-402F-ADA5-542892675409}" destId="{232E3FC3-F2E5-40D9-9802-02FEC26B0864}" srcOrd="0" destOrd="0" presId="urn:microsoft.com/office/officeart/2005/8/layout/hierarchy2"/>
-    <dgm:cxn modelId="{6033879F-5A6E-4A6A-811D-056B5FDFE4CE}" type="presOf" srcId="{82F99002-2364-48E8-9474-D1E3E8E80742}" destId="{C4FAF5E1-9087-4502-A0C1-6CB0C16C40B6}" srcOrd="0" destOrd="0" presId="urn:microsoft.com/office/officeart/2005/8/layout/hierarchy2"/>
-    <dgm:cxn modelId="{C12BF986-AFA5-4F93-8A65-CB3FA95B12BE}" type="presOf" srcId="{483EA5FF-3DBC-44B4-9E11-A222E6E70FFE}" destId="{C991F14E-1E6A-4E8F-A6E3-D4D7572941DD}" srcOrd="1" destOrd="0" presId="urn:microsoft.com/office/officeart/2005/8/layout/hierarchy2"/>
-    <dgm:cxn modelId="{CB78EE40-0063-421C-8617-8A44EDBAB942}" type="presOf" srcId="{15BFEC00-8BF0-424B-812C-6211CB48BAB5}" destId="{7CAD9913-F4D5-418B-B9FF-F9F360CCA625}" srcOrd="1" destOrd="0" presId="urn:microsoft.com/office/officeart/2005/8/layout/hierarchy2"/>
-    <dgm:cxn modelId="{976CE673-41BA-4452-BEFD-421D859E898A}" type="presOf" srcId="{33521470-74F2-4318-82F2-1221CE8185A0}" destId="{74CCCE04-5B34-4268-9B28-31D835ABC869}" srcOrd="1" destOrd="0" presId="urn:microsoft.com/office/officeart/2005/8/layout/hierarchy2"/>
-    <dgm:cxn modelId="{98F97CE8-B306-42EC-8E65-193C46413BE8}" type="presOf" srcId="{CA6A0933-6C98-4683-B217-04900501B08F}" destId="{99E2DF40-6437-4F07-8F2E-79D80FBB7613}" srcOrd="0" destOrd="0" presId="urn:microsoft.com/office/officeart/2005/8/layout/hierarchy2"/>
-    <dgm:cxn modelId="{82C6A42E-618B-4B19-A077-B5168866EE4B}" type="presOf" srcId="{1DE2FE6F-F9E1-40AA-9B09-69C06C93EB2D}" destId="{BEE62EB9-4BC9-4278-B431-6B95B0C29736}" srcOrd="0" destOrd="0" presId="urn:microsoft.com/office/officeart/2005/8/layout/hierarchy2"/>
-    <dgm:cxn modelId="{B9976C38-9A52-4242-9155-54FF6C2E6A71}" srcId="{1621E007-26BC-431B-A947-D00592434C8A}" destId="{C248B9FB-8E11-402F-ADA5-542892675409}" srcOrd="9" destOrd="0" parTransId="{FF9F1C55-2091-412D-978D-952A963BFBC2}" sibTransId="{3D7F846F-E864-4F5C-B91B-C8ABFAF0CDC2}"/>
-    <dgm:cxn modelId="{2A6E9EA6-AD8F-494E-A778-FA302343D12A}" type="presOf" srcId="{95C69F40-CCE5-4DB6-A0E1-6455B56639C0}" destId="{6B9E54D5-136F-4A04-B8E1-6DF53875F682}" srcOrd="1" destOrd="0" presId="urn:microsoft.com/office/officeart/2005/8/layout/hierarchy2"/>
-    <dgm:cxn modelId="{6DEC531A-2253-4543-B876-B2C9D476C135}" type="presOf" srcId="{4C1760A4-FF6B-41F2-9645-A6A075E2AFD1}" destId="{D1667392-08A5-400E-A47D-1B3AF25FE52A}" srcOrd="0" destOrd="0" presId="urn:microsoft.com/office/officeart/2005/8/layout/hierarchy2"/>
-    <dgm:cxn modelId="{B9FE11F9-CDDA-4E07-9D79-09655EA06051}" type="presOf" srcId="{7D533F1C-05DF-49C1-86C2-C5854F2819F0}" destId="{0C747E17-E4F9-4CCB-A1B1-5520DBCC9CEF}" srcOrd="1" destOrd="0" presId="urn:microsoft.com/office/officeart/2005/8/layout/hierarchy2"/>
-    <dgm:cxn modelId="{66A7CAE1-6289-4DC1-B7D7-337655D53B5B}" type="presOf" srcId="{483EA5FF-3DBC-44B4-9E11-A222E6E70FFE}" destId="{2B11C088-24B1-4E33-894C-0C75E2725FF1}" srcOrd="0" destOrd="0" presId="urn:microsoft.com/office/officeart/2005/8/layout/hierarchy2"/>
-    <dgm:cxn modelId="{04343849-3724-4A24-B606-351D89E20619}" srcId="{1621E007-26BC-431B-A947-D00592434C8A}" destId="{E9634F12-2274-463C-A61F-87BCD69B6947}" srcOrd="8" destOrd="0" parTransId="{5581ADD0-476D-419B-BA44-5096A40EEBE5}" sibTransId="{C7FA2E9E-E1A8-4361-8EDB-88A94B7865EE}"/>
     <dgm:cxn modelId="{AB53DA8B-0504-4524-BE4A-B81902FCD8E8}" type="presOf" srcId="{15BFEC00-8BF0-424B-812C-6211CB48BAB5}" destId="{6AAEF27A-CFF0-46AB-89E7-E67E4225C49B}" srcOrd="0" destOrd="0" presId="urn:microsoft.com/office/officeart/2005/8/layout/hierarchy2"/>
-    <dgm:cxn modelId="{12E15661-3473-4D5B-A429-BAD6613E4E55}" type="presOf" srcId="{B861AA13-B6E7-4491-8330-933D1EB7B477}" destId="{BE94FC41-7E45-4EC8-929B-E375718E9CFD}" srcOrd="0" destOrd="0" presId="urn:microsoft.com/office/officeart/2005/8/layout/hierarchy2"/>
-    <dgm:cxn modelId="{B5272265-3051-4410-ADD4-942ACBFD930C}" type="presOf" srcId="{E86C9E3E-FA9C-4589-AAE9-49E75D1C4E3E}" destId="{34DA80DF-C9F3-4B91-8344-8D94A6373D31}" srcOrd="0" destOrd="0" presId="urn:microsoft.com/office/officeart/2005/8/layout/hierarchy2"/>
-    <dgm:cxn modelId="{AB6C6DD5-A3D4-4975-A56F-AB2F08D9571C}" srcId="{1621E007-26BC-431B-A947-D00592434C8A}" destId="{82F99002-2364-48E8-9474-D1E3E8E80742}" srcOrd="4" destOrd="0" parTransId="{C97438D4-6CDE-44C1-8028-FAF23EC23A32}" sibTransId="{BF01C926-9370-4E53-AFB9-279CA17B615B}"/>
-    <dgm:cxn modelId="{FFD0ABB0-21F4-4A89-B2F6-0DA3752D8978}" type="presOf" srcId="{87660166-6C27-48D1-9BE6-02BDDECD0139}" destId="{AB85DCB8-E6AC-46D8-AA7D-EF2B5135B688}" srcOrd="0" destOrd="0" presId="urn:microsoft.com/office/officeart/2005/8/layout/hierarchy2"/>
-    <dgm:cxn modelId="{82DCCFD3-0196-4CBC-BAAD-A7F107FC07E7}" type="presOf" srcId="{277A48CB-99E3-48D6-84D3-364683E617B8}" destId="{F2BBC305-1F87-4F4E-82A1-C05C2963265B}" srcOrd="0" destOrd="0" presId="urn:microsoft.com/office/officeart/2005/8/layout/hierarchy2"/>
-    <dgm:cxn modelId="{CC7A93A8-DB52-417E-85BC-00AAEBD300FC}" type="presOf" srcId="{E3812FED-48B3-4921-B88E-8AEE57F062DF}" destId="{971DCA25-CA70-406F-A12F-81E9A4B41B13}" srcOrd="0" destOrd="0" presId="urn:microsoft.com/office/officeart/2005/8/layout/hierarchy2"/>
-    <dgm:cxn modelId="{85B1DF8B-8C67-4FDF-92B2-277F0EB2B3C5}" type="presOf" srcId="{8A89CF52-8451-401A-AB86-A242D7054C01}" destId="{42996DB6-E9C4-4D9D-95DC-39E2177AF04C}" srcOrd="1" destOrd="0" presId="urn:microsoft.com/office/officeart/2005/8/layout/hierarchy2"/>
-    <dgm:cxn modelId="{DC4E0A4D-702D-4D93-AAD8-7390BAFFA087}" type="presOf" srcId="{297FDFBD-810F-41DF-8509-3C7305003CFE}" destId="{9F07CD4A-318D-4205-B8A7-B8254F09A4FF}" srcOrd="0" destOrd="0" presId="urn:microsoft.com/office/officeart/2005/8/layout/hierarchy2"/>
-    <dgm:cxn modelId="{03F07E1C-2F78-44F1-92EF-2B832D8F5295}" type="presOf" srcId="{98CC74F6-072D-4F1D-89B4-2638558C1ABA}" destId="{2CBAF20D-C1DF-4B36-9E86-5B7B316B9B76}" srcOrd="1" destOrd="0" presId="urn:microsoft.com/office/officeart/2005/8/layout/hierarchy2"/>
-    <dgm:cxn modelId="{8A4DB9F5-84CD-4FD3-A8B7-2CA85608912C}" type="presOf" srcId="{050844DA-3DD7-4728-95B2-337567902959}" destId="{58C6AA60-6F3B-40DB-9946-76A58571817F}" srcOrd="1" destOrd="0" presId="urn:microsoft.com/office/officeart/2005/8/layout/hierarchy2"/>
-    <dgm:cxn modelId="{ED6AA186-21AB-4627-A8FE-D7CB07CF7BEC}" type="presOf" srcId="{E935FE52-05D6-4140-AF32-6115C89279B0}" destId="{66457418-62B0-4CF7-8E2D-C279A9219CDE}" srcOrd="0" destOrd="0" presId="urn:microsoft.com/office/officeart/2005/8/layout/hierarchy2"/>
-    <dgm:cxn modelId="{F47F5459-DEA0-4ADE-949B-4EB41A9C56C5}" type="presOf" srcId="{B18B0066-9FAC-47D8-A96F-F9546974DB97}" destId="{71664F23-62A3-45D4-B742-6B3578F3BC43}" srcOrd="0" destOrd="0" presId="urn:microsoft.com/office/officeart/2005/8/layout/hierarchy2"/>
-    <dgm:cxn modelId="{2E113F35-2091-4335-A294-CCCAA30BF06C}" type="presOf" srcId="{FF9F1C55-2091-412D-978D-952A963BFBC2}" destId="{F8AACCF6-CFE7-402F-B8ED-29BC5733A870}" srcOrd="0" destOrd="0" presId="urn:microsoft.com/office/officeart/2005/8/layout/hierarchy2"/>
-    <dgm:cxn modelId="{EB16A3EE-8BD7-4018-B775-42330764A85F}" type="presOf" srcId="{8A89CF52-8451-401A-AB86-A242D7054C01}" destId="{4EAF1BA9-1E2E-42D0-8B45-203DE822089C}" srcOrd="0" destOrd="0" presId="urn:microsoft.com/office/officeart/2005/8/layout/hierarchy2"/>
-    <dgm:cxn modelId="{A24DFA52-FA7A-42B4-B438-9775B8EBE944}" type="presOf" srcId="{194C1557-6784-4DAD-854A-7221EFB03390}" destId="{436B8739-C5A6-4C15-B0ED-4D1CE39CB43C}" srcOrd="0" destOrd="0" presId="urn:microsoft.com/office/officeart/2005/8/layout/hierarchy2"/>
-    <dgm:cxn modelId="{A875E0B0-9B10-4BE8-AECE-36600FA2EE9C}" type="presOf" srcId="{5581ADD0-476D-419B-BA44-5096A40EEBE5}" destId="{B80FA7EE-0B0F-4C6A-8A52-16B4B0AA9806}" srcOrd="1" destOrd="0" presId="urn:microsoft.com/office/officeart/2005/8/layout/hierarchy2"/>
-    <dgm:cxn modelId="{C33D31DF-9621-497D-A8EE-EF34B9795CEF}" srcId="{018D90FD-8799-4B29-9A27-2CAE092621D9}" destId="{1621E007-26BC-431B-A947-D00592434C8A}" srcOrd="0" destOrd="0" parTransId="{CA6A0933-6C98-4683-B217-04900501B08F}" sibTransId="{EF712F9A-CBC5-4F62-B397-6C866469F4DA}"/>
+    <dgm:cxn modelId="{0738BBC8-3043-47F1-ACBF-CF34E14AFE6F}" type="presOf" srcId="{0DA65A98-3B9E-4210-AB71-1310F25DC60B}" destId="{5EA884E9-6CF9-4789-8B3C-CDC614F4DD67}" srcOrd="0" destOrd="0" presId="urn:microsoft.com/office/officeart/2005/8/layout/hierarchy2"/>
     <dgm:cxn modelId="{71341ACA-32F6-4F91-9AC8-89829557B1D7}" type="presParOf" srcId="{6A951408-BFCE-48CE-BBB6-5296E99687F8}" destId="{78455393-AF30-4BEB-98DB-DF0379F34AF7}" srcOrd="0" destOrd="0" presId="urn:microsoft.com/office/officeart/2005/8/layout/hierarchy2"/>
     <dgm:cxn modelId="{2E8199A7-02EC-4A42-9AB4-BC128D95C340}" type="presParOf" srcId="{78455393-AF30-4BEB-98DB-DF0379F34AF7}" destId="{D844DE08-D3C8-46A6-B42F-878F26C95F1E}" srcOrd="0" destOrd="0" presId="urn:microsoft.com/office/officeart/2005/8/layout/hierarchy2"/>
     <dgm:cxn modelId="{E97A4C0D-2BA3-42C4-B12F-EEC03CDE488F}" type="presParOf" srcId="{78455393-AF30-4BEB-98DB-DF0379F34AF7}" destId="{4C84633E-2B2B-4BCB-8437-A7E480B67403}" srcOrd="1" destOrd="0" presId="urn:microsoft.com/office/officeart/2005/8/layout/hierarchy2"/>
@@ -2651,22 +3308,32 @@
     <dgm:cxn modelId="{A85F1B05-1699-4C45-8230-A3416E43EE7A}" type="presParOf" srcId="{4C84633E-2B2B-4BCB-8437-A7E480B67403}" destId="{A4C478D0-6B73-4839-A358-1C4667665F35}" srcOrd="3" destOrd="0" presId="urn:microsoft.com/office/officeart/2005/8/layout/hierarchy2"/>
     <dgm:cxn modelId="{72BA4CD6-998C-4CC8-8107-51C36EB50D7E}" type="presParOf" srcId="{A4C478D0-6B73-4839-A358-1C4667665F35}" destId="{436B8739-C5A6-4C15-B0ED-4D1CE39CB43C}" srcOrd="0" destOrd="0" presId="urn:microsoft.com/office/officeart/2005/8/layout/hierarchy2"/>
     <dgm:cxn modelId="{4E8F6B7F-23ED-48BB-A414-6EDF96DAA297}" type="presParOf" srcId="{A4C478D0-6B73-4839-A358-1C4667665F35}" destId="{CB54DBE0-3FAC-4B06-89D8-EE85B26A73C9}" srcOrd="1" destOrd="0" presId="urn:microsoft.com/office/officeart/2005/8/layout/hierarchy2"/>
-    <dgm:cxn modelId="{05713299-C572-48E8-8D17-490B75ED2648}" type="presParOf" srcId="{CB54DBE0-3FAC-4B06-89D8-EE85B26A73C9}" destId="{C12856FC-6BF0-4829-B1C1-892941F7788F}" srcOrd="0" destOrd="0" presId="urn:microsoft.com/office/officeart/2005/8/layout/hierarchy2"/>
-    <dgm:cxn modelId="{9C6BAC0E-3B7B-4D98-AE84-89CA5E7AC637}" type="presParOf" srcId="{C12856FC-6BF0-4829-B1C1-892941F7788F}" destId="{814E44F4-CF24-4219-8005-96C32DF3E2B5}" srcOrd="0" destOrd="0" presId="urn:microsoft.com/office/officeart/2005/8/layout/hierarchy2"/>
-    <dgm:cxn modelId="{B51F645C-054F-482E-85F4-9E192EBB30D9}" type="presParOf" srcId="{CB54DBE0-3FAC-4B06-89D8-EE85B26A73C9}" destId="{8931E7B8-4680-4E02-83D2-0613815CC72E}" srcOrd="1" destOrd="0" presId="urn:microsoft.com/office/officeart/2005/8/layout/hierarchy2"/>
-    <dgm:cxn modelId="{E5599626-F099-47DC-978A-92B1CD5AA73B}" type="presParOf" srcId="{8931E7B8-4680-4E02-83D2-0613815CC72E}" destId="{B7265FB0-AFB2-4500-9131-FCDF39A72713}" srcOrd="0" destOrd="0" presId="urn:microsoft.com/office/officeart/2005/8/layout/hierarchy2"/>
-    <dgm:cxn modelId="{82B75399-2E99-4C0A-B2DB-69C59FCDDC3C}" type="presParOf" srcId="{8931E7B8-4680-4E02-83D2-0613815CC72E}" destId="{CE6A6E74-D0CC-4A33-8A35-E39019D876AC}" srcOrd="1" destOrd="0" presId="urn:microsoft.com/office/officeart/2005/8/layout/hierarchy2"/>
-    <dgm:cxn modelId="{8CE2CE3F-61B5-4825-8190-95A9A8C4B67C}" type="presParOf" srcId="{CB54DBE0-3FAC-4B06-89D8-EE85B26A73C9}" destId="{F2BBC305-1F87-4F4E-82A1-C05C2963265B}" srcOrd="2" destOrd="0" presId="urn:microsoft.com/office/officeart/2005/8/layout/hierarchy2"/>
-    <dgm:cxn modelId="{AC694FAB-7F19-4D91-9641-4C4A6FF0800E}" type="presParOf" srcId="{F2BBC305-1F87-4F4E-82A1-C05C2963265B}" destId="{BE508878-67FD-4AA5-8674-45DE5876D25E}" srcOrd="0" destOrd="0" presId="urn:microsoft.com/office/officeart/2005/8/layout/hierarchy2"/>
-    <dgm:cxn modelId="{0CF1E65F-9243-45A9-918C-6B67BFF7A3C6}" type="presParOf" srcId="{CB54DBE0-3FAC-4B06-89D8-EE85B26A73C9}" destId="{B0CE3E55-896F-4ACF-8207-F706A390225C}" srcOrd="3" destOrd="0" presId="urn:microsoft.com/office/officeart/2005/8/layout/hierarchy2"/>
-    <dgm:cxn modelId="{B632A123-D3B1-48EF-BCD2-271D6F3FAF1E}" type="presParOf" srcId="{B0CE3E55-896F-4ACF-8207-F706A390225C}" destId="{812D9E0E-28E0-47F2-9168-168FE96C4119}" srcOrd="0" destOrd="0" presId="urn:microsoft.com/office/officeart/2005/8/layout/hierarchy2"/>
-    <dgm:cxn modelId="{BB0B81AD-A1CC-41AA-BC72-EAD5192C7180}" type="presParOf" srcId="{B0CE3E55-896F-4ACF-8207-F706A390225C}" destId="{6943FCDA-5AB1-4BA5-8BF8-211A7C71A0EC}" srcOrd="1" destOrd="0" presId="urn:microsoft.com/office/officeart/2005/8/layout/hierarchy2"/>
+    <dgm:cxn modelId="{2AF6761D-56D7-4D48-BA63-9C748F7BD3F1}" type="presParOf" srcId="{CB54DBE0-3FAC-4B06-89D8-EE85B26A73C9}" destId="{60CF692B-2C90-486F-8E39-2CE7219D0895}" srcOrd="0" destOrd="0" presId="urn:microsoft.com/office/officeart/2005/8/layout/hierarchy2"/>
+    <dgm:cxn modelId="{5344E470-BAA7-47E1-9B3C-05DCC1B9657D}" type="presParOf" srcId="{60CF692B-2C90-486F-8E39-2CE7219D0895}" destId="{8FEE4A9A-8969-4DEB-9713-07A7DBD115B7}" srcOrd="0" destOrd="0" presId="urn:microsoft.com/office/officeart/2005/8/layout/hierarchy2"/>
+    <dgm:cxn modelId="{C82CC954-FF48-4859-8972-7C77300D0333}" type="presParOf" srcId="{CB54DBE0-3FAC-4B06-89D8-EE85B26A73C9}" destId="{D13AD490-B77D-4D86-8102-BEF7937998BE}" srcOrd="1" destOrd="0" presId="urn:microsoft.com/office/officeart/2005/8/layout/hierarchy2"/>
+    <dgm:cxn modelId="{1602940A-52B7-4465-9568-0542BC92C6B2}" type="presParOf" srcId="{D13AD490-B77D-4D86-8102-BEF7937998BE}" destId="{5EA884E9-6CF9-4789-8B3C-CDC614F4DD67}" srcOrd="0" destOrd="0" presId="urn:microsoft.com/office/officeart/2005/8/layout/hierarchy2"/>
+    <dgm:cxn modelId="{129B29DC-B9B8-4848-8606-E92BD4BEE093}" type="presParOf" srcId="{D13AD490-B77D-4D86-8102-BEF7937998BE}" destId="{CAB0091C-6349-4F9B-8FEE-5BD77022D61B}" srcOrd="1" destOrd="0" presId="urn:microsoft.com/office/officeart/2005/8/layout/hierarchy2"/>
+    <dgm:cxn modelId="{6ACCE8AD-4AF0-4154-8AF8-B6A9C9BD9D33}" type="presParOf" srcId="{CB54DBE0-3FAC-4B06-89D8-EE85B26A73C9}" destId="{8CD6D8AF-8F64-4643-93A2-B802E9D13D18}" srcOrd="2" destOrd="0" presId="urn:microsoft.com/office/officeart/2005/8/layout/hierarchy2"/>
+    <dgm:cxn modelId="{109F1128-2E2F-4A65-B443-0BB5982F32D7}" type="presParOf" srcId="{8CD6D8AF-8F64-4643-93A2-B802E9D13D18}" destId="{B6CD9049-C3B5-471D-86D3-57BE215BD645}" srcOrd="0" destOrd="0" presId="urn:microsoft.com/office/officeart/2005/8/layout/hierarchy2"/>
+    <dgm:cxn modelId="{75030E5F-324F-439A-890C-E3B096F52D4F}" type="presParOf" srcId="{CB54DBE0-3FAC-4B06-89D8-EE85B26A73C9}" destId="{ACED0CC2-5142-4391-A974-C8A1DA828F97}" srcOrd="3" destOrd="0" presId="urn:microsoft.com/office/officeart/2005/8/layout/hierarchy2"/>
+    <dgm:cxn modelId="{396279DB-F104-4EE1-B9C1-8AD7E6D16D20}" type="presParOf" srcId="{ACED0CC2-5142-4391-A974-C8A1DA828F97}" destId="{C7034579-8E80-4D1A-BF61-A57342567F4C}" srcOrd="0" destOrd="0" presId="urn:microsoft.com/office/officeart/2005/8/layout/hierarchy2"/>
+    <dgm:cxn modelId="{6EC1C897-E65C-40BA-80F2-00AA8AA7874A}" type="presParOf" srcId="{ACED0CC2-5142-4391-A974-C8A1DA828F97}" destId="{EC24ED2B-C39A-45D2-9A5B-0FC8DFBD2AF2}" srcOrd="1" destOrd="0" presId="urn:microsoft.com/office/officeart/2005/8/layout/hierarchy2"/>
+    <dgm:cxn modelId="{08EC2473-27AF-4755-843C-803AA5267C74}" type="presParOf" srcId="{CB54DBE0-3FAC-4B06-89D8-EE85B26A73C9}" destId="{F2BBC305-1F87-4F4E-82A1-C05C2963265B}" srcOrd="4" destOrd="0" presId="urn:microsoft.com/office/officeart/2005/8/layout/hierarchy2"/>
+    <dgm:cxn modelId="{84BBA367-282C-464F-833D-D39C8FEC1EF8}" type="presParOf" srcId="{F2BBC305-1F87-4F4E-82A1-C05C2963265B}" destId="{BE508878-67FD-4AA5-8674-45DE5876D25E}" srcOrd="0" destOrd="0" presId="urn:microsoft.com/office/officeart/2005/8/layout/hierarchy2"/>
+    <dgm:cxn modelId="{4EE6CE14-4D9D-408E-84F3-2404581ACEA5}" type="presParOf" srcId="{CB54DBE0-3FAC-4B06-89D8-EE85B26A73C9}" destId="{B0CE3E55-896F-4ACF-8207-F706A390225C}" srcOrd="5" destOrd="0" presId="urn:microsoft.com/office/officeart/2005/8/layout/hierarchy2"/>
+    <dgm:cxn modelId="{B380779A-FBD2-46D7-BECF-2114116714F1}" type="presParOf" srcId="{B0CE3E55-896F-4ACF-8207-F706A390225C}" destId="{812D9E0E-28E0-47F2-9168-168FE96C4119}" srcOrd="0" destOrd="0" presId="urn:microsoft.com/office/officeart/2005/8/layout/hierarchy2"/>
+    <dgm:cxn modelId="{29DEA263-446D-4056-A981-3AA346DC118A}" type="presParOf" srcId="{B0CE3E55-896F-4ACF-8207-F706A390225C}" destId="{6943FCDA-5AB1-4BA5-8BF8-211A7C71A0EC}" srcOrd="1" destOrd="0" presId="urn:microsoft.com/office/officeart/2005/8/layout/hierarchy2"/>
+    <dgm:cxn modelId="{EE86E918-3C83-44BB-9DA9-4C390EE76F74}" type="presParOf" srcId="{6943FCDA-5AB1-4BA5-8BF8-211A7C71A0EC}" destId="{3AE51C82-790C-4B64-BD8C-E0C6D5D6D7D3}" srcOrd="0" destOrd="0" presId="urn:microsoft.com/office/officeart/2005/8/layout/hierarchy2"/>
+    <dgm:cxn modelId="{A023BED8-55C1-4F66-9747-FD198BF3E593}" type="presParOf" srcId="{3AE51C82-790C-4B64-BD8C-E0C6D5D6D7D3}" destId="{FE25965E-845F-40E9-B329-0B5C5BCFC4D0}" srcOrd="0" destOrd="0" presId="urn:microsoft.com/office/officeart/2005/8/layout/hierarchy2"/>
+    <dgm:cxn modelId="{855FAF91-0BA2-4635-A7CA-CEE4279D18E8}" type="presParOf" srcId="{6943FCDA-5AB1-4BA5-8BF8-211A7C71A0EC}" destId="{E73FF2D6-CE3F-45CF-BF38-871045C7A583}" srcOrd="1" destOrd="0" presId="urn:microsoft.com/office/officeart/2005/8/layout/hierarchy2"/>
+    <dgm:cxn modelId="{E5254AF0-6F1E-4601-9903-CED0C3EDD50A}" type="presParOf" srcId="{E73FF2D6-CE3F-45CF-BF38-871045C7A583}" destId="{A07D77F0-DAFA-4A72-8540-07774004A2FC}" srcOrd="0" destOrd="0" presId="urn:microsoft.com/office/officeart/2005/8/layout/hierarchy2"/>
+    <dgm:cxn modelId="{EA76330E-D706-42B0-A2F9-3D137BBD828B}" type="presParOf" srcId="{E73FF2D6-CE3F-45CF-BF38-871045C7A583}" destId="{DBA1B4CA-8859-43F8-AEC3-B0C1A2379E93}" srcOrd="1" destOrd="0" presId="urn:microsoft.com/office/officeart/2005/8/layout/hierarchy2"/>
   </dgm:cxnLst>
   <dgm:bg/>
   <dgm:whole/>
   <dgm:extLst>
     <a:ext uri="http://schemas.microsoft.com/office/drawing/2008/diagram">
-      <dsp:dataModelExt xmlns:dsp="http://schemas.microsoft.com/office/drawing/2008/diagram" xmlns="" relId="rId6" minVer="http://schemas.openxmlformats.org/drawingml/2006/diagram"/>
+      <dsp:dataModelExt xmlns:dsp="http://schemas.microsoft.com/office/drawing/2008/diagram" xmlns="" relId="rId8" minVer="http://schemas.openxmlformats.org/drawingml/2006/diagram"/>
     </a:ext>
   </dgm:extLst>
 </dgm:dataModel>
@@ -2687,8 +3354,8 @@
       </dsp:nvSpPr>
       <dsp:spPr>
         <a:xfrm>
-          <a:off x="179509" y="2420886"/>
-          <a:ext cx="600242" cy="300121"/>
+          <a:off x="0" y="2388024"/>
+          <a:ext cx="570941" cy="285470"/>
         </a:xfrm>
         <a:prstGeom prst="roundRect">
           <a:avLst>
@@ -2810,8 +3477,8 @@
         </a:p>
       </dsp:txBody>
       <dsp:txXfrm>
-        <a:off x="179509" y="2420886"/>
-        <a:ext cx="600242" cy="300121"/>
+        <a:off x="0" y="2388024"/>
+        <a:ext cx="570941" cy="285470"/>
       </dsp:txXfrm>
     </dsp:sp>
     <dsp:sp modelId="{99E2DF40-6437-4F07-8F2E-79D80FBB7613}">
@@ -2820,9 +3487,9 @@
         <dsp:cNvSpPr/>
       </dsp:nvSpPr>
       <dsp:spPr>
-        <a:xfrm rot="17813488">
-          <a:off x="271217" y="1738917"/>
-          <a:ext cx="1856988" cy="7877"/>
+        <a:xfrm rot="17734463">
+          <a:off x="48819" y="1698308"/>
+          <a:ext cx="1837431" cy="7492"/>
         </a:xfrm>
         <a:custGeom>
           <a:avLst/>
@@ -2833,10 +3500,10 @@
           <a:pathLst>
             <a:path>
               <a:moveTo>
-                <a:pt x="0" y="3938"/>
+                <a:pt x="0" y="3746"/>
               </a:moveTo>
               <a:lnTo>
-                <a:pt x="1856988" y="3938"/>
+                <a:pt x="1837431" y="3746"/>
               </a:lnTo>
             </a:path>
           </a:pathLst>
@@ -2888,9 +3555,9 @@
           <a:endParaRPr lang="es-AR" sz="600" kern="1200"/>
         </a:p>
       </dsp:txBody>
-      <dsp:txXfrm rot="17813488">
-        <a:off x="1153287" y="1696431"/>
-        <a:ext cx="92849" cy="92849"/>
+      <dsp:txXfrm rot="17734463">
+        <a:off x="921599" y="1656119"/>
+        <a:ext cx="91871" cy="91871"/>
       </dsp:txXfrm>
     </dsp:sp>
     <dsp:sp modelId="{7553DE84-83A2-40EF-A695-B16F3A691097}">
@@ -2900,8 +3567,8 @@
       </dsp:nvSpPr>
       <dsp:spPr>
         <a:xfrm>
-          <a:off x="1619671" y="764703"/>
-          <a:ext cx="600242" cy="300121"/>
+          <a:off x="1364128" y="730614"/>
+          <a:ext cx="570941" cy="285470"/>
         </a:xfrm>
         <a:prstGeom prst="roundRect">
           <a:avLst>
@@ -3023,8 +3690,8 @@
         </a:p>
       </dsp:txBody>
       <dsp:txXfrm>
-        <a:off x="1619671" y="764703"/>
-        <a:ext cx="600242" cy="300121"/>
+        <a:off x="1364128" y="730614"/>
+        <a:ext cx="570941" cy="285470"/>
       </dsp:txXfrm>
     </dsp:sp>
     <dsp:sp modelId="{71664F23-62A3-45D4-B742-6B3578F3BC43}">
@@ -3034,8 +3701,8 @@
       </dsp:nvSpPr>
       <dsp:spPr>
         <a:xfrm rot="861293">
-          <a:off x="2130959" y="1617213"/>
-          <a:ext cx="5698351" cy="7877"/>
+          <a:off x="1850457" y="1541509"/>
+          <a:ext cx="5420189" cy="7492"/>
         </a:xfrm>
         <a:custGeom>
           <a:avLst/>
@@ -3046,10 +3713,10 @@
           <a:pathLst>
             <a:path>
               <a:moveTo>
-                <a:pt x="0" y="3938"/>
+                <a:pt x="0" y="3746"/>
               </a:moveTo>
               <a:lnTo>
-                <a:pt x="5698351" y="3938"/>
+                <a:pt x="5420189" y="3746"/>
               </a:lnTo>
             </a:path>
           </a:pathLst>
@@ -3102,8 +3769,8 @@
         </a:p>
       </dsp:txBody>
       <dsp:txXfrm rot="861293">
-        <a:off x="4837676" y="1478693"/>
-        <a:ext cx="284917" cy="284917"/>
+        <a:off x="4425047" y="1409750"/>
+        <a:ext cx="271009" cy="271009"/>
       </dsp:txXfrm>
     </dsp:sp>
     <dsp:sp modelId="{1B16D038-BF3B-4573-8A3D-1890298B5046}">
@@ -3113,8 +3780,8 @@
       </dsp:nvSpPr>
       <dsp:spPr>
         <a:xfrm>
-          <a:off x="7740355" y="2177479"/>
-          <a:ext cx="600242" cy="300121"/>
+          <a:off x="7186034" y="2074426"/>
+          <a:ext cx="570941" cy="285470"/>
         </a:xfrm>
         <a:prstGeom prst="roundRect">
           <a:avLst>
@@ -3214,14 +3881,22 @@
           </a:pPr>
           <a:r>
             <a:rPr lang="es-AR" sz="700" kern="1200" dirty="0" smtClean="0"/>
-            <a:t>SOURCE</a:t>
+            <a:t>SOURCE[</a:t>
+          </a:r>
+          <a:r>
+            <a:rPr lang="es-AR" sz="700" kern="1200" dirty="0" err="1" smtClean="0"/>
+            <a:t>key</a:t>
+          </a:r>
+          <a:r>
+            <a:rPr lang="es-AR" sz="700" kern="1200" dirty="0" smtClean="0"/>
+            <a:t>]</a:t>
           </a:r>
           <a:endParaRPr lang="es-AR" sz="700" kern="1200" dirty="0"/>
         </a:p>
       </dsp:txBody>
       <dsp:txXfrm>
-        <a:off x="7740355" y="2177479"/>
-        <a:ext cx="600242" cy="300121"/>
+        <a:off x="7186034" y="2074426"/>
+        <a:ext cx="570941" cy="285470"/>
       </dsp:txXfrm>
     </dsp:sp>
     <dsp:sp modelId="{D1667392-08A5-400E-A47D-1B3AF25FE52A}">
@@ -3231,8 +3906,8 @@
       </dsp:nvSpPr>
       <dsp:spPr>
         <a:xfrm rot="72618">
-          <a:off x="2219298" y="969140"/>
-          <a:ext cx="5521673" cy="7877"/>
+          <a:off x="1934484" y="925071"/>
+          <a:ext cx="5252135" cy="7492"/>
         </a:xfrm>
         <a:custGeom>
           <a:avLst/>
@@ -3243,10 +3918,10 @@
           <a:pathLst>
             <a:path>
               <a:moveTo>
-                <a:pt x="0" y="3938"/>
+                <a:pt x="0" y="3746"/>
               </a:moveTo>
               <a:lnTo>
-                <a:pt x="5521673" y="3938"/>
+                <a:pt x="5252135" y="3746"/>
               </a:lnTo>
             </a:path>
           </a:pathLst>
@@ -3299,8 +3974,8 @@
         </a:p>
       </dsp:txBody>
       <dsp:txXfrm rot="72618">
-        <a:off x="4842093" y="835037"/>
-        <a:ext cx="276083" cy="276083"/>
+        <a:off x="4429249" y="797514"/>
+        <a:ext cx="262606" cy="262606"/>
       </dsp:txXfrm>
     </dsp:sp>
     <dsp:sp modelId="{F9EC1916-8065-4577-B861-94B5E85EB741}">
@@ -3310,8 +3985,8 @@
       </dsp:nvSpPr>
       <dsp:spPr>
         <a:xfrm>
-          <a:off x="7740355" y="881334"/>
-          <a:ext cx="600242" cy="300121"/>
+          <a:off x="7186034" y="841551"/>
+          <a:ext cx="570941" cy="285470"/>
         </a:xfrm>
         <a:prstGeom prst="roundRect">
           <a:avLst>
@@ -3417,8 +4092,8 @@
         </a:p>
       </dsp:txBody>
       <dsp:txXfrm>
-        <a:off x="7740355" y="881334"/>
-        <a:ext cx="600242" cy="300121"/>
+        <a:off x="7186034" y="841551"/>
+        <a:ext cx="570941" cy="285470"/>
       </dsp:txXfrm>
     </dsp:sp>
     <dsp:sp modelId="{4FC67143-A3C4-49CA-983A-D83A188633AF}">
@@ -3428,8 +4103,8 @@
       </dsp:nvSpPr>
       <dsp:spPr>
         <a:xfrm rot="340560">
-          <a:off x="2206314" y="1185165"/>
-          <a:ext cx="5547641" cy="7877"/>
+          <a:off x="1922134" y="1130551"/>
+          <a:ext cx="5276835" cy="7492"/>
         </a:xfrm>
         <a:custGeom>
           <a:avLst/>
@@ -3440,10 +4115,10 @@
           <a:pathLst>
             <a:path>
               <a:moveTo>
-                <a:pt x="0" y="3938"/>
+                <a:pt x="0" y="3746"/>
               </a:moveTo>
               <a:lnTo>
-                <a:pt x="5547641" y="3938"/>
+                <a:pt x="5276835" y="3746"/>
               </a:lnTo>
             </a:path>
           </a:pathLst>
@@ -3496,8 +4171,8 @@
         </a:p>
       </dsp:txBody>
       <dsp:txXfrm rot="340560">
-        <a:off x="4841443" y="1050412"/>
-        <a:ext cx="277382" cy="277382"/>
+        <a:off x="4428631" y="1002376"/>
+        <a:ext cx="263841" cy="263841"/>
       </dsp:txXfrm>
     </dsp:sp>
     <dsp:sp modelId="{6BBEBF5B-FED1-46D5-B4BD-B746E33E479D}">
@@ -3507,8 +4182,8 @@
       </dsp:nvSpPr>
       <dsp:spPr>
         <a:xfrm>
-          <a:off x="7740355" y="1313382"/>
-          <a:ext cx="600242" cy="300121"/>
+          <a:off x="7186034" y="1252509"/>
+          <a:ext cx="570941" cy="285470"/>
         </a:xfrm>
         <a:prstGeom prst="roundRect">
           <a:avLst>
@@ -3614,8 +4289,8 @@
         </a:p>
       </dsp:txBody>
       <dsp:txXfrm>
-        <a:off x="7740355" y="1313382"/>
-        <a:ext cx="600242" cy="300121"/>
+        <a:off x="7186034" y="1252509"/>
+        <a:ext cx="570941" cy="285470"/>
       </dsp:txXfrm>
     </dsp:sp>
     <dsp:sp modelId="{34DA80DF-C9F3-4B91-8344-8D94A6373D31}">
@@ -3625,8 +4300,8 @@
       </dsp:nvSpPr>
       <dsp:spPr>
         <a:xfrm rot="620941">
-          <a:off x="2174267" y="1414882"/>
-          <a:ext cx="5611734" cy="7877"/>
+          <a:off x="1891652" y="1349054"/>
+          <a:ext cx="5337800" cy="7492"/>
         </a:xfrm>
         <a:custGeom>
           <a:avLst/>
@@ -3637,10 +4312,10 @@
           <a:pathLst>
             <a:path>
               <a:moveTo>
-                <a:pt x="0" y="3938"/>
+                <a:pt x="0" y="3746"/>
               </a:moveTo>
               <a:lnTo>
-                <a:pt x="5611734" y="3938"/>
+                <a:pt x="5337800" y="3746"/>
               </a:lnTo>
             </a:path>
           </a:pathLst>
@@ -3693,8 +4368,8 @@
         </a:p>
       </dsp:txBody>
       <dsp:txXfrm rot="620941">
-        <a:off x="4839841" y="1278527"/>
-        <a:ext cx="280586" cy="280586"/>
+        <a:off x="4427107" y="1219356"/>
+        <a:ext cx="266890" cy="266890"/>
       </dsp:txXfrm>
     </dsp:sp>
     <dsp:sp modelId="{BEE62EB9-4BC9-4278-B431-6B95B0C29736}">
@@ -3704,8 +4379,8 @@
       </dsp:nvSpPr>
       <dsp:spPr>
         <a:xfrm>
-          <a:off x="7740355" y="1772817"/>
-          <a:ext cx="600242" cy="300121"/>
+          <a:off x="7186034" y="1689517"/>
+          <a:ext cx="570941" cy="285470"/>
         </a:xfrm>
         <a:prstGeom prst="roundRect">
           <a:avLst>
@@ -3811,8 +4486,8 @@
         </a:p>
       </dsp:txBody>
       <dsp:txXfrm>
-        <a:off x="7740355" y="1772817"/>
-        <a:ext cx="600242" cy="300121"/>
+        <a:off x="7186034" y="1689517"/>
+        <a:ext cx="570941" cy="285470"/>
       </dsp:txXfrm>
     </dsp:sp>
     <dsp:sp modelId="{DABE1BB0-6FBC-4DB5-BA69-ACBDD395C425}">
@@ -3822,8 +4497,8 @@
       </dsp:nvSpPr>
       <dsp:spPr>
         <a:xfrm rot="1391958">
-          <a:off x="1983423" y="2062953"/>
-          <a:ext cx="5849394" cy="7877"/>
+          <a:off x="1710124" y="1965490"/>
+          <a:ext cx="5563859" cy="7492"/>
         </a:xfrm>
         <a:custGeom>
           <a:avLst/>
@@ -3834,10 +4509,10 @@
           <a:pathLst>
             <a:path>
               <a:moveTo>
-                <a:pt x="0" y="3938"/>
+                <a:pt x="0" y="3746"/>
               </a:moveTo>
               <a:lnTo>
-                <a:pt x="5849394" y="3938"/>
+                <a:pt x="5563859" y="3746"/>
               </a:lnTo>
             </a:path>
           </a:pathLst>
@@ -3890,8 +4565,8 @@
         </a:p>
       </dsp:txBody>
       <dsp:txXfrm rot="1391958">
-        <a:off x="4761885" y="1920657"/>
-        <a:ext cx="292469" cy="292469"/>
+        <a:off x="4352957" y="1830140"/>
+        <a:ext cx="278192" cy="278192"/>
       </dsp:txXfrm>
     </dsp:sp>
     <dsp:sp modelId="{C4FAF5E1-9087-4502-A0C1-6CB0C16C40B6}">
@@ -3901,8 +4576,8 @@
       </dsp:nvSpPr>
       <dsp:spPr>
         <a:xfrm>
-          <a:off x="7596327" y="3068959"/>
-          <a:ext cx="600242" cy="300121"/>
+          <a:off x="7049037" y="2922388"/>
+          <a:ext cx="570941" cy="285470"/>
         </a:xfrm>
         <a:prstGeom prst="roundRect">
           <a:avLst>
@@ -4007,8 +4682,8 @@
         </a:p>
       </dsp:txBody>
       <dsp:txXfrm>
-        <a:off x="7596327" y="3068959"/>
-        <a:ext cx="600242" cy="300121"/>
+        <a:off x="7049037" y="2922388"/>
+        <a:ext cx="570941" cy="285470"/>
       </dsp:txXfrm>
     </dsp:sp>
     <dsp:sp modelId="{6AAEF27A-CFF0-46AB-89E7-E67E4225C49B}">
@@ -4018,8 +4693,8 @@
       </dsp:nvSpPr>
       <dsp:spPr>
         <a:xfrm rot="2661258">
-          <a:off x="1148550" y="3539117"/>
-          <a:ext cx="7519146" cy="7877"/>
+          <a:off x="916005" y="3369596"/>
+          <a:ext cx="7152102" cy="7492"/>
         </a:xfrm>
         <a:custGeom>
           <a:avLst/>
@@ -4030,10 +4705,10 @@
           <a:pathLst>
             <a:path>
               <a:moveTo>
-                <a:pt x="0" y="3938"/>
+                <a:pt x="0" y="3746"/>
               </a:moveTo>
               <a:lnTo>
-                <a:pt x="7519146" y="3938"/>
+                <a:pt x="7152102" y="3746"/>
               </a:lnTo>
             </a:path>
           </a:pathLst>
@@ -4086,8 +4761,8 @@
         </a:p>
       </dsp:txBody>
       <dsp:txXfrm rot="2661258">
-        <a:off x="4720145" y="3355077"/>
-        <a:ext cx="375957" cy="375957"/>
+        <a:off x="4313254" y="3194540"/>
+        <a:ext cx="357605" cy="357605"/>
       </dsp:txXfrm>
     </dsp:sp>
     <dsp:sp modelId="{C56CD8FA-6820-4927-857B-24AC03A0848E}">
@@ -4097,8 +4772,8 @@
       </dsp:nvSpPr>
       <dsp:spPr>
         <a:xfrm>
-          <a:off x="7596333" y="6021287"/>
-          <a:ext cx="600242" cy="300121"/>
+          <a:off x="7049042" y="5730600"/>
+          <a:ext cx="570941" cy="285470"/>
         </a:xfrm>
         <a:prstGeom prst="roundRect">
           <a:avLst>
@@ -4203,8 +4878,8 @@
         </a:p>
       </dsp:txBody>
       <dsp:txXfrm>
-        <a:off x="7596333" y="6021287"/>
-        <a:ext cx="600242" cy="300121"/>
+        <a:off x="7049042" y="5730600"/>
+        <a:ext cx="570941" cy="285470"/>
       </dsp:txXfrm>
     </dsp:sp>
     <dsp:sp modelId="{BE94FC41-7E45-4EC8-929B-E375718E9CFD}">
@@ -4214,8 +4889,8 @@
       </dsp:nvSpPr>
       <dsp:spPr>
         <a:xfrm rot="1761516">
-          <a:off x="1823788" y="2422994"/>
-          <a:ext cx="6168665" cy="7877"/>
+          <a:off x="1558281" y="2307956"/>
+          <a:ext cx="5867545" cy="7492"/>
         </a:xfrm>
         <a:custGeom>
           <a:avLst/>
@@ -4226,10 +4901,10 @@
           <a:pathLst>
             <a:path>
               <a:moveTo>
-                <a:pt x="0" y="3938"/>
+                <a:pt x="0" y="3746"/>
               </a:moveTo>
               <a:lnTo>
-                <a:pt x="6168665" y="3938"/>
+                <a:pt x="5867545" y="3746"/>
               </a:lnTo>
             </a:path>
           </a:pathLst>
@@ -4282,8 +4957,8 @@
         </a:p>
       </dsp:txBody>
       <dsp:txXfrm rot="1761516">
-        <a:off x="4753904" y="2272716"/>
-        <a:ext cx="308433" cy="308433"/>
+        <a:off x="4345365" y="2165013"/>
+        <a:ext cx="293377" cy="293377"/>
       </dsp:txXfrm>
     </dsp:sp>
     <dsp:sp modelId="{A498F82E-BAFD-4F2E-9519-0B8C1ED23FD3}">
@@ -4293,8 +4968,8 @@
       </dsp:nvSpPr>
       <dsp:spPr>
         <a:xfrm>
-          <a:off x="7596327" y="3789040"/>
-          <a:ext cx="600242" cy="300121"/>
+          <a:off x="7049037" y="3607319"/>
+          <a:ext cx="570941" cy="285470"/>
         </a:xfrm>
         <a:prstGeom prst="roundRect">
           <a:avLst>
@@ -4399,8 +5074,8 @@
         </a:p>
       </dsp:txBody>
       <dsp:txXfrm>
-        <a:off x="7596327" y="3789040"/>
-        <a:ext cx="600242" cy="300121"/>
+        <a:off x="7049037" y="3607319"/>
+        <a:ext cx="570941" cy="285470"/>
       </dsp:txXfrm>
     </dsp:sp>
     <dsp:sp modelId="{9F497E88-9EE3-4B0E-BF38-F02082D514F8}">
@@ -4410,8 +5085,8 @@
       </dsp:nvSpPr>
       <dsp:spPr>
         <a:xfrm rot="1931389">
-          <a:off x="1731651" y="2603014"/>
-          <a:ext cx="6352943" cy="7877"/>
+          <a:off x="1470642" y="2479188"/>
+          <a:ext cx="6042827" cy="7492"/>
         </a:xfrm>
         <a:custGeom>
           <a:avLst/>
@@ -4422,10 +5097,10 @@
           <a:pathLst>
             <a:path>
               <a:moveTo>
-                <a:pt x="0" y="3938"/>
+                <a:pt x="0" y="3746"/>
               </a:moveTo>
               <a:lnTo>
-                <a:pt x="6352943" y="3938"/>
+                <a:pt x="6042827" y="3746"/>
               </a:lnTo>
             </a:path>
           </a:pathLst>
@@ -4478,8 +5153,8 @@
         </a:p>
       </dsp:txBody>
       <dsp:txXfrm rot="1931389">
-        <a:off x="4749300" y="2448129"/>
-        <a:ext cx="317647" cy="317647"/>
+        <a:off x="4340986" y="2331864"/>
+        <a:ext cx="302141" cy="302141"/>
       </dsp:txXfrm>
     </dsp:sp>
     <dsp:sp modelId="{971DCA25-CA70-406F-A12F-81E9A4B41B13}">
@@ -4489,8 +5164,8 @@
       </dsp:nvSpPr>
       <dsp:spPr>
         <a:xfrm>
-          <a:off x="7596333" y="4149080"/>
-          <a:ext cx="600242" cy="300121"/>
+          <a:off x="7049042" y="3949784"/>
+          <a:ext cx="570941" cy="285470"/>
         </a:xfrm>
         <a:prstGeom prst="roundRect">
           <a:avLst>
@@ -4595,8 +5270,8 @@
         </a:p>
       </dsp:txBody>
       <dsp:txXfrm>
-        <a:off x="7596333" y="4149080"/>
-        <a:ext cx="600242" cy="300121"/>
+        <a:off x="7049042" y="3949784"/>
+        <a:ext cx="570941" cy="285470"/>
       </dsp:txXfrm>
     </dsp:sp>
     <dsp:sp modelId="{1642E9A8-05F5-4DD9-8853-EB0B8B3CBAB0}">
@@ -4606,8 +5281,8 @@
       </dsp:nvSpPr>
       <dsp:spPr>
         <a:xfrm rot="2270429">
-          <a:off x="1504127" y="2999058"/>
-          <a:ext cx="6807991" cy="7877"/>
+          <a:off x="1254225" y="2855900"/>
+          <a:ext cx="6475663" cy="7492"/>
         </a:xfrm>
         <a:custGeom>
           <a:avLst/>
@@ -4618,10 +5293,10 @@
           <a:pathLst>
             <a:path>
               <a:moveTo>
-                <a:pt x="0" y="3938"/>
+                <a:pt x="0" y="3746"/>
               </a:moveTo>
               <a:lnTo>
-                <a:pt x="6807991" y="3938"/>
+                <a:pt x="6475663" y="3746"/>
               </a:lnTo>
             </a:path>
           </a:pathLst>
@@ -4674,8 +5349,8 @@
         </a:p>
       </dsp:txBody>
       <dsp:txXfrm rot="2270429">
-        <a:off x="4737923" y="2832797"/>
-        <a:ext cx="340399" cy="340399"/>
+        <a:off x="4330165" y="2697755"/>
+        <a:ext cx="323783" cy="323783"/>
       </dsp:txXfrm>
     </dsp:sp>
     <dsp:sp modelId="{72214F6E-4077-473E-BF8C-AEA5D0F63B4E}">
@@ -4685,8 +5360,8 @@
       </dsp:nvSpPr>
       <dsp:spPr>
         <a:xfrm>
-          <a:off x="7596333" y="4941169"/>
-          <a:ext cx="600242" cy="300121"/>
+          <a:off x="7049042" y="4703208"/>
+          <a:ext cx="570941" cy="285470"/>
         </a:xfrm>
         <a:prstGeom prst="roundRect">
           <a:avLst>
@@ -4791,8 +5466,8 @@
         </a:p>
       </dsp:txBody>
       <dsp:txXfrm>
-        <a:off x="7596333" y="4941169"/>
-        <a:ext cx="600242" cy="300121"/>
+        <a:off x="7049042" y="4703208"/>
+        <a:ext cx="570941" cy="285470"/>
       </dsp:txXfrm>
     </dsp:sp>
     <dsp:sp modelId="{F8AACCF6-CFE7-402F-B8ED-29BC5733A870}">
@@ -4802,8 +5477,8 @@
       </dsp:nvSpPr>
       <dsp:spPr>
         <a:xfrm rot="2409417">
-          <a:off x="1390817" y="3179079"/>
-          <a:ext cx="7034612" cy="7877"/>
+          <a:off x="1146445" y="3027133"/>
+          <a:ext cx="6691221" cy="7492"/>
         </a:xfrm>
         <a:custGeom>
           <a:avLst/>
@@ -4814,10 +5489,10 @@
           <a:pathLst>
             <a:path>
               <a:moveTo>
-                <a:pt x="0" y="3938"/>
+                <a:pt x="0" y="3746"/>
               </a:moveTo>
               <a:lnTo>
-                <a:pt x="7034612" y="3938"/>
+                <a:pt x="6691221" y="3746"/>
               </a:lnTo>
             </a:path>
           </a:pathLst>
@@ -4870,8 +5545,8 @@
         </a:p>
       </dsp:txBody>
       <dsp:txXfrm rot="2409417">
-        <a:off x="4732258" y="3007152"/>
-        <a:ext cx="351730" cy="351730"/>
+        <a:off x="4324776" y="2863598"/>
+        <a:ext cx="334561" cy="334561"/>
       </dsp:txXfrm>
     </dsp:sp>
     <dsp:sp modelId="{232E3FC3-F2E5-40D9-9802-02FEC26B0864}">
@@ -4881,8 +5556,8 @@
       </dsp:nvSpPr>
       <dsp:spPr>
         <a:xfrm>
-          <a:off x="7596333" y="5301210"/>
-          <a:ext cx="600242" cy="300121"/>
+          <a:off x="7049042" y="5045673"/>
+          <a:ext cx="570941" cy="285470"/>
         </a:xfrm>
         <a:prstGeom prst="roundRect">
           <a:avLst>
@@ -4987,8 +5662,8 @@
         </a:p>
       </dsp:txBody>
       <dsp:txXfrm>
-        <a:off x="7596333" y="5301210"/>
-        <a:ext cx="600242" cy="300121"/>
+        <a:off x="7049042" y="5045673"/>
+        <a:ext cx="570941" cy="285470"/>
       </dsp:txXfrm>
     </dsp:sp>
     <dsp:sp modelId="{A22484D8-88D9-4A8E-AD4D-366762E28902}">
@@ -4998,8 +5673,8 @@
       </dsp:nvSpPr>
       <dsp:spPr>
         <a:xfrm rot="2539531">
-          <a:off x="1272122" y="3359097"/>
-          <a:ext cx="7272002" cy="7877"/>
+          <a:off x="1033544" y="3198364"/>
+          <a:ext cx="6917023" cy="7492"/>
         </a:xfrm>
         <a:custGeom>
           <a:avLst/>
@@ -5010,10 +5685,10 @@
           <a:pathLst>
             <a:path>
               <a:moveTo>
-                <a:pt x="0" y="3938"/>
+                <a:pt x="0" y="3746"/>
               </a:moveTo>
               <a:lnTo>
-                <a:pt x="7272002" y="3938"/>
+                <a:pt x="6917023" y="3746"/>
               </a:lnTo>
             </a:path>
           </a:pathLst>
@@ -5066,8 +5741,8 @@
         </a:p>
       </dsp:txBody>
       <dsp:txXfrm rot="2539531">
-        <a:off x="4726323" y="3181236"/>
-        <a:ext cx="363600" cy="363600"/>
+        <a:off x="4319131" y="3029184"/>
+        <a:ext cx="345851" cy="345851"/>
       </dsp:txXfrm>
     </dsp:sp>
     <dsp:sp modelId="{1F479AC0-84F6-4267-86ED-B588DB647B4D}">
@@ -5077,8 +5752,8 @@
       </dsp:nvSpPr>
       <dsp:spPr>
         <a:xfrm>
-          <a:off x="7596333" y="5661247"/>
-          <a:ext cx="600242" cy="300121"/>
+          <a:off x="7049042" y="5388135"/>
+          <a:ext cx="570941" cy="285470"/>
         </a:xfrm>
         <a:prstGeom prst="roundRect">
           <a:avLst>
@@ -5183,8 +5858,8 @@
         </a:p>
       </dsp:txBody>
       <dsp:txXfrm>
-        <a:off x="7596333" y="5661247"/>
-        <a:ext cx="600242" cy="300121"/>
+        <a:off x="7049042" y="5388135"/>
+        <a:ext cx="570941" cy="285470"/>
       </dsp:txXfrm>
     </dsp:sp>
     <dsp:sp modelId="{38CBF0CF-DF9C-4635-8162-00C9EDAB6B38}">
@@ -5194,8 +5869,8 @@
       </dsp:nvSpPr>
       <dsp:spPr>
         <a:xfrm rot="1581650">
-          <a:off x="1907941" y="2242973"/>
-          <a:ext cx="6000357" cy="7877"/>
+          <a:off x="1638327" y="2136723"/>
+          <a:ext cx="5707453" cy="7492"/>
         </a:xfrm>
         <a:custGeom>
           <a:avLst/>
@@ -5206,10 +5881,10 @@
           <a:pathLst>
             <a:path>
               <a:moveTo>
-                <a:pt x="0" y="3938"/>
+                <a:pt x="0" y="3746"/>
               </a:moveTo>
               <a:lnTo>
-                <a:pt x="6000357" y="3938"/>
+                <a:pt x="5707453" y="3746"/>
               </a:lnTo>
             </a:path>
           </a:pathLst>
@@ -5262,8 +5937,8 @@
         </a:p>
       </dsp:txBody>
       <dsp:txXfrm rot="1581650">
-        <a:off x="4758111" y="2096903"/>
-        <a:ext cx="300017" cy="300017"/>
+        <a:off x="4349367" y="1997783"/>
+        <a:ext cx="285372" cy="285372"/>
       </dsp:txXfrm>
     </dsp:sp>
     <dsp:sp modelId="{0A8BD01C-70BE-4D22-8EBB-A96F19A9DB2C}">
@@ -5273,8 +5948,8 @@
       </dsp:nvSpPr>
       <dsp:spPr>
         <a:xfrm>
-          <a:off x="7596327" y="3429000"/>
-          <a:ext cx="600242" cy="300121"/>
+          <a:off x="7049037" y="3264854"/>
+          <a:ext cx="570941" cy="285470"/>
         </a:xfrm>
         <a:prstGeom prst="roundRect">
           <a:avLst>
@@ -5379,8 +6054,8 @@
         </a:p>
       </dsp:txBody>
       <dsp:txXfrm>
-        <a:off x="7596327" y="3429000"/>
-        <a:ext cx="600242" cy="300121"/>
+        <a:off x="7049037" y="3264854"/>
+        <a:ext cx="570941" cy="285470"/>
       </dsp:txXfrm>
     </dsp:sp>
     <dsp:sp modelId="{AB85DCB8-E6AC-46D8-AA7D-EF2B5135B688}">
@@ -5390,8 +6065,8 @@
       </dsp:nvSpPr>
       <dsp:spPr>
         <a:xfrm rot="4294076">
-          <a:off x="1078043" y="2495002"/>
-          <a:ext cx="3339680" cy="7877"/>
+          <a:off x="848940" y="2376449"/>
+          <a:ext cx="3176656" cy="7492"/>
         </a:xfrm>
         <a:custGeom>
           <a:avLst/>
@@ -5402,10 +6077,10 @@
           <a:pathLst>
             <a:path>
               <a:moveTo>
-                <a:pt x="0" y="3938"/>
+                <a:pt x="0" y="3746"/>
               </a:moveTo>
               <a:lnTo>
-                <a:pt x="3339680" y="3938"/>
+                <a:pt x="3176656" y="3746"/>
               </a:lnTo>
             </a:path>
           </a:pathLst>
@@ -5458,8 +6133,8 @@
         </a:p>
       </dsp:txBody>
       <dsp:txXfrm rot="4294076">
-        <a:off x="2664392" y="2415448"/>
-        <a:ext cx="166984" cy="166984"/>
+        <a:off x="2357851" y="2300779"/>
+        <a:ext cx="158832" cy="158832"/>
       </dsp:txXfrm>
     </dsp:sp>
     <dsp:sp modelId="{66457418-62B0-4CF7-8E2D-C279A9219CDE}">
@@ -5469,8 +6144,8 @@
       </dsp:nvSpPr>
       <dsp:spPr>
         <a:xfrm>
-          <a:off x="3275854" y="3933056"/>
-          <a:ext cx="600242" cy="300121"/>
+          <a:off x="2939465" y="3744305"/>
+          <a:ext cx="570941" cy="285470"/>
         </a:xfrm>
         <a:prstGeom prst="roundRect">
           <a:avLst>
@@ -5575,8 +6250,8 @@
         </a:p>
       </dsp:txBody>
       <dsp:txXfrm>
-        <a:off x="3275854" y="3933056"/>
-        <a:ext cx="600242" cy="300121"/>
+        <a:off x="2939465" y="3744305"/>
+        <a:ext cx="570941" cy="285470"/>
       </dsp:txXfrm>
     </dsp:sp>
     <dsp:sp modelId="{4EAF1BA9-1E2E-42D0-8B45-203DE822089C}">
@@ -5586,8 +6261,8 @@
       </dsp:nvSpPr>
       <dsp:spPr>
         <a:xfrm rot="4400350">
-          <a:off x="906378" y="2675022"/>
-          <a:ext cx="3683010" cy="7877"/>
+          <a:off x="685655" y="2547681"/>
+          <a:ext cx="3503226" cy="7492"/>
         </a:xfrm>
         <a:custGeom>
           <a:avLst/>
@@ -5598,10 +6273,10 @@
           <a:pathLst>
             <a:path>
               <a:moveTo>
-                <a:pt x="0" y="3938"/>
+                <a:pt x="0" y="3746"/>
               </a:moveTo>
               <a:lnTo>
-                <a:pt x="3683010" y="3938"/>
+                <a:pt x="3503226" y="3746"/>
               </a:lnTo>
             </a:path>
           </a:pathLst>
@@ -5654,8 +6329,8 @@
         </a:p>
       </dsp:txBody>
       <dsp:txXfrm rot="4400350">
-        <a:off x="2655808" y="2586885"/>
-        <a:ext cx="184150" cy="184150"/>
+        <a:off x="2349687" y="2463847"/>
+        <a:ext cx="175161" cy="175161"/>
       </dsp:txXfrm>
     </dsp:sp>
     <dsp:sp modelId="{42963CEA-510C-416E-ACE7-36D08610952E}">
@@ -5665,8 +6340,8 @@
       </dsp:nvSpPr>
       <dsp:spPr>
         <a:xfrm>
-          <a:off x="3275854" y="4293096"/>
-          <a:ext cx="600242" cy="300121"/>
+          <a:off x="2939465" y="4086770"/>
+          <a:ext cx="570941" cy="285470"/>
         </a:xfrm>
         <a:prstGeom prst="roundRect">
           <a:avLst>
@@ -5771,8 +6446,8 @@
         </a:p>
       </dsp:txBody>
       <dsp:txXfrm>
-        <a:off x="3275854" y="4293096"/>
-        <a:ext cx="600242" cy="300121"/>
+        <a:off x="2939465" y="4086770"/>
+        <a:ext cx="570941" cy="285470"/>
       </dsp:txXfrm>
     </dsp:sp>
     <dsp:sp modelId="{C847FA65-0B37-4E52-A63B-4CDD4ED59FCA}">
@@ -5782,8 +6457,8 @@
       </dsp:nvSpPr>
       <dsp:spPr>
         <a:xfrm rot="4892590">
-          <a:off x="201880" y="3251085"/>
-          <a:ext cx="4731970" cy="7877"/>
+          <a:off x="15546" y="3095624"/>
+          <a:ext cx="4500981" cy="7492"/>
         </a:xfrm>
         <a:custGeom>
           <a:avLst/>
@@ -5794,10 +6469,10 @@
           <a:pathLst>
             <a:path>
               <a:moveTo>
-                <a:pt x="0" y="3938"/>
+                <a:pt x="0" y="3746"/>
               </a:moveTo>
               <a:lnTo>
-                <a:pt x="4731970" y="3938"/>
+                <a:pt x="4500981" y="3746"/>
               </a:lnTo>
             </a:path>
           </a:pathLst>
@@ -5850,8 +6525,8 @@
         </a:p>
       </dsp:txBody>
       <dsp:txXfrm rot="4892590">
-        <a:off x="2449566" y="3136724"/>
-        <a:ext cx="236598" cy="236598"/>
+        <a:off x="2153512" y="2986846"/>
+        <a:ext cx="225049" cy="225049"/>
       </dsp:txXfrm>
     </dsp:sp>
     <dsp:sp modelId="{B7091056-F701-4AF7-B6E3-D1841F080D69}">
@@ -5861,8 +6536,8 @@
       </dsp:nvSpPr>
       <dsp:spPr>
         <a:xfrm>
-          <a:off x="2915817" y="5445223"/>
-          <a:ext cx="600242" cy="300121"/>
+          <a:off x="2597003" y="5182656"/>
+          <a:ext cx="570941" cy="285470"/>
         </a:xfrm>
         <a:prstGeom prst="roundRect">
           <a:avLst>
@@ -5967,8 +6642,8 @@
         </a:p>
       </dsp:txBody>
       <dsp:txXfrm>
-        <a:off x="2915817" y="5445223"/>
-        <a:ext cx="600242" cy="300121"/>
+        <a:off x="2597003" y="5182656"/>
+        <a:ext cx="570941" cy="285470"/>
       </dsp:txXfrm>
     </dsp:sp>
     <dsp:sp modelId="{D9FA3899-4C64-444A-8515-340B7EF42440}">
@@ -5978,8 +6653,8 @@
       </dsp:nvSpPr>
       <dsp:spPr>
         <a:xfrm rot="4928364">
-          <a:off x="23679" y="3431105"/>
-          <a:ext cx="5088371" cy="7877"/>
+          <a:off x="-153955" y="3266857"/>
+          <a:ext cx="4839985" cy="7492"/>
         </a:xfrm>
         <a:custGeom>
           <a:avLst/>
@@ -5990,10 +6665,10 @@
           <a:pathLst>
             <a:path>
               <a:moveTo>
-                <a:pt x="0" y="3938"/>
+                <a:pt x="0" y="3746"/>
               </a:moveTo>
               <a:lnTo>
-                <a:pt x="5088371" y="3938"/>
+                <a:pt x="4839985" y="3746"/>
               </a:lnTo>
             </a:path>
           </a:pathLst>
@@ -6046,8 +6721,8 @@
         </a:p>
       </dsp:txBody>
       <dsp:txXfrm rot="4928364">
-        <a:off x="2440656" y="3307835"/>
-        <a:ext cx="254418" cy="254418"/>
+        <a:off x="2145037" y="3149603"/>
+        <a:ext cx="241999" cy="241999"/>
       </dsp:txXfrm>
     </dsp:sp>
     <dsp:sp modelId="{9F07CD4A-318D-4205-B8A7-B8254F09A4FF}">
@@ -6057,8 +6732,8 @@
       </dsp:nvSpPr>
       <dsp:spPr>
         <a:xfrm>
-          <a:off x="2915817" y="5805263"/>
-          <a:ext cx="600242" cy="300121"/>
+          <a:off x="2597003" y="5525121"/>
+          <a:ext cx="570941" cy="285470"/>
         </a:xfrm>
         <a:prstGeom prst="roundRect">
           <a:avLst>
@@ -6163,8 +6838,8 @@
         </a:p>
       </dsp:txBody>
       <dsp:txXfrm>
-        <a:off x="2915817" y="5805263"/>
-        <a:ext cx="600242" cy="300121"/>
+        <a:off x="2597003" y="5525121"/>
+        <a:ext cx="570941" cy="285470"/>
       </dsp:txXfrm>
     </dsp:sp>
     <dsp:sp modelId="{2B11C088-24B1-4E33-894C-0C75E2725FF1}">
@@ -6174,8 +6849,8 @@
       </dsp:nvSpPr>
       <dsp:spPr>
         <a:xfrm rot="3310038">
-          <a:off x="1147780" y="2963053"/>
-          <a:ext cx="5000411" cy="7877"/>
+          <a:off x="915273" y="2821652"/>
+          <a:ext cx="4756318" cy="7492"/>
         </a:xfrm>
         <a:custGeom>
           <a:avLst/>
@@ -6186,10 +6861,10 @@
           <a:pathLst>
             <a:path>
               <a:moveTo>
-                <a:pt x="0" y="3938"/>
+                <a:pt x="0" y="3746"/>
               </a:moveTo>
               <a:lnTo>
-                <a:pt x="5000411" y="3938"/>
+                <a:pt x="4756318" y="3746"/>
               </a:lnTo>
             </a:path>
           </a:pathLst>
@@ -6242,8 +6917,8 @@
         </a:p>
       </dsp:txBody>
       <dsp:txXfrm rot="3310038">
-        <a:off x="3522976" y="2841981"/>
-        <a:ext cx="250020" cy="250020"/>
+        <a:off x="3174524" y="2706490"/>
+        <a:ext cx="237815" cy="237815"/>
       </dsp:txXfrm>
     </dsp:sp>
     <dsp:sp modelId="{89A9170F-394A-46D3-BEE1-B36921F6E1C6}">
@@ -6253,8 +6928,8 @@
       </dsp:nvSpPr>
       <dsp:spPr>
         <a:xfrm>
-          <a:off x="5076059" y="4869158"/>
-          <a:ext cx="600242" cy="300121"/>
+          <a:off x="4651794" y="4634712"/>
+          <a:ext cx="570941" cy="285470"/>
         </a:xfrm>
         <a:prstGeom prst="roundRect">
           <a:avLst>
@@ -6359,8 +7034,8 @@
         </a:p>
       </dsp:txBody>
       <dsp:txXfrm>
-        <a:off x="5076059" y="4869158"/>
-        <a:ext cx="600242" cy="300121"/>
+        <a:off x="4651794" y="4634712"/>
+        <a:ext cx="570941" cy="285470"/>
       </dsp:txXfrm>
     </dsp:sp>
     <dsp:sp modelId="{FDBCCBDA-7886-4198-A550-D751C46FBF9D}">
@@ -6370,8 +7045,8 @@
       </dsp:nvSpPr>
       <dsp:spPr>
         <a:xfrm rot="3443463">
-          <a:off x="998020" y="3143073"/>
-          <a:ext cx="5299932" cy="7877"/>
+          <a:off x="772823" y="2992885"/>
+          <a:ext cx="5041218" cy="7492"/>
         </a:xfrm>
         <a:custGeom>
           <a:avLst/>
@@ -6382,10 +7057,10 @@
           <a:pathLst>
             <a:path>
               <a:moveTo>
-                <a:pt x="0" y="3938"/>
+                <a:pt x="0" y="3746"/>
               </a:moveTo>
               <a:lnTo>
-                <a:pt x="5299932" y="3938"/>
+                <a:pt x="5041218" y="3746"/>
               </a:lnTo>
             </a:path>
           </a:pathLst>
@@ -6438,8 +7113,8 @@
         </a:p>
       </dsp:txBody>
       <dsp:txXfrm rot="3443463">
-        <a:off x="3515488" y="3014513"/>
-        <a:ext cx="264996" cy="264996"/>
+        <a:off x="3167402" y="2870600"/>
+        <a:ext cx="252060" cy="252060"/>
       </dsp:txXfrm>
     </dsp:sp>
     <dsp:sp modelId="{5DDE389C-DAA1-4E94-8130-EE2EA40B9C82}">
@@ -6449,8 +7124,8 @@
       </dsp:nvSpPr>
       <dsp:spPr>
         <a:xfrm>
-          <a:off x="5076059" y="5229199"/>
-          <a:ext cx="600242" cy="300121"/>
+          <a:off x="4651794" y="4977177"/>
+          <a:ext cx="570941" cy="285470"/>
         </a:xfrm>
         <a:prstGeom prst="roundRect">
           <a:avLst>
@@ -6555,8 +7230,8 @@
         </a:p>
       </dsp:txBody>
       <dsp:txXfrm>
-        <a:off x="5076059" y="5229199"/>
-        <a:ext cx="600242" cy="300121"/>
+        <a:off x="4651794" y="4977177"/>
+        <a:ext cx="570941" cy="285470"/>
       </dsp:txXfrm>
     </dsp:sp>
     <dsp:sp modelId="{31CC053B-4DB5-43B5-8E3D-F683C9733F04}">
@@ -6565,9 +7240,9 @@
         <dsp:cNvSpPr/>
       </dsp:nvSpPr>
       <dsp:spPr>
-        <a:xfrm rot="5008060">
-          <a:off x="-247978" y="3719138"/>
-          <a:ext cx="2319316" cy="7877"/>
+        <a:xfrm rot="5030655">
+          <a:off x="-449955" y="3663938"/>
+          <a:ext cx="2287037" cy="7492"/>
         </a:xfrm>
         <a:custGeom>
           <a:avLst/>
@@ -6578,10 +7253,10 @@
           <a:pathLst>
             <a:path>
               <a:moveTo>
-                <a:pt x="0" y="3938"/>
+                <a:pt x="0" y="3746"/>
               </a:moveTo>
               <a:lnTo>
-                <a:pt x="2319316" y="3938"/>
+                <a:pt x="2287037" y="3746"/>
               </a:lnTo>
             </a:path>
           </a:pathLst>
@@ -6633,9 +7308,9 @@
           <a:endParaRPr lang="es-AR" sz="600" kern="1200"/>
         </a:p>
       </dsp:txBody>
-      <dsp:txXfrm rot="5008060">
-        <a:off x="853696" y="3665093"/>
-        <a:ext cx="115965" cy="115965"/>
+      <dsp:txXfrm rot="5030655">
+        <a:off x="636387" y="3610509"/>
+        <a:ext cx="114351" cy="114351"/>
       </dsp:txXfrm>
     </dsp:sp>
     <dsp:sp modelId="{436B8739-C5A6-4C15-B0ED-4D1CE39CB43C}">
@@ -6645,8 +7320,8 @@
       </dsp:nvSpPr>
       <dsp:spPr>
         <a:xfrm>
-          <a:off x="1043606" y="4725145"/>
-          <a:ext cx="600242" cy="300121"/>
+          <a:off x="816184" y="4661874"/>
+          <a:ext cx="570941" cy="285470"/>
         </a:xfrm>
         <a:prstGeom prst="roundRect">
           <a:avLst>
@@ -6768,19 +7443,19 @@
         </a:p>
       </dsp:txBody>
       <dsp:txXfrm>
-        <a:off x="1043606" y="4725145"/>
-        <a:ext cx="600242" cy="300121"/>
+        <a:off x="816184" y="4661874"/>
+        <a:ext cx="570941" cy="285470"/>
       </dsp:txXfrm>
     </dsp:sp>
-    <dsp:sp modelId="{C12856FC-6BF0-4829-B1C1-892941F7788F}">
+    <dsp:sp modelId="{60CF692B-2C90-486F-8E39-2CE7219D0895}">
       <dsp:nvSpPr>
         <dsp:cNvPr id="0" name=""/>
         <dsp:cNvSpPr/>
       </dsp:nvSpPr>
       <dsp:spPr>
-        <a:xfrm rot="4883802">
-          <a:off x="1303218" y="5267310"/>
-          <a:ext cx="801100" cy="7877"/>
+        <a:xfrm rot="3157602">
+          <a:off x="1259676" y="5058588"/>
+          <a:ext cx="648610" cy="7492"/>
         </a:xfrm>
         <a:custGeom>
           <a:avLst/>
@@ -6791,10 +7466,10 @@
           <a:pathLst>
             <a:path>
               <a:moveTo>
-                <a:pt x="0" y="3938"/>
+                <a:pt x="0" y="3746"/>
               </a:moveTo>
               <a:lnTo>
-                <a:pt x="801100" y="3938"/>
+                <a:pt x="648610" y="3746"/>
               </a:lnTo>
             </a:path>
           </a:pathLst>
@@ -6846,20 +7521,20 @@
           <a:endParaRPr lang="es-AR" sz="500" kern="1200"/>
         </a:p>
       </dsp:txBody>
-      <dsp:txXfrm rot="4883802">
-        <a:off x="1683741" y="5251221"/>
-        <a:ext cx="40055" cy="40055"/>
+      <dsp:txXfrm rot="3157602">
+        <a:off x="1567766" y="5046119"/>
+        <a:ext cx="32430" cy="32430"/>
       </dsp:txXfrm>
     </dsp:sp>
-    <dsp:sp modelId="{B7265FB0-AFB2-4500-9131-FCDF39A72713}">
+    <dsp:sp modelId="{5EA884E9-6CF9-4789-8B3C-CDC614F4DD67}">
       <dsp:nvSpPr>
         <dsp:cNvPr id="0" name=""/>
         <dsp:cNvSpPr/>
       </dsp:nvSpPr>
       <dsp:spPr>
         <a:xfrm>
-          <a:off x="1763687" y="5517231"/>
-          <a:ext cx="600242" cy="300121"/>
+          <a:off x="1780836" y="5177323"/>
+          <a:ext cx="570941" cy="285470"/>
         </a:xfrm>
         <a:prstGeom prst="roundRect">
           <a:avLst>
@@ -6959,11 +7634,19 @@
           </a:pPr>
           <a:r>
             <a:rPr lang="es-AR" sz="700" kern="1200" dirty="0" smtClean="0"/>
-            <a:t>_time[</a:t>
+            <a:t>_</a:t>
           </a:r>
           <a:r>
             <a:rPr lang="es-AR" sz="700" kern="1200" dirty="0" err="1" smtClean="0"/>
-            <a:t>key</a:t>
+            <a:t>ntime</a:t>
+          </a:r>
+          <a:r>
+            <a:rPr lang="es-AR" sz="700" kern="1200" dirty="0" smtClean="0"/>
+            <a:t>[</a:t>
+          </a:r>
+          <a:r>
+            <a:rPr lang="es-AR" sz="700" kern="1200" dirty="0" err="1" smtClean="0"/>
+            <a:t>list</a:t>
           </a:r>
           <a:r>
             <a:rPr lang="es-AR" sz="700" kern="1200" dirty="0" smtClean="0"/>
@@ -6973,19 +7656,19 @@
         </a:p>
       </dsp:txBody>
       <dsp:txXfrm>
-        <a:off x="1763687" y="5517231"/>
-        <a:ext cx="600242" cy="300121"/>
+        <a:off x="1780836" y="5177323"/>
+        <a:ext cx="570941" cy="285470"/>
       </dsp:txXfrm>
     </dsp:sp>
-    <dsp:sp modelId="{F2BBC305-1F87-4F4E-82A1-C05C2963265B}">
+    <dsp:sp modelId="{8CD6D8AF-8F64-4643-93A2-B802E9D13D18}">
       <dsp:nvSpPr>
         <dsp:cNvPr id="0" name=""/>
         <dsp:cNvSpPr/>
       </dsp:nvSpPr>
       <dsp:spPr>
-        <a:xfrm rot="5083055">
-          <a:off x="1052933" y="5519338"/>
-          <a:ext cx="1301670" cy="7877"/>
+        <a:xfrm rot="4330100">
+          <a:off x="1087007" y="5212668"/>
+          <a:ext cx="865171" cy="7492"/>
         </a:xfrm>
         <a:custGeom>
           <a:avLst/>
@@ -6996,10 +7679,10 @@
           <a:pathLst>
             <a:path>
               <a:moveTo>
-                <a:pt x="0" y="3938"/>
+                <a:pt x="0" y="3746"/>
               </a:moveTo>
               <a:lnTo>
-                <a:pt x="1301670" y="3938"/>
+                <a:pt x="865171" y="3746"/>
               </a:lnTo>
             </a:path>
           </a:pathLst>
@@ -7051,20 +7734,20 @@
           <a:endParaRPr lang="es-AR" sz="500" kern="1200"/>
         </a:p>
       </dsp:txBody>
-      <dsp:txXfrm rot="5083055">
-        <a:off x="1671226" y="5490735"/>
-        <a:ext cx="65083" cy="65083"/>
+      <dsp:txXfrm rot="4330100">
+        <a:off x="1497964" y="5194785"/>
+        <a:ext cx="43258" cy="43258"/>
       </dsp:txXfrm>
     </dsp:sp>
-    <dsp:sp modelId="{812D9E0E-28E0-47F2-9168-168FE96C4119}">
+    <dsp:sp modelId="{C7034579-8E80-4D1A-BF61-A57342567F4C}">
       <dsp:nvSpPr>
         <dsp:cNvPr id="0" name=""/>
         <dsp:cNvSpPr/>
       </dsp:nvSpPr>
       <dsp:spPr>
         <a:xfrm>
-          <a:off x="1763687" y="6021287"/>
-          <a:ext cx="600242" cy="300121"/>
+          <a:off x="1652060" y="5485484"/>
+          <a:ext cx="570941" cy="285470"/>
         </a:xfrm>
         <a:prstGeom prst="roundRect">
           <a:avLst>
@@ -7168,7 +7851,7 @@
           </a:r>
           <a:r>
             <a:rPr lang="es-AR" sz="700" kern="1200" dirty="0" err="1" smtClean="0"/>
-            <a:t>voltage</a:t>
+            <a:t>nnodes</a:t>
           </a:r>
           <a:r>
             <a:rPr lang="es-AR" sz="700" kern="1200" dirty="0" smtClean="0"/>
@@ -7176,7 +7859,7 @@
           </a:r>
           <a:r>
             <a:rPr lang="es-AR" sz="700" kern="1200" dirty="0" err="1" smtClean="0"/>
-            <a:t>value</a:t>
+            <a:t>list</a:t>
           </a:r>
           <a:r>
             <a:rPr lang="es-AR" sz="700" kern="1200" dirty="0" smtClean="0"/>
@@ -7186,8 +7869,434 @@
         </a:p>
       </dsp:txBody>
       <dsp:txXfrm>
-        <a:off x="1763687" y="6021287"/>
-        <a:ext cx="600242" cy="300121"/>
+        <a:off x="1652060" y="5485484"/>
+        <a:ext cx="570941" cy="285470"/>
+      </dsp:txXfrm>
+    </dsp:sp>
+    <dsp:sp modelId="{F2BBC305-1F87-4F4E-82A1-C05C2963265B}">
+      <dsp:nvSpPr>
+        <dsp:cNvPr id="0" name=""/>
+        <dsp:cNvSpPr/>
+      </dsp:nvSpPr>
+      <dsp:spPr>
+        <a:xfrm rot="5120120">
+          <a:off x="743290" y="5499372"/>
+          <a:ext cx="1401660" cy="7492"/>
+        </a:xfrm>
+        <a:custGeom>
+          <a:avLst/>
+          <a:gdLst/>
+          <a:ahLst/>
+          <a:cxnLst/>
+          <a:rect l="0" t="0" r="0" b="0"/>
+          <a:pathLst>
+            <a:path>
+              <a:moveTo>
+                <a:pt x="0" y="3746"/>
+              </a:moveTo>
+              <a:lnTo>
+                <a:pt x="1401660" y="3746"/>
+              </a:lnTo>
+            </a:path>
+          </a:pathLst>
+        </a:custGeom>
+        <a:noFill/>
+        <a:ln w="25400" cap="flat" cmpd="sng" algn="ctr">
+          <a:solidFill>
+            <a:schemeClr val="accent1">
+              <a:tint val="70000"/>
+              <a:hueOff val="0"/>
+              <a:satOff val="0"/>
+              <a:lumOff val="0"/>
+              <a:alphaOff val="0"/>
+            </a:schemeClr>
+          </a:solidFill>
+          <a:prstDash val="solid"/>
+        </a:ln>
+        <a:effectLst/>
+      </dsp:spPr>
+      <dsp:style>
+        <a:lnRef idx="2">
+          <a:scrgbClr r="0" g="0" b="0"/>
+        </a:lnRef>
+        <a:fillRef idx="0">
+          <a:scrgbClr r="0" g="0" b="0"/>
+        </a:fillRef>
+        <a:effectRef idx="0">
+          <a:scrgbClr r="0" g="0" b="0"/>
+        </a:effectRef>
+        <a:fontRef idx="minor"/>
+      </dsp:style>
+      <dsp:txBody>
+        <a:bodyPr spcFirstLastPara="0" vert="horz" wrap="square" lIns="12700" tIns="0" rIns="12700" bIns="0" numCol="1" spcCol="1270" anchor="ctr" anchorCtr="0">
+          <a:noAutofit/>
+        </a:bodyPr>
+        <a:lstStyle/>
+        <a:p>
+          <a:pPr lvl="0" algn="ctr" defTabSz="222250">
+            <a:lnSpc>
+              <a:spcPct val="90000"/>
+            </a:lnSpc>
+            <a:spcBef>
+              <a:spcPct val="0"/>
+            </a:spcBef>
+            <a:spcAft>
+              <a:spcPct val="35000"/>
+            </a:spcAft>
+          </a:pPr>
+          <a:endParaRPr lang="es-AR" sz="500" kern="1200"/>
+        </a:p>
+      </dsp:txBody>
+      <dsp:txXfrm rot="5120120">
+        <a:off x="1409079" y="5468077"/>
+        <a:ext cx="70083" cy="70083"/>
+      </dsp:txXfrm>
+    </dsp:sp>
+    <dsp:sp modelId="{812D9E0E-28E0-47F2-9168-168FE96C4119}">
+      <dsp:nvSpPr>
+        <dsp:cNvPr id="0" name=""/>
+        <dsp:cNvSpPr/>
+      </dsp:nvSpPr>
+      <dsp:spPr>
+        <a:xfrm>
+          <a:off x="1501114" y="6058892"/>
+          <a:ext cx="570941" cy="285470"/>
+        </a:xfrm>
+        <a:prstGeom prst="roundRect">
+          <a:avLst>
+            <a:gd name="adj" fmla="val 10000"/>
+          </a:avLst>
+        </a:prstGeom>
+        <a:gradFill rotWithShape="0">
+          <a:gsLst>
+            <a:gs pos="0">
+              <a:schemeClr val="accent1">
+                <a:tint val="99000"/>
+                <a:hueOff val="0"/>
+                <a:satOff val="0"/>
+                <a:lumOff val="0"/>
+                <a:alphaOff val="0"/>
+                <a:shade val="51000"/>
+                <a:satMod val="130000"/>
+              </a:schemeClr>
+            </a:gs>
+            <a:gs pos="80000">
+              <a:schemeClr val="accent1">
+                <a:tint val="99000"/>
+                <a:hueOff val="0"/>
+                <a:satOff val="0"/>
+                <a:lumOff val="0"/>
+                <a:alphaOff val="0"/>
+                <a:shade val="93000"/>
+                <a:satMod val="130000"/>
+              </a:schemeClr>
+            </a:gs>
+            <a:gs pos="100000">
+              <a:schemeClr val="accent1">
+                <a:tint val="99000"/>
+                <a:hueOff val="0"/>
+                <a:satOff val="0"/>
+                <a:lumOff val="0"/>
+                <a:alphaOff val="0"/>
+                <a:shade val="94000"/>
+                <a:satMod val="135000"/>
+              </a:schemeClr>
+            </a:gs>
+          </a:gsLst>
+          <a:lin ang="16200000" scaled="0"/>
+        </a:gradFill>
+        <a:ln>
+          <a:noFill/>
+        </a:ln>
+        <a:effectLst>
+          <a:outerShdw blurRad="40000" dist="23000" dir="5400000" rotWithShape="0">
+            <a:srgbClr val="000000">
+              <a:alpha val="35000"/>
+            </a:srgbClr>
+          </a:outerShdw>
+        </a:effectLst>
+        <a:scene3d>
+          <a:camera prst="orthographicFront">
+            <a:rot lat="0" lon="0" rev="0"/>
+          </a:camera>
+          <a:lightRig rig="threePt" dir="t">
+            <a:rot lat="0" lon="0" rev="1200000"/>
+          </a:lightRig>
+        </a:scene3d>
+        <a:sp3d>
+          <a:bevelT w="63500" h="25400"/>
+        </a:sp3d>
+      </dsp:spPr>
+      <dsp:style>
+        <a:lnRef idx="0">
+          <a:scrgbClr r="0" g="0" b="0"/>
+        </a:lnRef>
+        <a:fillRef idx="3">
+          <a:scrgbClr r="0" g="0" b="0"/>
+        </a:fillRef>
+        <a:effectRef idx="3">
+          <a:scrgbClr r="0" g="0" b="0"/>
+        </a:effectRef>
+        <a:fontRef idx="minor">
+          <a:schemeClr val="lt1"/>
+        </a:fontRef>
+      </dsp:style>
+      <dsp:txBody>
+        <a:bodyPr spcFirstLastPara="0" vert="horz" wrap="square" lIns="4445" tIns="4445" rIns="4445" bIns="4445" numCol="1" spcCol="1270" anchor="ctr" anchorCtr="0">
+          <a:noAutofit/>
+        </a:bodyPr>
+        <a:lstStyle/>
+        <a:p>
+          <a:pPr lvl="0" algn="ctr" defTabSz="311150">
+            <a:lnSpc>
+              <a:spcPct val="90000"/>
+            </a:lnSpc>
+            <a:spcBef>
+              <a:spcPct val="0"/>
+            </a:spcBef>
+            <a:spcAft>
+              <a:spcPct val="35000"/>
+            </a:spcAft>
+          </a:pPr>
+          <a:r>
+            <a:rPr lang="es-AR" sz="700" kern="1200" dirty="0" smtClean="0"/>
+            <a:t>_</a:t>
+          </a:r>
+          <a:r>
+            <a:rPr lang="es-AR" sz="700" kern="1200" dirty="0" err="1" smtClean="0"/>
+            <a:t>voltages</a:t>
+          </a:r>
+          <a:r>
+            <a:rPr lang="es-AR" sz="700" kern="1200" dirty="0" smtClean="0"/>
+            <a:t>[</a:t>
+          </a:r>
+          <a:r>
+            <a:rPr lang="es-AR" sz="700" kern="1200" dirty="0" err="1" smtClean="0"/>
+            <a:t>dict</a:t>
+          </a:r>
+          <a:r>
+            <a:rPr lang="es-AR" sz="700" kern="1200" dirty="0" smtClean="0"/>
+            <a:t>]</a:t>
+          </a:r>
+          <a:endParaRPr lang="es-AR" sz="700" kern="1200" dirty="0"/>
+        </a:p>
+      </dsp:txBody>
+      <dsp:txXfrm>
+        <a:off x="1501114" y="6058892"/>
+        <a:ext cx="570941" cy="285470"/>
+      </dsp:txXfrm>
+    </dsp:sp>
+    <dsp:sp modelId="{3AE51C82-790C-4B64-BD8C-E0C6D5D6D7D3}">
+      <dsp:nvSpPr>
+        <dsp:cNvPr id="0" name=""/>
+        <dsp:cNvSpPr/>
+      </dsp:nvSpPr>
+      <dsp:spPr>
+        <a:xfrm rot="1484399">
+          <a:off x="2036699" y="6359099"/>
+          <a:ext cx="770455" cy="7492"/>
+        </a:xfrm>
+        <a:custGeom>
+          <a:avLst/>
+          <a:gdLst/>
+          <a:ahLst/>
+          <a:cxnLst/>
+          <a:rect l="0" t="0" r="0" b="0"/>
+          <a:pathLst>
+            <a:path>
+              <a:moveTo>
+                <a:pt x="0" y="3746"/>
+              </a:moveTo>
+              <a:lnTo>
+                <a:pt x="770455" y="3746"/>
+              </a:lnTo>
+            </a:path>
+          </a:pathLst>
+        </a:custGeom>
+        <a:noFill/>
+        <a:ln w="25400" cap="flat" cmpd="sng" algn="ctr">
+          <a:solidFill>
+            <a:schemeClr val="accent1">
+              <a:tint val="50000"/>
+              <a:hueOff val="0"/>
+              <a:satOff val="0"/>
+              <a:lumOff val="0"/>
+              <a:alphaOff val="0"/>
+            </a:schemeClr>
+          </a:solidFill>
+          <a:prstDash val="solid"/>
+        </a:ln>
+        <a:effectLst/>
+      </dsp:spPr>
+      <dsp:style>
+        <a:lnRef idx="2">
+          <a:scrgbClr r="0" g="0" b="0"/>
+        </a:lnRef>
+        <a:fillRef idx="0">
+          <a:scrgbClr r="0" g="0" b="0"/>
+        </a:fillRef>
+        <a:effectRef idx="0">
+          <a:scrgbClr r="0" g="0" b="0"/>
+        </a:effectRef>
+        <a:fontRef idx="minor"/>
+      </dsp:style>
+      <dsp:txBody>
+        <a:bodyPr spcFirstLastPara="0" vert="horz" wrap="square" lIns="12700" tIns="0" rIns="12700" bIns="0" numCol="1" spcCol="1270" anchor="ctr" anchorCtr="0">
+          <a:noAutofit/>
+        </a:bodyPr>
+        <a:lstStyle/>
+        <a:p>
+          <a:pPr lvl="0" algn="ctr" defTabSz="222250">
+            <a:lnSpc>
+              <a:spcPct val="90000"/>
+            </a:lnSpc>
+            <a:spcBef>
+              <a:spcPct val="0"/>
+            </a:spcBef>
+            <a:spcAft>
+              <a:spcPct val="35000"/>
+            </a:spcAft>
+          </a:pPr>
+          <a:endParaRPr lang="es-AR" sz="500" kern="1200"/>
+        </a:p>
+      </dsp:txBody>
+      <dsp:txXfrm rot="1484399">
+        <a:off x="2402665" y="6343584"/>
+        <a:ext cx="38522" cy="38522"/>
+      </dsp:txXfrm>
+    </dsp:sp>
+    <dsp:sp modelId="{A07D77F0-DAFA-4A72-8540-07774004A2FC}">
+      <dsp:nvSpPr>
+        <dsp:cNvPr id="0" name=""/>
+        <dsp:cNvSpPr/>
+      </dsp:nvSpPr>
+      <dsp:spPr>
+        <a:xfrm>
+          <a:off x="2771797" y="6381329"/>
+          <a:ext cx="570941" cy="285470"/>
+        </a:xfrm>
+        <a:prstGeom prst="roundRect">
+          <a:avLst>
+            <a:gd name="adj" fmla="val 10000"/>
+          </a:avLst>
+        </a:prstGeom>
+        <a:gradFill rotWithShape="0">
+          <a:gsLst>
+            <a:gs pos="0">
+              <a:schemeClr val="accent1">
+                <a:tint val="70000"/>
+                <a:hueOff val="0"/>
+                <a:satOff val="0"/>
+                <a:lumOff val="0"/>
+                <a:alphaOff val="0"/>
+                <a:shade val="51000"/>
+                <a:satMod val="130000"/>
+              </a:schemeClr>
+            </a:gs>
+            <a:gs pos="80000">
+              <a:schemeClr val="accent1">
+                <a:tint val="70000"/>
+                <a:hueOff val="0"/>
+                <a:satOff val="0"/>
+                <a:lumOff val="0"/>
+                <a:alphaOff val="0"/>
+                <a:shade val="93000"/>
+                <a:satMod val="130000"/>
+              </a:schemeClr>
+            </a:gs>
+            <a:gs pos="100000">
+              <a:schemeClr val="accent1">
+                <a:tint val="70000"/>
+                <a:hueOff val="0"/>
+                <a:satOff val="0"/>
+                <a:lumOff val="0"/>
+                <a:alphaOff val="0"/>
+                <a:shade val="94000"/>
+                <a:satMod val="135000"/>
+              </a:schemeClr>
+            </a:gs>
+          </a:gsLst>
+          <a:lin ang="16200000" scaled="0"/>
+        </a:gradFill>
+        <a:ln>
+          <a:noFill/>
+        </a:ln>
+        <a:effectLst>
+          <a:outerShdw blurRad="40000" dist="23000" dir="5400000" rotWithShape="0">
+            <a:srgbClr val="000000">
+              <a:alpha val="35000"/>
+            </a:srgbClr>
+          </a:outerShdw>
+        </a:effectLst>
+        <a:scene3d>
+          <a:camera prst="orthographicFront">
+            <a:rot lat="0" lon="0" rev="0"/>
+          </a:camera>
+          <a:lightRig rig="threePt" dir="t">
+            <a:rot lat="0" lon="0" rev="1200000"/>
+          </a:lightRig>
+        </a:scene3d>
+        <a:sp3d>
+          <a:bevelT w="63500" h="25400"/>
+        </a:sp3d>
+      </dsp:spPr>
+      <dsp:style>
+        <a:lnRef idx="0">
+          <a:scrgbClr r="0" g="0" b="0"/>
+        </a:lnRef>
+        <a:fillRef idx="3">
+          <a:scrgbClr r="0" g="0" b="0"/>
+        </a:fillRef>
+        <a:effectRef idx="3">
+          <a:scrgbClr r="0" g="0" b="0"/>
+        </a:effectRef>
+        <a:fontRef idx="minor">
+          <a:schemeClr val="lt1"/>
+        </a:fontRef>
+      </dsp:style>
+      <dsp:txBody>
+        <a:bodyPr spcFirstLastPara="0" vert="horz" wrap="square" lIns="4445" tIns="4445" rIns="4445" bIns="4445" numCol="1" spcCol="1270" anchor="ctr" anchorCtr="0">
+          <a:noAutofit/>
+        </a:bodyPr>
+        <a:lstStyle/>
+        <a:p>
+          <a:pPr lvl="0" algn="ctr" defTabSz="311150">
+            <a:lnSpc>
+              <a:spcPct val="90000"/>
+            </a:lnSpc>
+            <a:spcBef>
+              <a:spcPct val="0"/>
+            </a:spcBef>
+            <a:spcAft>
+              <a:spcPct val="35000"/>
+            </a:spcAft>
+          </a:pPr>
+          <a:r>
+            <a:rPr lang="es-AR" sz="700" kern="1200" dirty="0" smtClean="0"/>
+            <a:t>_</a:t>
+          </a:r>
+          <a:r>
+            <a:rPr lang="es-AR" sz="700" kern="1200" dirty="0" err="1" smtClean="0"/>
+            <a:t>node</a:t>
+          </a:r>
+          <a:r>
+            <a:rPr lang="es-AR" sz="700" kern="1200" dirty="0" smtClean="0"/>
+            <a:t>[</a:t>
+          </a:r>
+          <a:r>
+            <a:rPr lang="es-AR" sz="700" kern="1200" dirty="0" err="1" smtClean="0"/>
+            <a:t>key</a:t>
+          </a:r>
+          <a:r>
+            <a:rPr lang="es-AR" sz="700" kern="1200" dirty="0" smtClean="0"/>
+            <a:t>]</a:t>
+          </a:r>
+          <a:endParaRPr lang="es-AR" sz="700" kern="1200" dirty="0"/>
+        </a:p>
+      </dsp:txBody>
+      <dsp:txXfrm>
+        <a:off x="2771797" y="6381329"/>
+        <a:ext cx="570941" cy="285470"/>
       </dsp:txXfrm>
     </dsp:sp>
   </dsp:spTree>
@@ -8548,6 +9657,434 @@
 </dgm:styleDef>
 </file>
 
+<file path=ppt/notesMasters/notesMaster1.xml><?xml version="1.0" encoding="utf-8"?>
+<p:notesMaster xmlns:a="http://schemas.openxmlformats.org/drawingml/2006/main" xmlns:r="http://schemas.openxmlformats.org/officeDocument/2006/relationships" xmlns:p="http://schemas.openxmlformats.org/presentationml/2006/main">
+  <p:cSld>
+    <p:bg>
+      <p:bgRef idx="1001">
+        <a:schemeClr val="bg1"/>
+      </p:bgRef>
+    </p:bg>
+    <p:spTree>
+      <p:nvGrpSpPr>
+        <p:cNvPr id="1" name=""/>
+        <p:cNvGrpSpPr/>
+        <p:nvPr/>
+      </p:nvGrpSpPr>
+      <p:grpSpPr>
+        <a:xfrm>
+          <a:off x="0" y="0"/>
+          <a:ext cx="0" cy="0"/>
+          <a:chOff x="0" y="0"/>
+          <a:chExt cx="0" cy="0"/>
+        </a:xfrm>
+      </p:grpSpPr>
+      <p:sp>
+        <p:nvSpPr>
+          <p:cNvPr id="2" name="1 Marcador de encabezado"/>
+          <p:cNvSpPr>
+            <a:spLocks noGrp="1"/>
+          </p:cNvSpPr>
+          <p:nvPr>
+            <p:ph type="hdr" sz="quarter"/>
+          </p:nvPr>
+        </p:nvSpPr>
+        <p:spPr>
+          <a:xfrm>
+            <a:off x="0" y="0"/>
+            <a:ext cx="2971800" cy="457200"/>
+          </a:xfrm>
+          <a:prstGeom prst="rect">
+            <a:avLst/>
+          </a:prstGeom>
+        </p:spPr>
+        <p:txBody>
+          <a:bodyPr vert="horz" lIns="91440" tIns="45720" rIns="91440" bIns="45720" rtlCol="0"/>
+          <a:lstStyle>
+            <a:lvl1pPr algn="l">
+              <a:defRPr sz="1200"/>
+            </a:lvl1pPr>
+          </a:lstStyle>
+          <a:p>
+            <a:endParaRPr lang="es-AR"/>
+          </a:p>
+        </p:txBody>
+      </p:sp>
+      <p:sp>
+        <p:nvSpPr>
+          <p:cNvPr id="3" name="2 Marcador de fecha"/>
+          <p:cNvSpPr>
+            <a:spLocks noGrp="1"/>
+          </p:cNvSpPr>
+          <p:nvPr>
+            <p:ph type="dt" idx="1"/>
+          </p:nvPr>
+        </p:nvSpPr>
+        <p:spPr>
+          <a:xfrm>
+            <a:off x="3884613" y="0"/>
+            <a:ext cx="2971800" cy="457200"/>
+          </a:xfrm>
+          <a:prstGeom prst="rect">
+            <a:avLst/>
+          </a:prstGeom>
+        </p:spPr>
+        <p:txBody>
+          <a:bodyPr vert="horz" lIns="91440" tIns="45720" rIns="91440" bIns="45720" rtlCol="0"/>
+          <a:lstStyle>
+            <a:lvl1pPr algn="r">
+              <a:defRPr sz="1200"/>
+            </a:lvl1pPr>
+          </a:lstStyle>
+          <a:p>
+            <a:fld id="{0EEC8B54-3277-466E-98EA-CD8319AEA769}" type="datetimeFigureOut">
+              <a:rPr lang="es-AR" smtClean="0"/>
+              <a:t>10/07/2010</a:t>
+            </a:fld>
+            <a:endParaRPr lang="es-AR"/>
+          </a:p>
+        </p:txBody>
+      </p:sp>
+      <p:sp>
+        <p:nvSpPr>
+          <p:cNvPr id="4" name="3 Marcador de imagen de diapositiva"/>
+          <p:cNvSpPr>
+            <a:spLocks noGrp="1" noRot="1" noChangeAspect="1"/>
+          </p:cNvSpPr>
+          <p:nvPr>
+            <p:ph type="sldImg" idx="2"/>
+          </p:nvPr>
+        </p:nvSpPr>
+        <p:spPr>
+          <a:xfrm>
+            <a:off x="1143000" y="685800"/>
+            <a:ext cx="4572000" cy="3429000"/>
+          </a:xfrm>
+          <a:prstGeom prst="rect">
+            <a:avLst/>
+          </a:prstGeom>
+          <a:noFill/>
+          <a:ln w="12700">
+            <a:solidFill>
+              <a:prstClr val="black"/>
+            </a:solidFill>
+          </a:ln>
+        </p:spPr>
+        <p:txBody>
+          <a:bodyPr vert="horz" lIns="91440" tIns="45720" rIns="91440" bIns="45720" rtlCol="0" anchor="ctr"/>
+          <a:lstStyle/>
+          <a:p>
+            <a:endParaRPr lang="es-AR"/>
+          </a:p>
+        </p:txBody>
+      </p:sp>
+      <p:sp>
+        <p:nvSpPr>
+          <p:cNvPr id="5" name="4 Marcador de notas"/>
+          <p:cNvSpPr>
+            <a:spLocks noGrp="1"/>
+          </p:cNvSpPr>
+          <p:nvPr>
+            <p:ph type="body" sz="quarter" idx="3"/>
+          </p:nvPr>
+        </p:nvSpPr>
+        <p:spPr>
+          <a:xfrm>
+            <a:off x="685800" y="4343400"/>
+            <a:ext cx="5486400" cy="4114800"/>
+          </a:xfrm>
+          <a:prstGeom prst="rect">
+            <a:avLst/>
+          </a:prstGeom>
+        </p:spPr>
+        <p:txBody>
+          <a:bodyPr vert="horz" lIns="91440" tIns="45720" rIns="91440" bIns="45720" rtlCol="0">
+            <a:normAutofit/>
+          </a:bodyPr>
+          <a:lstStyle/>
+          <a:p>
+            <a:pPr lvl="0"/>
+            <a:r>
+              <a:rPr lang="es-ES" smtClean="0"/>
+              <a:t>Haga clic para modificar el estilo de texto del patrón</a:t>
+            </a:r>
+          </a:p>
+          <a:p>
+            <a:pPr lvl="1"/>
+            <a:r>
+              <a:rPr lang="es-ES" smtClean="0"/>
+              <a:t>Segundo nivel</a:t>
+            </a:r>
+          </a:p>
+          <a:p>
+            <a:pPr lvl="2"/>
+            <a:r>
+              <a:rPr lang="es-ES" smtClean="0"/>
+              <a:t>Tercer nivel</a:t>
+            </a:r>
+          </a:p>
+          <a:p>
+            <a:pPr lvl="3"/>
+            <a:r>
+              <a:rPr lang="es-ES" smtClean="0"/>
+              <a:t>Cuarto nivel</a:t>
+            </a:r>
+          </a:p>
+          <a:p>
+            <a:pPr lvl="4"/>
+            <a:r>
+              <a:rPr lang="es-ES" smtClean="0"/>
+              <a:t>Quinto nivel</a:t>
+            </a:r>
+            <a:endParaRPr lang="es-AR"/>
+          </a:p>
+        </p:txBody>
+      </p:sp>
+      <p:sp>
+        <p:nvSpPr>
+          <p:cNvPr id="6" name="5 Marcador de pie de página"/>
+          <p:cNvSpPr>
+            <a:spLocks noGrp="1"/>
+          </p:cNvSpPr>
+          <p:nvPr>
+            <p:ph type="ftr" sz="quarter" idx="4"/>
+          </p:nvPr>
+        </p:nvSpPr>
+        <p:spPr>
+          <a:xfrm>
+            <a:off x="0" y="8685213"/>
+            <a:ext cx="2971800" cy="457200"/>
+          </a:xfrm>
+          <a:prstGeom prst="rect">
+            <a:avLst/>
+          </a:prstGeom>
+        </p:spPr>
+        <p:txBody>
+          <a:bodyPr vert="horz" lIns="91440" tIns="45720" rIns="91440" bIns="45720" rtlCol="0" anchor="b"/>
+          <a:lstStyle>
+            <a:lvl1pPr algn="l">
+              <a:defRPr sz="1200"/>
+            </a:lvl1pPr>
+          </a:lstStyle>
+          <a:p>
+            <a:endParaRPr lang="es-AR"/>
+          </a:p>
+        </p:txBody>
+      </p:sp>
+      <p:sp>
+        <p:nvSpPr>
+          <p:cNvPr id="7" name="6 Marcador de número de diapositiva"/>
+          <p:cNvSpPr>
+            <a:spLocks noGrp="1"/>
+          </p:cNvSpPr>
+          <p:nvPr>
+            <p:ph type="sldNum" sz="quarter" idx="5"/>
+          </p:nvPr>
+        </p:nvSpPr>
+        <p:spPr>
+          <a:xfrm>
+            <a:off x="3884613" y="8685213"/>
+            <a:ext cx="2971800" cy="457200"/>
+          </a:xfrm>
+          <a:prstGeom prst="rect">
+            <a:avLst/>
+          </a:prstGeom>
+        </p:spPr>
+        <p:txBody>
+          <a:bodyPr vert="horz" lIns="91440" tIns="45720" rIns="91440" bIns="45720" rtlCol="0" anchor="b"/>
+          <a:lstStyle>
+            <a:lvl1pPr algn="r">
+              <a:defRPr sz="1200"/>
+            </a:lvl1pPr>
+          </a:lstStyle>
+          <a:p>
+            <a:fld id="{9FBC43A0-1E51-4895-9CDC-588D9E567363}" type="slidenum">
+              <a:rPr lang="es-AR" smtClean="0"/>
+              <a:t>‹Nº›</a:t>
+            </a:fld>
+            <a:endParaRPr lang="es-AR"/>
+          </a:p>
+        </p:txBody>
+      </p:sp>
+    </p:spTree>
+  </p:cSld>
+  <p:clrMap bg1="lt1" tx1="dk1" bg2="lt2" tx2="dk2" accent1="accent1" accent2="accent2" accent3="accent3" accent4="accent4" accent5="accent5" accent6="accent6" hlink="hlink" folHlink="folHlink"/>
+  <p:notesStyle>
+    <a:lvl1pPr marL="0" algn="l" defTabSz="914400" rtl="0" eaLnBrk="1" latinLnBrk="0" hangingPunct="1">
+      <a:defRPr sz="1200" kern="1200">
+        <a:solidFill>
+          <a:schemeClr val="tx1"/>
+        </a:solidFill>
+        <a:latin typeface="+mn-lt"/>
+        <a:ea typeface="+mn-ea"/>
+        <a:cs typeface="+mn-cs"/>
+      </a:defRPr>
+    </a:lvl1pPr>
+    <a:lvl2pPr marL="457200" algn="l" defTabSz="914400" rtl="0" eaLnBrk="1" latinLnBrk="0" hangingPunct="1">
+      <a:defRPr sz="1200" kern="1200">
+        <a:solidFill>
+          <a:schemeClr val="tx1"/>
+        </a:solidFill>
+        <a:latin typeface="+mn-lt"/>
+        <a:ea typeface="+mn-ea"/>
+        <a:cs typeface="+mn-cs"/>
+      </a:defRPr>
+    </a:lvl2pPr>
+    <a:lvl3pPr marL="914400" algn="l" defTabSz="914400" rtl="0" eaLnBrk="1" latinLnBrk="0" hangingPunct="1">
+      <a:defRPr sz="1200" kern="1200">
+        <a:solidFill>
+          <a:schemeClr val="tx1"/>
+        </a:solidFill>
+        <a:latin typeface="+mn-lt"/>
+        <a:ea typeface="+mn-ea"/>
+        <a:cs typeface="+mn-cs"/>
+      </a:defRPr>
+    </a:lvl3pPr>
+    <a:lvl4pPr marL="1371600" algn="l" defTabSz="914400" rtl="0" eaLnBrk="1" latinLnBrk="0" hangingPunct="1">
+      <a:defRPr sz="1200" kern="1200">
+        <a:solidFill>
+          <a:schemeClr val="tx1"/>
+        </a:solidFill>
+        <a:latin typeface="+mn-lt"/>
+        <a:ea typeface="+mn-ea"/>
+        <a:cs typeface="+mn-cs"/>
+      </a:defRPr>
+    </a:lvl4pPr>
+    <a:lvl5pPr marL="1828800" algn="l" defTabSz="914400" rtl="0" eaLnBrk="1" latinLnBrk="0" hangingPunct="1">
+      <a:defRPr sz="1200" kern="1200">
+        <a:solidFill>
+          <a:schemeClr val="tx1"/>
+        </a:solidFill>
+        <a:latin typeface="+mn-lt"/>
+        <a:ea typeface="+mn-ea"/>
+        <a:cs typeface="+mn-cs"/>
+      </a:defRPr>
+    </a:lvl5pPr>
+    <a:lvl6pPr marL="2286000" algn="l" defTabSz="914400" rtl="0" eaLnBrk="1" latinLnBrk="0" hangingPunct="1">
+      <a:defRPr sz="1200" kern="1200">
+        <a:solidFill>
+          <a:schemeClr val="tx1"/>
+        </a:solidFill>
+        <a:latin typeface="+mn-lt"/>
+        <a:ea typeface="+mn-ea"/>
+        <a:cs typeface="+mn-cs"/>
+      </a:defRPr>
+    </a:lvl6pPr>
+    <a:lvl7pPr marL="2743200" algn="l" defTabSz="914400" rtl="0" eaLnBrk="1" latinLnBrk="0" hangingPunct="1">
+      <a:defRPr sz="1200" kern="1200">
+        <a:solidFill>
+          <a:schemeClr val="tx1"/>
+        </a:solidFill>
+        <a:latin typeface="+mn-lt"/>
+        <a:ea typeface="+mn-ea"/>
+        <a:cs typeface="+mn-cs"/>
+      </a:defRPr>
+    </a:lvl7pPr>
+    <a:lvl8pPr marL="3200400" algn="l" defTabSz="914400" rtl="0" eaLnBrk="1" latinLnBrk="0" hangingPunct="1">
+      <a:defRPr sz="1200" kern="1200">
+        <a:solidFill>
+          <a:schemeClr val="tx1"/>
+        </a:solidFill>
+        <a:latin typeface="+mn-lt"/>
+        <a:ea typeface="+mn-ea"/>
+        <a:cs typeface="+mn-cs"/>
+      </a:defRPr>
+    </a:lvl8pPr>
+    <a:lvl9pPr marL="3657600" algn="l" defTabSz="914400" rtl="0" eaLnBrk="1" latinLnBrk="0" hangingPunct="1">
+      <a:defRPr sz="1200" kern="1200">
+        <a:solidFill>
+          <a:schemeClr val="tx1"/>
+        </a:solidFill>
+        <a:latin typeface="+mn-lt"/>
+        <a:ea typeface="+mn-ea"/>
+        <a:cs typeface="+mn-cs"/>
+      </a:defRPr>
+    </a:lvl9pPr>
+  </p:notesStyle>
+</p:notesMaster>
+</file>
+
+<file path=ppt/notesSlides/notesSlide1.xml><?xml version="1.0" encoding="utf-8"?>
+<p:notes xmlns:a="http://schemas.openxmlformats.org/drawingml/2006/main" xmlns:r="http://schemas.openxmlformats.org/officeDocument/2006/relationships" xmlns:p="http://schemas.openxmlformats.org/presentationml/2006/main">
+  <p:cSld>
+    <p:spTree>
+      <p:nvGrpSpPr>
+        <p:cNvPr id="1" name=""/>
+        <p:cNvGrpSpPr/>
+        <p:nvPr/>
+      </p:nvGrpSpPr>
+      <p:grpSpPr>
+        <a:xfrm>
+          <a:off x="0" y="0"/>
+          <a:ext cx="0" cy="0"/>
+          <a:chOff x="0" y="0"/>
+          <a:chExt cx="0" cy="0"/>
+        </a:xfrm>
+      </p:grpSpPr>
+      <p:sp>
+        <p:nvSpPr>
+          <p:cNvPr id="2" name="1 Marcador de imagen de diapositiva"/>
+          <p:cNvSpPr>
+            <a:spLocks noGrp="1" noRot="1" noChangeAspect="1"/>
+          </p:cNvSpPr>
+          <p:nvPr>
+            <p:ph type="sldImg"/>
+          </p:nvPr>
+        </p:nvSpPr>
+        <p:spPr/>
+      </p:sp>
+      <p:sp>
+        <p:nvSpPr>
+          <p:cNvPr id="3" name="2 Marcador de notas"/>
+          <p:cNvSpPr>
+            <a:spLocks noGrp="1"/>
+          </p:cNvSpPr>
+          <p:nvPr>
+            <p:ph type="body" idx="1"/>
+          </p:nvPr>
+        </p:nvSpPr>
+        <p:spPr/>
+        <p:txBody>
+          <a:bodyPr>
+            <a:normAutofit/>
+          </a:bodyPr>
+          <a:lstStyle/>
+          <a:p>
+            <a:endParaRPr lang="es-AR" dirty="0"/>
+          </a:p>
+        </p:txBody>
+      </p:sp>
+      <p:sp>
+        <p:nvSpPr>
+          <p:cNvPr id="4" name="3 Marcador de número de diapositiva"/>
+          <p:cNvSpPr>
+            <a:spLocks noGrp="1"/>
+          </p:cNvSpPr>
+          <p:nvPr>
+            <p:ph type="sldNum" sz="quarter" idx="10"/>
+          </p:nvPr>
+        </p:nvSpPr>
+        <p:spPr/>
+        <p:txBody>
+          <a:bodyPr/>
+          <a:lstStyle/>
+          <a:p>
+            <a:fld id="{9FBC43A0-1E51-4895-9CDC-588D9E567363}" type="slidenum">
+              <a:rPr lang="es-AR" smtClean="0"/>
+              <a:t>1</a:t>
+            </a:fld>
+            <a:endParaRPr lang="es-AR"/>
+          </a:p>
+        </p:txBody>
+      </p:sp>
+    </p:spTree>
+  </p:cSld>
+  <p:clrMapOvr>
+    <a:masterClrMapping/>
+  </p:clrMapOvr>
+</p:notes>
+</file>
+
 <file path=ppt/slideLayouts/slideLayout1.xml><?xml version="1.0" encoding="utf-8"?>
 <p:sldLayout xmlns:a="http://schemas.openxmlformats.org/drawingml/2006/main" xmlns:r="http://schemas.openxmlformats.org/officeDocument/2006/relationships" xmlns:p="http://schemas.openxmlformats.org/presentationml/2006/main" type="title" preserve="1">
   <p:cSld name="Diapositiva de título">
@@ -8729,7 +10266,8 @@
           <a:p>
             <a:fld id="{3B2277F4-EC22-483C-A334-CC02CF6C9E81}" type="datetimeFigureOut">
               <a:rPr lang="es-AR" smtClean="0"/>
-              <a:t>30/06/2010</a:t>
+              <a:pPr/>
+              <a:t>10/07/2010</a:t>
             </a:fld>
             <a:endParaRPr lang="es-AR"/>
           </a:p>
@@ -8771,6 +10309,7 @@
           <a:p>
             <a:fld id="{C8404A55-4A06-4294-BF9C-BA473E981754}" type="slidenum">
               <a:rPr lang="es-AR" smtClean="0"/>
+              <a:pPr/>
               <a:t>‹Nº›</a:t>
             </a:fld>
             <a:endParaRPr lang="es-AR"/>
@@ -8894,7 +10433,8 @@
           <a:p>
             <a:fld id="{3B2277F4-EC22-483C-A334-CC02CF6C9E81}" type="datetimeFigureOut">
               <a:rPr lang="es-AR" smtClean="0"/>
-              <a:t>30/06/2010</a:t>
+              <a:pPr/>
+              <a:t>10/07/2010</a:t>
             </a:fld>
             <a:endParaRPr lang="es-AR"/>
           </a:p>
@@ -8936,6 +10476,7 @@
           <a:p>
             <a:fld id="{C8404A55-4A06-4294-BF9C-BA473E981754}" type="slidenum">
               <a:rPr lang="es-AR" smtClean="0"/>
+              <a:pPr/>
               <a:t>‹Nº›</a:t>
             </a:fld>
             <a:endParaRPr lang="es-AR"/>
@@ -9069,7 +10610,8 @@
           <a:p>
             <a:fld id="{3B2277F4-EC22-483C-A334-CC02CF6C9E81}" type="datetimeFigureOut">
               <a:rPr lang="es-AR" smtClean="0"/>
-              <a:t>30/06/2010</a:t>
+              <a:pPr/>
+              <a:t>10/07/2010</a:t>
             </a:fld>
             <a:endParaRPr lang="es-AR"/>
           </a:p>
@@ -9111,6 +10653,7 @@
           <a:p>
             <a:fld id="{C8404A55-4A06-4294-BF9C-BA473E981754}" type="slidenum">
               <a:rPr lang="es-AR" smtClean="0"/>
+              <a:pPr/>
               <a:t>‹Nº›</a:t>
             </a:fld>
             <a:endParaRPr lang="es-AR"/>
@@ -9234,7 +10777,8 @@
           <a:p>
             <a:fld id="{3B2277F4-EC22-483C-A334-CC02CF6C9E81}" type="datetimeFigureOut">
               <a:rPr lang="es-AR" smtClean="0"/>
-              <a:t>30/06/2010</a:t>
+              <a:pPr/>
+              <a:t>10/07/2010</a:t>
             </a:fld>
             <a:endParaRPr lang="es-AR"/>
           </a:p>
@@ -9276,6 +10820,7 @@
           <a:p>
             <a:fld id="{C8404A55-4A06-4294-BF9C-BA473E981754}" type="slidenum">
               <a:rPr lang="es-AR" smtClean="0"/>
+              <a:pPr/>
               <a:t>‹Nº›</a:t>
             </a:fld>
             <a:endParaRPr lang="es-AR"/>
@@ -9475,7 +11020,8 @@
           <a:p>
             <a:fld id="{3B2277F4-EC22-483C-A334-CC02CF6C9E81}" type="datetimeFigureOut">
               <a:rPr lang="es-AR" smtClean="0"/>
-              <a:t>30/06/2010</a:t>
+              <a:pPr/>
+              <a:t>10/07/2010</a:t>
             </a:fld>
             <a:endParaRPr lang="es-AR"/>
           </a:p>
@@ -9517,6 +11063,7 @@
           <a:p>
             <a:fld id="{C8404A55-4A06-4294-BF9C-BA473E981754}" type="slidenum">
               <a:rPr lang="es-AR" smtClean="0"/>
+              <a:pPr/>
               <a:t>‹Nº›</a:t>
             </a:fld>
             <a:endParaRPr lang="es-AR"/>
@@ -9758,7 +11305,8 @@
           <a:p>
             <a:fld id="{3B2277F4-EC22-483C-A334-CC02CF6C9E81}" type="datetimeFigureOut">
               <a:rPr lang="es-AR" smtClean="0"/>
-              <a:t>30/06/2010</a:t>
+              <a:pPr/>
+              <a:t>10/07/2010</a:t>
             </a:fld>
             <a:endParaRPr lang="es-AR"/>
           </a:p>
@@ -9800,6 +11348,7 @@
           <a:p>
             <a:fld id="{C8404A55-4A06-4294-BF9C-BA473E981754}" type="slidenum">
               <a:rPr lang="es-AR" smtClean="0"/>
+              <a:pPr/>
               <a:t>‹Nº›</a:t>
             </a:fld>
             <a:endParaRPr lang="es-AR"/>
@@ -10175,7 +11724,8 @@
           <a:p>
             <a:fld id="{3B2277F4-EC22-483C-A334-CC02CF6C9E81}" type="datetimeFigureOut">
               <a:rPr lang="es-AR" smtClean="0"/>
-              <a:t>30/06/2010</a:t>
+              <a:pPr/>
+              <a:t>10/07/2010</a:t>
             </a:fld>
             <a:endParaRPr lang="es-AR"/>
           </a:p>
@@ -10217,6 +11767,7 @@
           <a:p>
             <a:fld id="{C8404A55-4A06-4294-BF9C-BA473E981754}" type="slidenum">
               <a:rPr lang="es-AR" smtClean="0"/>
+              <a:pPr/>
               <a:t>‹Nº›</a:t>
             </a:fld>
             <a:endParaRPr lang="es-AR"/>
@@ -10288,7 +11839,8 @@
           <a:p>
             <a:fld id="{3B2277F4-EC22-483C-A334-CC02CF6C9E81}" type="datetimeFigureOut">
               <a:rPr lang="es-AR" smtClean="0"/>
-              <a:t>30/06/2010</a:t>
+              <a:pPr/>
+              <a:t>10/07/2010</a:t>
             </a:fld>
             <a:endParaRPr lang="es-AR"/>
           </a:p>
@@ -10330,6 +11882,7 @@
           <a:p>
             <a:fld id="{C8404A55-4A06-4294-BF9C-BA473E981754}" type="slidenum">
               <a:rPr lang="es-AR" smtClean="0"/>
+              <a:pPr/>
               <a:t>‹Nº›</a:t>
             </a:fld>
             <a:endParaRPr lang="es-AR"/>
@@ -10378,7 +11931,8 @@
           <a:p>
             <a:fld id="{3B2277F4-EC22-483C-A334-CC02CF6C9E81}" type="datetimeFigureOut">
               <a:rPr lang="es-AR" smtClean="0"/>
-              <a:t>30/06/2010</a:t>
+              <a:pPr/>
+              <a:t>10/07/2010</a:t>
             </a:fld>
             <a:endParaRPr lang="es-AR"/>
           </a:p>
@@ -10420,6 +11974,7 @@
           <a:p>
             <a:fld id="{C8404A55-4A06-4294-BF9C-BA473E981754}" type="slidenum">
               <a:rPr lang="es-AR" smtClean="0"/>
+              <a:pPr/>
               <a:t>‹Nº›</a:t>
             </a:fld>
             <a:endParaRPr lang="es-AR"/>
@@ -10650,7 +12205,8 @@
           <a:p>
             <a:fld id="{3B2277F4-EC22-483C-A334-CC02CF6C9E81}" type="datetimeFigureOut">
               <a:rPr lang="es-AR" smtClean="0"/>
-              <a:t>30/06/2010</a:t>
+              <a:pPr/>
+              <a:t>10/07/2010</a:t>
             </a:fld>
             <a:endParaRPr lang="es-AR"/>
           </a:p>
@@ -10692,6 +12248,7 @@
           <a:p>
             <a:fld id="{C8404A55-4A06-4294-BF9C-BA473E981754}" type="slidenum">
               <a:rPr lang="es-AR" smtClean="0"/>
+              <a:pPr/>
               <a:t>‹Nº›</a:t>
             </a:fld>
             <a:endParaRPr lang="es-AR"/>
@@ -10898,7 +12455,8 @@
           <a:p>
             <a:fld id="{3B2277F4-EC22-483C-A334-CC02CF6C9E81}" type="datetimeFigureOut">
               <a:rPr lang="es-AR" smtClean="0"/>
-              <a:t>30/06/2010</a:t>
+              <a:pPr/>
+              <a:t>10/07/2010</a:t>
             </a:fld>
             <a:endParaRPr lang="es-AR"/>
           </a:p>
@@ -10940,6 +12498,7 @@
           <a:p>
             <a:fld id="{C8404A55-4A06-4294-BF9C-BA473E981754}" type="slidenum">
               <a:rPr lang="es-AR" smtClean="0"/>
+              <a:pPr/>
               <a:t>‹Nº›</a:t>
             </a:fld>
             <a:endParaRPr lang="es-AR"/>
@@ -11106,7 +12665,8 @@
           <a:p>
             <a:fld id="{3B2277F4-EC22-483C-A334-CC02CF6C9E81}" type="datetimeFigureOut">
               <a:rPr lang="es-AR" smtClean="0"/>
-              <a:t>30/06/2010</a:t>
+              <a:pPr/>
+              <a:t>10/07/2010</a:t>
             </a:fld>
             <a:endParaRPr lang="es-AR"/>
           </a:p>
@@ -11184,6 +12744,7 @@
           <a:p>
             <a:fld id="{C8404A55-4A06-4294-BF9C-BA473E981754}" type="slidenum">
               <a:rPr lang="es-AR" smtClean="0"/>
+              <a:pPr/>
               <a:t>‹Nº›</a:t>
             </a:fld>
             <a:endParaRPr lang="es-AR"/>
@@ -11488,7 +13049,7 @@
         </p:xfrm>
         <a:graphic>
           <a:graphicData uri="http://schemas.openxmlformats.org/drawingml/2006/diagram">
-            <dgm:relIds xmlns:dgm="http://schemas.openxmlformats.org/drawingml/2006/diagram" xmlns:r="http://schemas.openxmlformats.org/officeDocument/2006/relationships" r:dm="rId2" r:lo="rId3" r:qs="rId4" r:cs="rId5"/>
+            <dgm:relIds xmlns:dgm="http://schemas.openxmlformats.org/drawingml/2006/diagram" xmlns:r="http://schemas.openxmlformats.org/officeDocument/2006/relationships" r:dm="rId4" r:lo="rId5" r:qs="rId6" r:cs="rId7"/>
           </a:graphicData>
         </a:graphic>
       </p:graphicFrame>
@@ -11788,4 +13349,287 @@
   <a:objectDefaults/>
   <a:extraClrSchemeLst/>
 </a:theme>
+</file>
+
+<file path=ppt/theme/theme2.xml><?xml version="1.0" encoding="utf-8"?>
+<a:theme xmlns:a="http://schemas.openxmlformats.org/drawingml/2006/main" name="Tema de Office">
+  <a:themeElements>
+    <a:clrScheme name="Office">
+      <a:dk1>
+        <a:sysClr val="windowText" lastClr="000000"/>
+      </a:dk1>
+      <a:lt1>
+        <a:sysClr val="window" lastClr="FFFFFF"/>
+      </a:lt1>
+      <a:dk2>
+        <a:srgbClr val="1F497D"/>
+      </a:dk2>
+      <a:lt2>
+        <a:srgbClr val="EEECE1"/>
+      </a:lt2>
+      <a:accent1>
+        <a:srgbClr val="4F81BD"/>
+      </a:accent1>
+      <a:accent2>
+        <a:srgbClr val="C0504D"/>
+      </a:accent2>
+      <a:accent3>
+        <a:srgbClr val="9BBB59"/>
+      </a:accent3>
+      <a:accent4>
+        <a:srgbClr val="8064A2"/>
+      </a:accent4>
+      <a:accent5>
+        <a:srgbClr val="4BACC6"/>
+      </a:accent5>
+      <a:accent6>
+        <a:srgbClr val="F79646"/>
+      </a:accent6>
+      <a:hlink>
+        <a:srgbClr val="0000FF"/>
+      </a:hlink>
+      <a:folHlink>
+        <a:srgbClr val="800080"/>
+      </a:folHlink>
+    </a:clrScheme>
+    <a:fontScheme name="Office">
+      <a:majorFont>
+        <a:latin typeface="Calibri"/>
+        <a:ea typeface=""/>
+        <a:cs typeface=""/>
+        <a:font script="Jpan" typeface="ＭＳ Ｐゴシック"/>
+        <a:font script="Hang" typeface="맑은 고딕"/>
+        <a:font script="Hans" typeface="宋体"/>
+        <a:font script="Hant" typeface="新細明體"/>
+        <a:font script="Arab" typeface="Times New Roman"/>
+        <a:font script="Hebr" typeface="Times New Roman"/>
+        <a:font script="Thai" typeface="Angsana New"/>
+        <a:font script="Ethi" typeface="Nyala"/>
+        <a:font script="Beng" typeface="Vrinda"/>
+        <a:font script="Gujr" typeface="Shruti"/>
+        <a:font script="Khmr" typeface="MoolBoran"/>
+        <a:font script="Knda" typeface="Tunga"/>
+        <a:font script="Guru" typeface="Raavi"/>
+        <a:font script="Cans" typeface="Euphemia"/>
+        <a:font script="Cher" typeface="Plantagenet Cherokee"/>
+        <a:font script="Yiii" typeface="Microsoft Yi Baiti"/>
+        <a:font script="Tibt" typeface="Microsoft Himalaya"/>
+        <a:font script="Thaa" typeface="MV Boli"/>
+        <a:font script="Deva" typeface="Mangal"/>
+        <a:font script="Telu" typeface="Gautami"/>
+        <a:font script="Taml" typeface="Latha"/>
+        <a:font script="Syrc" typeface="Estrangelo Edessa"/>
+        <a:font script="Orya" typeface="Kalinga"/>
+        <a:font script="Mlym" typeface="Kartika"/>
+        <a:font script="Laoo" typeface="DokChampa"/>
+        <a:font script="Sinh" typeface="Iskoola Pota"/>
+        <a:font script="Mong" typeface="Mongolian Baiti"/>
+        <a:font script="Viet" typeface="Times New Roman"/>
+        <a:font script="Uigh" typeface="Microsoft Uighur"/>
+      </a:majorFont>
+      <a:minorFont>
+        <a:latin typeface="Calibri"/>
+        <a:ea typeface=""/>
+        <a:cs typeface=""/>
+        <a:font script="Jpan" typeface="ＭＳ Ｐゴシック"/>
+        <a:font script="Hang" typeface="맑은 고딕"/>
+        <a:font script="Hans" typeface="宋体"/>
+        <a:font script="Hant" typeface="新細明體"/>
+        <a:font script="Arab" typeface="Arial"/>
+        <a:font script="Hebr" typeface="Arial"/>
+        <a:font script="Thai" typeface="Cordia New"/>
+        <a:font script="Ethi" typeface="Nyala"/>
+        <a:font script="Beng" typeface="Vrinda"/>
+        <a:font script="Gujr" typeface="Shruti"/>
+        <a:font script="Khmr" typeface="DaunPenh"/>
+        <a:font script="Knda" typeface="Tunga"/>
+        <a:font script="Guru" typeface="Raavi"/>
+        <a:font script="Cans" typeface="Euphemia"/>
+        <a:font script="Cher" typeface="Plantagenet Cherokee"/>
+        <a:font script="Yiii" typeface="Microsoft Yi Baiti"/>
+        <a:font script="Tibt" typeface="Microsoft Himalaya"/>
+        <a:font script="Thaa" typeface="MV Boli"/>
+        <a:font script="Deva" typeface="Mangal"/>
+        <a:font script="Telu" typeface="Gautami"/>
+        <a:font script="Taml" typeface="Latha"/>
+        <a:font script="Syrc" typeface="Estrangelo Edessa"/>
+        <a:font script="Orya" typeface="Kalinga"/>
+        <a:font script="Mlym" typeface="Kartika"/>
+        <a:font script="Laoo" typeface="DokChampa"/>
+        <a:font script="Sinh" typeface="Iskoola Pota"/>
+        <a:font script="Mong" typeface="Mongolian Baiti"/>
+        <a:font script="Viet" typeface="Arial"/>
+        <a:font script="Uigh" typeface="Microsoft Uighur"/>
+      </a:minorFont>
+    </a:fontScheme>
+    <a:fmtScheme name="Office">
+      <a:fillStyleLst>
+        <a:solidFill>
+          <a:schemeClr val="phClr"/>
+        </a:solidFill>
+        <a:gradFill rotWithShape="1">
+          <a:gsLst>
+            <a:gs pos="0">
+              <a:schemeClr val="phClr">
+                <a:tint val="50000"/>
+                <a:satMod val="300000"/>
+              </a:schemeClr>
+            </a:gs>
+            <a:gs pos="35000">
+              <a:schemeClr val="phClr">
+                <a:tint val="37000"/>
+                <a:satMod val="300000"/>
+              </a:schemeClr>
+            </a:gs>
+            <a:gs pos="100000">
+              <a:schemeClr val="phClr">
+                <a:tint val="15000"/>
+                <a:satMod val="350000"/>
+              </a:schemeClr>
+            </a:gs>
+          </a:gsLst>
+          <a:lin ang="16200000" scaled="1"/>
+        </a:gradFill>
+        <a:gradFill rotWithShape="1">
+          <a:gsLst>
+            <a:gs pos="0">
+              <a:schemeClr val="phClr">
+                <a:shade val="51000"/>
+                <a:satMod val="130000"/>
+              </a:schemeClr>
+            </a:gs>
+            <a:gs pos="80000">
+              <a:schemeClr val="phClr">
+                <a:shade val="93000"/>
+                <a:satMod val="130000"/>
+              </a:schemeClr>
+            </a:gs>
+            <a:gs pos="100000">
+              <a:schemeClr val="phClr">
+                <a:shade val="94000"/>
+                <a:satMod val="135000"/>
+              </a:schemeClr>
+            </a:gs>
+          </a:gsLst>
+          <a:lin ang="16200000" scaled="0"/>
+        </a:gradFill>
+      </a:fillStyleLst>
+      <a:lnStyleLst>
+        <a:ln w="9525" cap="flat" cmpd="sng" algn="ctr">
+          <a:solidFill>
+            <a:schemeClr val="phClr">
+              <a:shade val="95000"/>
+              <a:satMod val="105000"/>
+            </a:schemeClr>
+          </a:solidFill>
+          <a:prstDash val="solid"/>
+        </a:ln>
+        <a:ln w="25400" cap="flat" cmpd="sng" algn="ctr">
+          <a:solidFill>
+            <a:schemeClr val="phClr"/>
+          </a:solidFill>
+          <a:prstDash val="solid"/>
+        </a:ln>
+        <a:ln w="38100" cap="flat" cmpd="sng" algn="ctr">
+          <a:solidFill>
+            <a:schemeClr val="phClr"/>
+          </a:solidFill>
+          <a:prstDash val="solid"/>
+        </a:ln>
+      </a:lnStyleLst>
+      <a:effectStyleLst>
+        <a:effectStyle>
+          <a:effectLst>
+            <a:outerShdw blurRad="40000" dist="20000" dir="5400000" rotWithShape="0">
+              <a:srgbClr val="000000">
+                <a:alpha val="38000"/>
+              </a:srgbClr>
+            </a:outerShdw>
+          </a:effectLst>
+        </a:effectStyle>
+        <a:effectStyle>
+          <a:effectLst>
+            <a:outerShdw blurRad="40000" dist="23000" dir="5400000" rotWithShape="0">
+              <a:srgbClr val="000000">
+                <a:alpha val="35000"/>
+              </a:srgbClr>
+            </a:outerShdw>
+          </a:effectLst>
+        </a:effectStyle>
+        <a:effectStyle>
+          <a:effectLst>
+            <a:outerShdw blurRad="40000" dist="23000" dir="5400000" rotWithShape="0">
+              <a:srgbClr val="000000">
+                <a:alpha val="35000"/>
+              </a:srgbClr>
+            </a:outerShdw>
+          </a:effectLst>
+          <a:scene3d>
+            <a:camera prst="orthographicFront">
+              <a:rot lat="0" lon="0" rev="0"/>
+            </a:camera>
+            <a:lightRig rig="threePt" dir="t">
+              <a:rot lat="0" lon="0" rev="1200000"/>
+            </a:lightRig>
+          </a:scene3d>
+          <a:sp3d>
+            <a:bevelT w="63500" h="25400"/>
+          </a:sp3d>
+        </a:effectStyle>
+      </a:effectStyleLst>
+      <a:bgFillStyleLst>
+        <a:solidFill>
+          <a:schemeClr val="phClr"/>
+        </a:solidFill>
+        <a:gradFill rotWithShape="1">
+          <a:gsLst>
+            <a:gs pos="0">
+              <a:schemeClr val="phClr">
+                <a:tint val="40000"/>
+                <a:satMod val="350000"/>
+              </a:schemeClr>
+            </a:gs>
+            <a:gs pos="40000">
+              <a:schemeClr val="phClr">
+                <a:tint val="45000"/>
+                <a:shade val="99000"/>
+                <a:satMod val="350000"/>
+              </a:schemeClr>
+            </a:gs>
+            <a:gs pos="100000">
+              <a:schemeClr val="phClr">
+                <a:shade val="20000"/>
+                <a:satMod val="255000"/>
+              </a:schemeClr>
+            </a:gs>
+          </a:gsLst>
+          <a:path path="circle">
+            <a:fillToRect l="50000" t="-80000" r="50000" b="180000"/>
+          </a:path>
+        </a:gradFill>
+        <a:gradFill rotWithShape="1">
+          <a:gsLst>
+            <a:gs pos="0">
+              <a:schemeClr val="phClr">
+                <a:tint val="80000"/>
+                <a:satMod val="300000"/>
+              </a:schemeClr>
+            </a:gs>
+            <a:gs pos="100000">
+              <a:schemeClr val="phClr">
+                <a:shade val="30000"/>
+                <a:satMod val="200000"/>
+              </a:schemeClr>
+            </a:gs>
+          </a:gsLst>
+          <a:path path="circle">
+            <a:fillToRect l="50000" t="50000" r="50000" b="50000"/>
+          </a:path>
+        </a:gradFill>
+      </a:bgFillStyleLst>
+    </a:fmtScheme>
+  </a:themeElements>
+  <a:objectDefaults/>
+  <a:extraClrSchemeLst/>
+</a:theme>
 </file>
</xml_diff>